<commit_message>
additional figures for presentations
</commit_message>
<xml_diff>
--- a/text/figures/figrue_preperation/Figure2_Pipelinev6.pptx
+++ b/text/figures/figrue_preperation/Figure2_Pipelinev6.pptx
@@ -5,10 +5,11 @@
     <p:sldMasterId id="2147483660" r:id="rId1"/>
   </p:sldMasterIdLst>
   <p:notesMasterIdLst>
-    <p:notesMasterId r:id="rId3"/>
+    <p:notesMasterId r:id="rId4"/>
   </p:notesMasterIdLst>
   <p:sldIdLst>
     <p:sldId id="257" r:id="rId2"/>
+    <p:sldId id="258" r:id="rId3"/>
   </p:sldIdLst>
   <p:sldSz cx="10972800" cy="14630400"/>
   <p:notesSz cx="6858000" cy="9144000"/>
@@ -197,7 +198,7 @@
           <a:p>
             <a:fld id="{80C3A0DF-E67B-874F-B4A4-3E5F3D83D257}" type="datetimeFigureOut">
               <a:rPr lang="en-US" smtClean="0"/>
-              <a:t>3/21/17</a:t>
+              <a:t>4/13/17</a:t>
             </a:fld>
             <a:endParaRPr lang="en-US"/>
           </a:p>
@@ -596,7 +597,7 @@
           <a:p>
             <a:fld id="{4856EAA0-066D-F742-A240-D4440EBDD303}" type="datetimeFigureOut">
               <a:rPr lang="en-US" smtClean="0"/>
-              <a:t>3/21/17</a:t>
+              <a:t>4/13/17</a:t>
             </a:fld>
             <a:endParaRPr lang="en-US"/>
           </a:p>
@@ -766,7 +767,7 @@
           <a:p>
             <a:fld id="{4856EAA0-066D-F742-A240-D4440EBDD303}" type="datetimeFigureOut">
               <a:rPr lang="en-US" smtClean="0"/>
-              <a:t>3/21/17</a:t>
+              <a:t>4/13/17</a:t>
             </a:fld>
             <a:endParaRPr lang="en-US"/>
           </a:p>
@@ -946,7 +947,7 @@
           <a:p>
             <a:fld id="{4856EAA0-066D-F742-A240-D4440EBDD303}" type="datetimeFigureOut">
               <a:rPr lang="en-US" smtClean="0"/>
-              <a:t>3/21/17</a:t>
+              <a:t>4/13/17</a:t>
             </a:fld>
             <a:endParaRPr lang="en-US"/>
           </a:p>
@@ -1116,7 +1117,7 @@
           <a:p>
             <a:fld id="{4856EAA0-066D-F742-A240-D4440EBDD303}" type="datetimeFigureOut">
               <a:rPr lang="en-US" smtClean="0"/>
-              <a:t>3/21/17</a:t>
+              <a:t>4/13/17</a:t>
             </a:fld>
             <a:endParaRPr lang="en-US"/>
           </a:p>
@@ -1360,7 +1361,7 @@
           <a:p>
             <a:fld id="{4856EAA0-066D-F742-A240-D4440EBDD303}" type="datetimeFigureOut">
               <a:rPr lang="en-US" smtClean="0"/>
-              <a:t>3/21/17</a:t>
+              <a:t>4/13/17</a:t>
             </a:fld>
             <a:endParaRPr lang="en-US"/>
           </a:p>
@@ -1592,7 +1593,7 @@
           <a:p>
             <a:fld id="{4856EAA0-066D-F742-A240-D4440EBDD303}" type="datetimeFigureOut">
               <a:rPr lang="en-US" smtClean="0"/>
-              <a:t>3/21/17</a:t>
+              <a:t>4/13/17</a:t>
             </a:fld>
             <a:endParaRPr lang="en-US"/>
           </a:p>
@@ -1959,7 +1960,7 @@
           <a:p>
             <a:fld id="{4856EAA0-066D-F742-A240-D4440EBDD303}" type="datetimeFigureOut">
               <a:rPr lang="en-US" smtClean="0"/>
-              <a:t>3/21/17</a:t>
+              <a:t>4/13/17</a:t>
             </a:fld>
             <a:endParaRPr lang="en-US"/>
           </a:p>
@@ -2077,7 +2078,7 @@
           <a:p>
             <a:fld id="{4856EAA0-066D-F742-A240-D4440EBDD303}" type="datetimeFigureOut">
               <a:rPr lang="en-US" smtClean="0"/>
-              <a:t>3/21/17</a:t>
+              <a:t>4/13/17</a:t>
             </a:fld>
             <a:endParaRPr lang="en-US"/>
           </a:p>
@@ -2172,7 +2173,7 @@
           <a:p>
             <a:fld id="{4856EAA0-066D-F742-A240-D4440EBDD303}" type="datetimeFigureOut">
               <a:rPr lang="en-US" smtClean="0"/>
-              <a:t>3/21/17</a:t>
+              <a:t>4/13/17</a:t>
             </a:fld>
             <a:endParaRPr lang="en-US"/>
           </a:p>
@@ -2449,7 +2450,7 @@
           <a:p>
             <a:fld id="{4856EAA0-066D-F742-A240-D4440EBDD303}" type="datetimeFigureOut">
               <a:rPr lang="en-US" smtClean="0"/>
-              <a:t>3/21/17</a:t>
+              <a:t>4/13/17</a:t>
             </a:fld>
             <a:endParaRPr lang="en-US"/>
           </a:p>
@@ -2706,7 +2707,7 @@
           <a:p>
             <a:fld id="{4856EAA0-066D-F742-A240-D4440EBDD303}" type="datetimeFigureOut">
               <a:rPr lang="en-US" smtClean="0"/>
-              <a:t>3/21/17</a:t>
+              <a:t>4/13/17</a:t>
             </a:fld>
             <a:endParaRPr lang="en-US"/>
           </a:p>
@@ -2919,7 +2920,7 @@
           <a:p>
             <a:fld id="{4856EAA0-066D-F742-A240-D4440EBDD303}" type="datetimeFigureOut">
               <a:rPr lang="en-US" smtClean="0"/>
-              <a:t>3/21/17</a:t>
+              <a:t>4/13/17</a:t>
             </a:fld>
             <a:endParaRPr lang="en-US"/>
           </a:p>
@@ -3865,41 +3866,7 @@
                 <a:ea typeface=""/>
                 <a:cs typeface=""/>
               </a:rPr>
-              <a:t>(Protect </a:t>
-            </a:r>
-            <a:r>
-              <a:rPr kumimoji="0" lang="en-US" sz="1600" b="1" i="0" u="none" strike="noStrike" kern="0" cap="none" spc="0" normalizeH="0" baseline="0" noProof="0" dirty="0" smtClean="0">
-                <a:ln>
-                  <a:noFill/>
-                </a:ln>
-                <a:solidFill>
-                  <a:prstClr val="white"/>
-                </a:solidFill>
-                <a:effectLst/>
-                <a:uLnTx/>
-                <a:uFillTx/>
-                <a:latin typeface="Calibri"/>
-                <a:ea typeface=""/>
-                <a:cs typeface=""/>
-              </a:rPr>
-              <a:t>sub-sample </a:t>
-            </a:r>
-            <a:r>
-              <a:rPr kumimoji="0" lang="en-US" sz="1600" b="1" i="0" u="none" strike="noStrike" kern="0" cap="none" spc="0" normalizeH="0" baseline="0" noProof="0" dirty="0" smtClean="0">
-                <a:ln>
-                  <a:noFill/>
-                </a:ln>
-                <a:solidFill>
-                  <a:prstClr val="white"/>
-                </a:solidFill>
-                <a:effectLst/>
-                <a:uLnTx/>
-                <a:uFillTx/>
-                <a:latin typeface="Calibri"/>
-                <a:ea typeface=""/>
-                <a:cs typeface=""/>
-              </a:rPr>
-              <a:t>ratios)</a:t>
+              <a:t>(Protect sub-sample ratios)</a:t>
             </a:r>
             <a:endParaRPr kumimoji="0" lang="en-US" sz="1600" b="0" i="0" u="none" strike="noStrike" kern="0" cap="none" spc="0" normalizeH="0" baseline="0" noProof="0" dirty="0" smtClean="0">
               <a:ln>
@@ -6705,6 +6672,3373 @@
 </p:sld>
 </file>
 
+<file path=ppt/slides/slide2.xml><?xml version="1.0" encoding="utf-8"?>
+<p:sld xmlns:a="http://schemas.openxmlformats.org/drawingml/2006/main" xmlns:r="http://schemas.openxmlformats.org/officeDocument/2006/relationships" xmlns:p="http://schemas.openxmlformats.org/presentationml/2006/main">
+  <p:cSld>
+    <p:spTree>
+      <p:nvGrpSpPr>
+        <p:cNvPr id="1" name=""/>
+        <p:cNvGrpSpPr/>
+        <p:nvPr/>
+      </p:nvGrpSpPr>
+      <p:grpSpPr>
+        <a:xfrm>
+          <a:off x="0" y="0"/>
+          <a:ext cx="0" cy="0"/>
+          <a:chOff x="0" y="0"/>
+          <a:chExt cx="0" cy="0"/>
+        </a:xfrm>
+      </p:grpSpPr>
+      <p:sp>
+        <p:nvSpPr>
+          <p:cNvPr id="61" name="Rounded Rectangular Callout 60"/>
+          <p:cNvSpPr/>
+          <p:nvPr/>
+        </p:nvSpPr>
+        <p:spPr>
+          <a:xfrm>
+            <a:off x="50037" y="5631927"/>
+            <a:ext cx="4899506" cy="6835136"/>
+          </a:xfrm>
+          <a:prstGeom prst="wedgeRoundRectCallout">
+            <a:avLst>
+              <a:gd name="adj1" fmla="val 57055"/>
+              <a:gd name="adj2" fmla="val 30190"/>
+              <a:gd name="adj3" fmla="val 16667"/>
+            </a:avLst>
+          </a:prstGeom>
+          <a:solidFill>
+            <a:srgbClr val="C0504D">
+              <a:lumMod val="40000"/>
+              <a:lumOff val="60000"/>
+              <a:alpha val="25000"/>
+            </a:srgbClr>
+          </a:solidFill>
+          <a:ln w="12700" cap="flat" cmpd="sng" algn="ctr">
+            <a:solidFill>
+              <a:sysClr val="windowText" lastClr="000000">
+                <a:alpha val="24000"/>
+              </a:sysClr>
+            </a:solidFill>
+            <a:prstDash val="solid"/>
+          </a:ln>
+          <a:effectLst/>
+        </p:spPr>
+        <p:txBody>
+          <a:bodyPr vert="vert270" lIns="0" tIns="45720" rIns="0" rtlCol="0" anchor="t" anchorCtr="0"/>
+          <a:lstStyle/>
+          <a:p>
+            <a:pPr marL="0" marR="0" lvl="0" indent="0" algn="ctr" defTabSz="914360" eaLnBrk="1" fontAlgn="auto" latinLnBrk="0" hangingPunct="1">
+              <a:lnSpc>
+                <a:spcPct val="100000"/>
+              </a:lnSpc>
+              <a:spcBef>
+                <a:spcPts val="0"/>
+              </a:spcBef>
+              <a:spcAft>
+                <a:spcPts val="0"/>
+              </a:spcAft>
+              <a:buClrTx/>
+              <a:buSzTx/>
+              <a:buFontTx/>
+              <a:buNone/>
+              <a:tabLst/>
+              <a:defRPr/>
+            </a:pPr>
+            <a:endParaRPr kumimoji="0" lang="en-US" sz="2800" b="1" i="0" u="none" strike="noStrike" kern="0" cap="none" spc="300" normalizeH="0" baseline="0" noProof="0" dirty="0" smtClean="0">
+              <a:ln>
+                <a:noFill/>
+              </a:ln>
+              <a:solidFill>
+                <a:prstClr val="black"/>
+              </a:solidFill>
+              <a:effectLst/>
+              <a:uLnTx/>
+              <a:uFillTx/>
+              <a:latin typeface="Calibri"/>
+              <a:ea typeface=""/>
+              <a:cs typeface=""/>
+            </a:endParaRPr>
+          </a:p>
+        </p:txBody>
+      </p:sp>
+      <p:cxnSp>
+        <p:nvCxnSpPr>
+          <p:cNvPr id="63" name="Curved Connector 17"/>
+          <p:cNvCxnSpPr>
+            <a:endCxn id="72" idx="0"/>
+          </p:cNvCxnSpPr>
+          <p:nvPr/>
+        </p:nvCxnSpPr>
+        <p:spPr>
+          <a:xfrm>
+            <a:off x="4348120" y="4772675"/>
+            <a:ext cx="3847374" cy="733358"/>
+          </a:xfrm>
+          <a:prstGeom prst="bentConnector2">
+            <a:avLst/>
+          </a:prstGeom>
+          <a:noFill/>
+          <a:ln w="38100" cap="flat" cmpd="sng" algn="ctr">
+            <a:solidFill>
+              <a:srgbClr val="000000"/>
+            </a:solidFill>
+            <a:prstDash val="solid"/>
+            <a:headEnd type="none"/>
+            <a:tailEnd type="triangle"/>
+          </a:ln>
+          <a:effectLst/>
+        </p:spPr>
+      </p:cxnSp>
+      <p:sp>
+        <p:nvSpPr>
+          <p:cNvPr id="64" name="Alternate Process 63"/>
+          <p:cNvSpPr/>
+          <p:nvPr/>
+        </p:nvSpPr>
+        <p:spPr>
+          <a:xfrm>
+            <a:off x="1522269" y="3542274"/>
+            <a:ext cx="2825851" cy="1613309"/>
+          </a:xfrm>
+          <a:prstGeom prst="flowChartAlternateProcess">
+            <a:avLst/>
+          </a:prstGeom>
+          <a:solidFill>
+            <a:srgbClr val="C0504D">
+              <a:lumMod val="75000"/>
+            </a:srgbClr>
+          </a:solidFill>
+          <a:ln w="9525" cap="flat" cmpd="sng" algn="ctr">
+            <a:solidFill>
+              <a:srgbClr val="632523"/>
+            </a:solidFill>
+            <a:prstDash val="solid"/>
+          </a:ln>
+          <a:effectLst/>
+        </p:spPr>
+        <p:txBody>
+          <a:bodyPr rtlCol="0" anchor="ctr"/>
+          <a:lstStyle/>
+          <a:p>
+            <a:pPr marL="0" marR="0" lvl="0" indent="0" algn="ctr" defTabSz="457200" eaLnBrk="1" fontAlgn="auto" latinLnBrk="0" hangingPunct="1">
+              <a:lnSpc>
+                <a:spcPct val="100000"/>
+              </a:lnSpc>
+              <a:spcBef>
+                <a:spcPts val="0"/>
+              </a:spcBef>
+              <a:spcAft>
+                <a:spcPts val="0"/>
+              </a:spcAft>
+              <a:buClrTx/>
+              <a:buSzTx/>
+              <a:buFontTx/>
+              <a:buNone/>
+              <a:tabLst/>
+              <a:defRPr/>
+            </a:pPr>
+            <a:r>
+              <a:rPr kumimoji="0" lang="en-US" sz="1600" b="1" i="0" u="none" strike="noStrike" kern="0" cap="none" spc="0" normalizeH="0" baseline="0" noProof="0" dirty="0" smtClean="0">
+                <a:ln>
+                  <a:noFill/>
+                </a:ln>
+                <a:solidFill>
+                  <a:prstClr val="white"/>
+                </a:solidFill>
+                <a:effectLst/>
+                <a:uLnTx/>
+                <a:uFillTx/>
+                <a:latin typeface="Calibri"/>
+                <a:ea typeface=""/>
+                <a:cs typeface=""/>
+              </a:rPr>
+              <a:t>INITIAL DATA PREPERATION</a:t>
+            </a:r>
+          </a:p>
+          <a:p>
+            <a:pPr marL="0" marR="0" lvl="0" indent="0" algn="ctr" defTabSz="457200" eaLnBrk="1" fontAlgn="auto" latinLnBrk="0" hangingPunct="1">
+              <a:lnSpc>
+                <a:spcPct val="100000"/>
+              </a:lnSpc>
+              <a:spcBef>
+                <a:spcPts val="0"/>
+              </a:spcBef>
+              <a:spcAft>
+                <a:spcPts val="0"/>
+              </a:spcAft>
+              <a:buClrTx/>
+              <a:buSzTx/>
+              <a:buFontTx/>
+              <a:buNone/>
+              <a:tabLst/>
+              <a:defRPr/>
+            </a:pPr>
+            <a:r>
+              <a:rPr kumimoji="0" lang="en-US" sz="1600" b="1" i="0" u="none" strike="noStrike" kern="0" cap="none" spc="0" normalizeH="0" baseline="0" noProof="0" dirty="0" smtClean="0">
+                <a:ln>
+                  <a:noFill/>
+                </a:ln>
+                <a:solidFill>
+                  <a:prstClr val="white"/>
+                </a:solidFill>
+                <a:effectLst/>
+                <a:uLnTx/>
+                <a:uFillTx/>
+                <a:latin typeface="Calibri"/>
+                <a:ea typeface=""/>
+                <a:cs typeface=""/>
+              </a:rPr>
+              <a:t>DeSeq2, log transform.</a:t>
+            </a:r>
+            <a:endParaRPr kumimoji="0" lang="en-US" sz="1400" b="1" i="0" u="none" strike="noStrike" kern="0" cap="none" spc="0" normalizeH="0" baseline="0" noProof="0" dirty="0" smtClean="0">
+              <a:ln>
+                <a:noFill/>
+              </a:ln>
+              <a:solidFill>
+                <a:prstClr val="white"/>
+              </a:solidFill>
+              <a:effectLst/>
+              <a:uLnTx/>
+              <a:uFillTx/>
+              <a:latin typeface="Calibri"/>
+              <a:ea typeface=""/>
+              <a:cs typeface=""/>
+            </a:endParaRPr>
+          </a:p>
+        </p:txBody>
+      </p:sp>
+      <p:grpSp>
+        <p:nvGrpSpPr>
+          <p:cNvPr id="66" name="Group 65"/>
+          <p:cNvGrpSpPr/>
+          <p:nvPr/>
+        </p:nvGrpSpPr>
+        <p:grpSpPr>
+          <a:xfrm>
+            <a:off x="-1901384" y="3886286"/>
+            <a:ext cx="1975963" cy="886389"/>
+            <a:chOff x="1163675" y="3034637"/>
+            <a:chExt cx="1544165" cy="653788"/>
+          </a:xfrm>
+        </p:grpSpPr>
+        <p:sp>
+          <p:nvSpPr>
+            <p:cNvPr id="67" name="Alternate Process 66"/>
+            <p:cNvSpPr/>
+            <p:nvPr/>
+          </p:nvSpPr>
+          <p:spPr>
+            <a:xfrm>
+              <a:off x="1441382" y="3100269"/>
+              <a:ext cx="1266458" cy="560654"/>
+            </a:xfrm>
+            <a:prstGeom prst="flowChartAlternateProcess">
+              <a:avLst/>
+            </a:prstGeom>
+            <a:solidFill>
+              <a:srgbClr val="77933C"/>
+            </a:solidFill>
+            <a:ln w="9525" cap="flat" cmpd="sng" algn="ctr">
+              <a:solidFill>
+                <a:srgbClr val="9BBB59">
+                  <a:shade val="95000"/>
+                  <a:satMod val="105000"/>
+                </a:srgbClr>
+              </a:solidFill>
+              <a:prstDash val="solid"/>
+            </a:ln>
+            <a:effectLst/>
+          </p:spPr>
+          <p:txBody>
+            <a:bodyPr rtlCol="0" anchor="ctr"/>
+            <a:lstStyle/>
+            <a:p>
+              <a:pPr marL="0" marR="0" lvl="0" indent="0" algn="ctr" defTabSz="457200" eaLnBrk="1" fontAlgn="auto" latinLnBrk="0" hangingPunct="1">
+                <a:lnSpc>
+                  <a:spcPct val="100000"/>
+                </a:lnSpc>
+                <a:spcBef>
+                  <a:spcPts val="0"/>
+                </a:spcBef>
+                <a:spcAft>
+                  <a:spcPts val="0"/>
+                </a:spcAft>
+                <a:buClrTx/>
+                <a:buSzTx/>
+                <a:buFontTx/>
+                <a:buNone/>
+                <a:tabLst/>
+                <a:defRPr/>
+              </a:pPr>
+              <a:r>
+                <a:rPr kumimoji="0" lang="en-US" sz="1600" b="1" i="0" u="none" strike="noStrike" kern="0" cap="none" spc="0" normalizeH="0" baseline="0" noProof="0" dirty="0" smtClean="0">
+                  <a:ln>
+                    <a:noFill/>
+                  </a:ln>
+                  <a:solidFill>
+                    <a:prstClr val="white"/>
+                  </a:solidFill>
+                  <a:effectLst/>
+                  <a:uLnTx/>
+                  <a:uFillTx/>
+                  <a:latin typeface="Calibri"/>
+                  <a:ea typeface=""/>
+                  <a:cs typeface=""/>
+                </a:rPr>
+                <a:t>SAMPLES</a:t>
+              </a:r>
+            </a:p>
+          </p:txBody>
+        </p:sp>
+        <p:sp>
+          <p:nvSpPr>
+            <p:cNvPr id="68" name="Rectangle 67"/>
+            <p:cNvSpPr/>
+            <p:nvPr/>
+          </p:nvSpPr>
+          <p:spPr>
+            <a:xfrm rot="16200000">
+              <a:off x="975635" y="3222677"/>
+              <a:ext cx="653788" cy="277707"/>
+            </a:xfrm>
+            <a:prstGeom prst="rect">
+              <a:avLst/>
+            </a:prstGeom>
+            <a:solidFill>
+              <a:srgbClr val="9BBB59">
+                <a:lumMod val="50000"/>
+              </a:srgbClr>
+            </a:solidFill>
+            <a:ln w="9525" cap="flat" cmpd="sng" algn="ctr">
+              <a:noFill/>
+              <a:prstDash val="solid"/>
+            </a:ln>
+            <a:effectLst>
+              <a:outerShdw blurRad="40000" dist="23000" dir="5400000" rotWithShape="0">
+                <a:srgbClr val="000000">
+                  <a:alpha val="35000"/>
+                </a:srgbClr>
+              </a:outerShdw>
+            </a:effectLst>
+          </p:spPr>
+          <p:txBody>
+            <a:bodyPr rtlCol="0" anchor="ctr"/>
+            <a:lstStyle/>
+            <a:p>
+              <a:pPr marL="0" marR="0" lvl="0" indent="0" algn="ctr" defTabSz="457200" eaLnBrk="1" fontAlgn="auto" latinLnBrk="0" hangingPunct="1">
+                <a:lnSpc>
+                  <a:spcPct val="100000"/>
+                </a:lnSpc>
+                <a:spcBef>
+                  <a:spcPts val="0"/>
+                </a:spcBef>
+                <a:spcAft>
+                  <a:spcPts val="0"/>
+                </a:spcAft>
+                <a:buClrTx/>
+                <a:buSzTx/>
+                <a:buFontTx/>
+                <a:buNone/>
+                <a:tabLst/>
+                <a:defRPr/>
+              </a:pPr>
+              <a:r>
+                <a:rPr kumimoji="0" lang="en-US" sz="1200" b="1" i="0" u="none" strike="noStrike" kern="0" cap="none" spc="0" normalizeH="0" baseline="0" noProof="0" dirty="0" smtClean="0">
+                  <a:ln>
+                    <a:noFill/>
+                  </a:ln>
+                  <a:solidFill>
+                    <a:prstClr val="white"/>
+                  </a:solidFill>
+                  <a:effectLst/>
+                  <a:uLnTx/>
+                  <a:uFillTx/>
+                  <a:latin typeface="Andale Mono" charset="0"/>
+                  <a:ea typeface="Andale Mono" charset="0"/>
+                  <a:cs typeface="Andale Mono" charset="0"/>
+                </a:rPr>
+                <a:t>Labels</a:t>
+              </a:r>
+            </a:p>
+          </p:txBody>
+        </p:sp>
+      </p:grpSp>
+      <p:sp>
+        <p:nvSpPr>
+          <p:cNvPr id="69" name="Oval 68"/>
+          <p:cNvSpPr/>
+          <p:nvPr/>
+        </p:nvSpPr>
+        <p:spPr>
+          <a:xfrm>
+            <a:off x="8431794" y="10753673"/>
+            <a:ext cx="1180616" cy="1190730"/>
+          </a:xfrm>
+          <a:prstGeom prst="ellipse">
+            <a:avLst/>
+          </a:prstGeom>
+          <a:solidFill>
+            <a:srgbClr val="1F497D">
+              <a:lumMod val="20000"/>
+              <a:lumOff val="80000"/>
+            </a:srgbClr>
+          </a:solidFill>
+          <a:ln w="9525" cap="flat" cmpd="sng" algn="ctr">
+            <a:noFill/>
+            <a:prstDash val="solid"/>
+          </a:ln>
+          <a:effectLst/>
+        </p:spPr>
+        <p:txBody>
+          <a:bodyPr rtlCol="0" anchor="ctr"/>
+          <a:lstStyle/>
+          <a:p>
+            <a:pPr marL="0" marR="0" lvl="0" indent="0" algn="ctr" defTabSz="457200" eaLnBrk="1" fontAlgn="auto" latinLnBrk="0" hangingPunct="1">
+              <a:lnSpc>
+                <a:spcPct val="100000"/>
+              </a:lnSpc>
+              <a:spcBef>
+                <a:spcPts val="0"/>
+              </a:spcBef>
+              <a:spcAft>
+                <a:spcPts val="0"/>
+              </a:spcAft>
+              <a:buClrTx/>
+              <a:buSzTx/>
+              <a:buFontTx/>
+              <a:buNone/>
+              <a:tabLst/>
+              <a:defRPr/>
+            </a:pPr>
+            <a:r>
+              <a:rPr kumimoji="0" lang="en-US" sz="1600" b="1" i="0" u="none" strike="noStrike" kern="0" cap="none" spc="0" normalizeH="0" baseline="0" noProof="0" dirty="0" smtClean="0">
+                <a:ln>
+                  <a:noFill/>
+                </a:ln>
+                <a:solidFill>
+                  <a:prstClr val="black"/>
+                </a:solidFill>
+                <a:effectLst/>
+                <a:uLnTx/>
+                <a:uFillTx/>
+                <a:latin typeface="Calibri"/>
+                <a:ea typeface=""/>
+                <a:cs typeface=""/>
+              </a:rPr>
+              <a:t>Model</a:t>
+            </a:r>
+          </a:p>
+        </p:txBody>
+      </p:sp>
+      <p:sp>
+        <p:nvSpPr>
+          <p:cNvPr id="70" name="Alternate Process 69"/>
+          <p:cNvSpPr/>
+          <p:nvPr/>
+        </p:nvSpPr>
+        <p:spPr>
+          <a:xfrm>
+            <a:off x="6747804" y="5506033"/>
+            <a:ext cx="2895380" cy="692649"/>
+          </a:xfrm>
+          <a:prstGeom prst="flowChartAlternateProcess">
+            <a:avLst/>
+          </a:prstGeom>
+          <a:solidFill>
+            <a:srgbClr val="C0504D">
+              <a:lumMod val="75000"/>
+            </a:srgbClr>
+          </a:solidFill>
+          <a:ln w="9525" cap="flat" cmpd="sng" algn="ctr">
+            <a:solidFill>
+              <a:srgbClr val="632523"/>
+            </a:solidFill>
+            <a:prstDash val="solid"/>
+          </a:ln>
+          <a:effectLst/>
+        </p:spPr>
+        <p:txBody>
+          <a:bodyPr rtlCol="0" anchor="ctr"/>
+          <a:lstStyle/>
+          <a:p>
+            <a:pPr marL="0" marR="0" lvl="0" indent="0" algn="ctr" defTabSz="457200" eaLnBrk="1" fontAlgn="auto" latinLnBrk="0" hangingPunct="1">
+              <a:lnSpc>
+                <a:spcPct val="100000"/>
+              </a:lnSpc>
+              <a:spcBef>
+                <a:spcPts val="0"/>
+              </a:spcBef>
+              <a:spcAft>
+                <a:spcPts val="0"/>
+              </a:spcAft>
+              <a:buClrTx/>
+              <a:buSzTx/>
+              <a:buFontTx/>
+              <a:buNone/>
+              <a:tabLst/>
+              <a:defRPr/>
+            </a:pPr>
+            <a:r>
+              <a:rPr kumimoji="0" lang="en-US" sz="1600" b="1" i="0" u="none" strike="noStrike" kern="0" cap="none" spc="0" normalizeH="0" baseline="0" noProof="0" dirty="0" smtClean="0">
+                <a:ln>
+                  <a:noFill/>
+                </a:ln>
+                <a:solidFill>
+                  <a:prstClr val="white"/>
+                </a:solidFill>
+                <a:effectLst/>
+                <a:uLnTx/>
+                <a:uFillTx/>
+                <a:latin typeface="Calibri"/>
+                <a:ea typeface=""/>
+                <a:cs typeface=""/>
+              </a:rPr>
+              <a:t>Semi-random data division</a:t>
+            </a:r>
+          </a:p>
+          <a:p>
+            <a:pPr marL="0" marR="0" lvl="0" indent="0" algn="ctr" defTabSz="457200" eaLnBrk="1" fontAlgn="auto" latinLnBrk="0" hangingPunct="1">
+              <a:lnSpc>
+                <a:spcPct val="100000"/>
+              </a:lnSpc>
+              <a:spcBef>
+                <a:spcPts val="0"/>
+              </a:spcBef>
+              <a:spcAft>
+                <a:spcPts val="0"/>
+              </a:spcAft>
+              <a:buClrTx/>
+              <a:buSzTx/>
+              <a:buFontTx/>
+              <a:buNone/>
+              <a:tabLst/>
+              <a:defRPr/>
+            </a:pPr>
+            <a:r>
+              <a:rPr kumimoji="0" lang="en-US" sz="1600" b="1" i="0" u="none" strike="noStrike" kern="0" cap="none" spc="0" normalizeH="0" baseline="0" noProof="0" dirty="0" smtClean="0">
+                <a:ln>
+                  <a:noFill/>
+                </a:ln>
+                <a:solidFill>
+                  <a:prstClr val="white"/>
+                </a:solidFill>
+                <a:effectLst/>
+                <a:uLnTx/>
+                <a:uFillTx/>
+                <a:latin typeface="Calibri"/>
+                <a:ea typeface=""/>
+                <a:cs typeface=""/>
+              </a:rPr>
+              <a:t>(Protect sub-sample ratios)</a:t>
+            </a:r>
+            <a:endParaRPr kumimoji="0" lang="en-US" sz="1600" b="0" i="0" u="none" strike="noStrike" kern="0" cap="none" spc="0" normalizeH="0" baseline="0" noProof="0" dirty="0" smtClean="0">
+              <a:ln>
+                <a:noFill/>
+              </a:ln>
+              <a:solidFill>
+                <a:prstClr val="white"/>
+              </a:solidFill>
+              <a:effectLst/>
+              <a:uLnTx/>
+              <a:uFillTx/>
+              <a:latin typeface="Calibri"/>
+              <a:ea typeface=""/>
+              <a:cs typeface=""/>
+            </a:endParaRPr>
+          </a:p>
+        </p:txBody>
+      </p:sp>
+      <p:sp>
+        <p:nvSpPr>
+          <p:cNvPr id="71" name="Alternate Process 70"/>
+          <p:cNvSpPr/>
+          <p:nvPr/>
+        </p:nvSpPr>
+        <p:spPr>
+          <a:xfrm>
+            <a:off x="5966609" y="6358633"/>
+            <a:ext cx="1398802" cy="692649"/>
+          </a:xfrm>
+          <a:prstGeom prst="flowChartAlternateProcess">
+            <a:avLst/>
+          </a:prstGeom>
+          <a:solidFill>
+            <a:srgbClr val="9BBB59">
+              <a:lumMod val="75000"/>
+            </a:srgbClr>
+          </a:solidFill>
+          <a:ln w="9525" cap="flat" cmpd="sng" algn="ctr">
+            <a:solidFill>
+              <a:srgbClr val="9BBB59">
+                <a:shade val="95000"/>
+                <a:satMod val="105000"/>
+              </a:srgbClr>
+            </a:solidFill>
+            <a:prstDash val="solid"/>
+          </a:ln>
+          <a:effectLst/>
+        </p:spPr>
+        <p:txBody>
+          <a:bodyPr rtlCol="0" anchor="ctr"/>
+          <a:lstStyle/>
+          <a:p>
+            <a:pPr marL="0" marR="0" lvl="0" indent="0" algn="ctr" defTabSz="457200" eaLnBrk="1" fontAlgn="auto" latinLnBrk="0" hangingPunct="1">
+              <a:lnSpc>
+                <a:spcPct val="100000"/>
+              </a:lnSpc>
+              <a:spcBef>
+                <a:spcPts val="0"/>
+              </a:spcBef>
+              <a:spcAft>
+                <a:spcPts val="0"/>
+              </a:spcAft>
+              <a:buClrTx/>
+              <a:buSzTx/>
+              <a:buFontTx/>
+              <a:buNone/>
+              <a:tabLst/>
+              <a:defRPr/>
+            </a:pPr>
+            <a:r>
+              <a:rPr kumimoji="0" lang="en-US" sz="1600" b="1" i="0" u="none" strike="noStrike" kern="0" cap="none" spc="0" normalizeH="0" baseline="0" noProof="0" dirty="0" smtClean="0">
+                <a:ln>
+                  <a:noFill/>
+                </a:ln>
+                <a:solidFill>
+                  <a:prstClr val="white"/>
+                </a:solidFill>
+                <a:effectLst/>
+                <a:uLnTx/>
+                <a:uFillTx/>
+                <a:latin typeface="Calibri"/>
+                <a:ea typeface=""/>
+                <a:cs typeface=""/>
+              </a:rPr>
+              <a:t>Training set</a:t>
+            </a:r>
+            <a:br>
+              <a:rPr kumimoji="0" lang="en-US" sz="1600" b="1" i="0" u="none" strike="noStrike" kern="0" cap="none" spc="0" normalizeH="0" baseline="0" noProof="0" dirty="0" smtClean="0">
+                <a:ln>
+                  <a:noFill/>
+                </a:ln>
+                <a:solidFill>
+                  <a:prstClr val="white"/>
+                </a:solidFill>
+                <a:effectLst/>
+                <a:uLnTx/>
+                <a:uFillTx/>
+                <a:latin typeface="Calibri"/>
+                <a:ea typeface=""/>
+                <a:cs typeface=""/>
+              </a:rPr>
+            </a:br>
+            <a:r>
+              <a:rPr kumimoji="0" lang="en-US" sz="1600" b="1" i="0" u="none" strike="noStrike" kern="0" cap="none" spc="0" normalizeH="0" baseline="0" noProof="0" dirty="0" smtClean="0">
+                <a:ln>
+                  <a:noFill/>
+                </a:ln>
+                <a:solidFill>
+                  <a:prstClr val="white"/>
+                </a:solidFill>
+                <a:effectLst/>
+                <a:uLnTx/>
+                <a:uFillTx/>
+                <a:latin typeface="Calibri"/>
+                <a:ea typeface=""/>
+                <a:cs typeface=""/>
+              </a:rPr>
+              <a:t>80%</a:t>
+            </a:r>
+          </a:p>
+        </p:txBody>
+      </p:sp>
+      <p:sp>
+        <p:nvSpPr>
+          <p:cNvPr id="72" name="Alternate Process 71"/>
+          <p:cNvSpPr/>
+          <p:nvPr/>
+        </p:nvSpPr>
+        <p:spPr>
+          <a:xfrm>
+            <a:off x="8987100" y="6358634"/>
+            <a:ext cx="1232683" cy="692649"/>
+          </a:xfrm>
+          <a:prstGeom prst="flowChartAlternateProcess">
+            <a:avLst/>
+          </a:prstGeom>
+          <a:solidFill>
+            <a:srgbClr val="9BBB59">
+              <a:lumMod val="75000"/>
+            </a:srgbClr>
+          </a:solidFill>
+          <a:ln w="9525" cap="flat" cmpd="sng" algn="ctr">
+            <a:solidFill>
+              <a:srgbClr val="9BBB59">
+                <a:shade val="95000"/>
+                <a:satMod val="105000"/>
+              </a:srgbClr>
+            </a:solidFill>
+            <a:prstDash val="solid"/>
+          </a:ln>
+          <a:effectLst/>
+        </p:spPr>
+        <p:txBody>
+          <a:bodyPr rtlCol="0" anchor="ctr"/>
+          <a:lstStyle/>
+          <a:p>
+            <a:pPr marL="0" marR="0" lvl="0" indent="0" algn="ctr" defTabSz="457200" eaLnBrk="1" fontAlgn="auto" latinLnBrk="0" hangingPunct="1">
+              <a:lnSpc>
+                <a:spcPct val="100000"/>
+              </a:lnSpc>
+              <a:spcBef>
+                <a:spcPts val="0"/>
+              </a:spcBef>
+              <a:spcAft>
+                <a:spcPts val="0"/>
+              </a:spcAft>
+              <a:buClrTx/>
+              <a:buSzTx/>
+              <a:buFontTx/>
+              <a:buNone/>
+              <a:tabLst/>
+              <a:defRPr/>
+            </a:pPr>
+            <a:r>
+              <a:rPr kumimoji="0" lang="en-US" sz="1600" b="1" i="0" u="none" strike="noStrike" kern="0" cap="none" spc="0" normalizeH="0" baseline="0" noProof="0" dirty="0" smtClean="0">
+                <a:ln>
+                  <a:noFill/>
+                </a:ln>
+                <a:solidFill>
+                  <a:prstClr val="white"/>
+                </a:solidFill>
+                <a:effectLst/>
+                <a:uLnTx/>
+                <a:uFillTx/>
+                <a:latin typeface="Calibri"/>
+                <a:ea typeface=""/>
+                <a:cs typeface=""/>
+              </a:rPr>
+              <a:t>Test set</a:t>
+            </a:r>
+            <a:br>
+              <a:rPr kumimoji="0" lang="en-US" sz="1600" b="1" i="0" u="none" strike="noStrike" kern="0" cap="none" spc="0" normalizeH="0" baseline="0" noProof="0" dirty="0" smtClean="0">
+                <a:ln>
+                  <a:noFill/>
+                </a:ln>
+                <a:solidFill>
+                  <a:prstClr val="white"/>
+                </a:solidFill>
+                <a:effectLst/>
+                <a:uLnTx/>
+                <a:uFillTx/>
+                <a:latin typeface="Calibri"/>
+                <a:ea typeface=""/>
+                <a:cs typeface=""/>
+              </a:rPr>
+            </a:br>
+            <a:r>
+              <a:rPr kumimoji="0" lang="en-US" sz="1600" b="1" i="0" u="none" strike="noStrike" kern="0" cap="none" spc="0" normalizeH="0" baseline="0" noProof="0" dirty="0" smtClean="0">
+                <a:ln>
+                  <a:noFill/>
+                </a:ln>
+                <a:solidFill>
+                  <a:prstClr val="white"/>
+                </a:solidFill>
+                <a:effectLst/>
+                <a:uLnTx/>
+                <a:uFillTx/>
+                <a:latin typeface="Calibri"/>
+                <a:ea typeface=""/>
+                <a:cs typeface=""/>
+              </a:rPr>
+              <a:t>20%</a:t>
+            </a:r>
+          </a:p>
+        </p:txBody>
+      </p:sp>
+      <p:cxnSp>
+        <p:nvCxnSpPr>
+          <p:cNvPr id="74" name="Curved Connector 12"/>
+          <p:cNvCxnSpPr/>
+          <p:nvPr/>
+        </p:nvCxnSpPr>
+        <p:spPr>
+          <a:xfrm rot="5400000">
+            <a:off x="7527318" y="6036774"/>
+            <a:ext cx="506277" cy="830084"/>
+          </a:xfrm>
+          <a:prstGeom prst="bentConnector2">
+            <a:avLst/>
+          </a:prstGeom>
+          <a:noFill/>
+          <a:ln w="25400" cap="flat" cmpd="sng" algn="ctr">
+            <a:solidFill>
+              <a:srgbClr val="000000"/>
+            </a:solidFill>
+            <a:prstDash val="solid"/>
+            <a:headEnd type="none"/>
+            <a:tailEnd type="triangle"/>
+          </a:ln>
+          <a:effectLst/>
+        </p:spPr>
+      </p:cxnSp>
+      <p:cxnSp>
+        <p:nvCxnSpPr>
+          <p:cNvPr id="75" name="Curved Connector 13"/>
+          <p:cNvCxnSpPr/>
+          <p:nvPr/>
+        </p:nvCxnSpPr>
+        <p:spPr>
+          <a:xfrm rot="16200000" flipH="1">
+            <a:off x="8338157" y="6056015"/>
+            <a:ext cx="506278" cy="791606"/>
+          </a:xfrm>
+          <a:prstGeom prst="bentConnector2">
+            <a:avLst/>
+          </a:prstGeom>
+          <a:noFill/>
+          <a:ln w="25400" cap="flat" cmpd="sng" algn="ctr">
+            <a:solidFill>
+              <a:srgbClr val="000000"/>
+            </a:solidFill>
+            <a:prstDash val="solid"/>
+            <a:headEnd type="none"/>
+            <a:tailEnd type="triangle"/>
+          </a:ln>
+          <a:effectLst/>
+        </p:spPr>
+      </p:cxnSp>
+      <p:cxnSp>
+        <p:nvCxnSpPr>
+          <p:cNvPr id="76" name="Curved Connector 12"/>
+          <p:cNvCxnSpPr/>
+          <p:nvPr/>
+        </p:nvCxnSpPr>
+        <p:spPr>
+          <a:xfrm rot="16200000" flipH="1">
+            <a:off x="6449824" y="7299868"/>
+            <a:ext cx="497184" cy="0"/>
+          </a:xfrm>
+          <a:prstGeom prst="bentConnector3">
+            <a:avLst/>
+          </a:prstGeom>
+          <a:noFill/>
+          <a:ln w="25400" cap="flat" cmpd="sng" algn="ctr">
+            <a:solidFill>
+              <a:srgbClr val="000000"/>
+            </a:solidFill>
+            <a:prstDash val="solid"/>
+            <a:headEnd type="none"/>
+            <a:tailEnd type="triangle"/>
+          </a:ln>
+          <a:effectLst/>
+        </p:spPr>
+      </p:cxnSp>
+      <p:sp>
+        <p:nvSpPr>
+          <p:cNvPr id="77" name="Preparation 76"/>
+          <p:cNvSpPr/>
+          <p:nvPr/>
+        </p:nvSpPr>
+        <p:spPr>
+          <a:xfrm>
+            <a:off x="8332239" y="8442929"/>
+            <a:ext cx="1554477" cy="1005840"/>
+          </a:xfrm>
+          <a:prstGeom prst="flowChartPreparation">
+            <a:avLst/>
+          </a:prstGeom>
+          <a:solidFill>
+            <a:srgbClr val="F79646">
+              <a:lumMod val="75000"/>
+            </a:srgbClr>
+          </a:solidFill>
+          <a:ln w="9525" cap="flat" cmpd="sng" algn="ctr">
+            <a:solidFill>
+              <a:srgbClr val="4F81BD">
+                <a:shade val="95000"/>
+                <a:satMod val="105000"/>
+              </a:srgbClr>
+            </a:solidFill>
+            <a:prstDash val="solid"/>
+          </a:ln>
+          <a:effectLst/>
+        </p:spPr>
+        <p:txBody>
+          <a:bodyPr rtlCol="0" anchor="ctr"/>
+          <a:lstStyle/>
+          <a:p>
+            <a:pPr marL="0" marR="0" lvl="0" indent="0" algn="ctr" defTabSz="457200" eaLnBrk="1" fontAlgn="auto" latinLnBrk="0" hangingPunct="1">
+              <a:lnSpc>
+                <a:spcPct val="100000"/>
+              </a:lnSpc>
+              <a:spcBef>
+                <a:spcPts val="0"/>
+              </a:spcBef>
+              <a:spcAft>
+                <a:spcPts val="0"/>
+              </a:spcAft>
+              <a:buClrTx/>
+              <a:buSzTx/>
+              <a:buFontTx/>
+              <a:buNone/>
+              <a:tabLst/>
+              <a:defRPr/>
+            </a:pPr>
+            <a:r>
+              <a:rPr kumimoji="0" lang="en-US" sz="1400" b="1" i="0" u="none" strike="noStrike" kern="0" cap="none" spc="0" normalizeH="0" baseline="0" noProof="0" dirty="0" smtClean="0">
+                <a:ln>
+                  <a:noFill/>
+                </a:ln>
+                <a:solidFill>
+                  <a:prstClr val="white"/>
+                </a:solidFill>
+                <a:effectLst/>
+                <a:uLnTx/>
+                <a:uFillTx/>
+                <a:latin typeface="Calibri"/>
+                <a:ea typeface=""/>
+                <a:cs typeface=""/>
+              </a:rPr>
+              <a:t>PCA</a:t>
+            </a:r>
+            <a:br>
+              <a:rPr kumimoji="0" lang="en-US" sz="1400" b="1" i="0" u="none" strike="noStrike" kern="0" cap="none" spc="0" normalizeH="0" baseline="0" noProof="0" dirty="0" smtClean="0">
+                <a:ln>
+                  <a:noFill/>
+                </a:ln>
+                <a:solidFill>
+                  <a:prstClr val="white"/>
+                </a:solidFill>
+                <a:effectLst/>
+                <a:uLnTx/>
+                <a:uFillTx/>
+                <a:latin typeface="Calibri"/>
+                <a:ea typeface=""/>
+                <a:cs typeface=""/>
+              </a:rPr>
+            </a:br>
+            <a:r>
+              <a:rPr kumimoji="0" lang="en-US" sz="1600" b="1" i="0" u="none" strike="noStrike" kern="0" cap="none" spc="0" normalizeH="0" baseline="0" noProof="0" dirty="0" smtClean="0">
+                <a:ln>
+                  <a:noFill/>
+                </a:ln>
+                <a:solidFill>
+                  <a:prstClr val="white"/>
+                </a:solidFill>
+                <a:effectLst/>
+                <a:uLnTx/>
+                <a:uFillTx/>
+                <a:latin typeface="Calibri"/>
+                <a:ea typeface=""/>
+                <a:cs typeface=""/>
+              </a:rPr>
+              <a:t>rotation</a:t>
+            </a:r>
+            <a:r>
+              <a:rPr kumimoji="0" lang="en-US" sz="1400" b="1" i="0" u="none" strike="noStrike" kern="0" cap="none" spc="0" normalizeH="0" baseline="0" noProof="0" dirty="0" smtClean="0">
+                <a:ln>
+                  <a:noFill/>
+                </a:ln>
+                <a:solidFill>
+                  <a:prstClr val="white"/>
+                </a:solidFill>
+                <a:effectLst/>
+                <a:uLnTx/>
+                <a:uFillTx/>
+                <a:latin typeface="Calibri"/>
+                <a:ea typeface=""/>
+                <a:cs typeface=""/>
+              </a:rPr>
+              <a:t> object</a:t>
+            </a:r>
+          </a:p>
+        </p:txBody>
+      </p:sp>
+      <p:sp>
+        <p:nvSpPr>
+          <p:cNvPr id="78" name="Alternate Process 77"/>
+          <p:cNvSpPr/>
+          <p:nvPr/>
+        </p:nvSpPr>
+        <p:spPr>
+          <a:xfrm>
+            <a:off x="8705461" y="9709799"/>
+            <a:ext cx="1928032" cy="692649"/>
+          </a:xfrm>
+          <a:prstGeom prst="flowChartAlternateProcess">
+            <a:avLst/>
+          </a:prstGeom>
+          <a:solidFill>
+            <a:srgbClr val="9BBB59">
+              <a:lumMod val="75000"/>
+            </a:srgbClr>
+          </a:solidFill>
+          <a:ln w="9525" cap="flat" cmpd="sng" algn="ctr">
+            <a:solidFill>
+              <a:srgbClr val="9BBB59">
+                <a:shade val="95000"/>
+                <a:satMod val="105000"/>
+              </a:srgbClr>
+            </a:solidFill>
+            <a:prstDash val="solid"/>
+          </a:ln>
+          <a:effectLst/>
+        </p:spPr>
+        <p:txBody>
+          <a:bodyPr rtlCol="0" anchor="ctr"/>
+          <a:lstStyle/>
+          <a:p>
+            <a:pPr marL="0" marR="0" lvl="0" indent="0" algn="ctr" defTabSz="457200" eaLnBrk="1" fontAlgn="auto" latinLnBrk="0" hangingPunct="1">
+              <a:lnSpc>
+                <a:spcPct val="100000"/>
+              </a:lnSpc>
+              <a:spcBef>
+                <a:spcPts val="0"/>
+              </a:spcBef>
+              <a:spcAft>
+                <a:spcPts val="0"/>
+              </a:spcAft>
+              <a:buClrTx/>
+              <a:buSzTx/>
+              <a:buFontTx/>
+              <a:buNone/>
+              <a:tabLst/>
+              <a:defRPr/>
+            </a:pPr>
+            <a:r>
+              <a:rPr kumimoji="0" lang="en-US" sz="1600" b="1" i="0" u="none" strike="noStrike" kern="0" cap="none" spc="0" normalizeH="0" baseline="0" noProof="0" dirty="0" smtClean="0">
+                <a:ln>
+                  <a:noFill/>
+                </a:ln>
+                <a:solidFill>
+                  <a:prstClr val="white"/>
+                </a:solidFill>
+                <a:effectLst/>
+                <a:uLnTx/>
+                <a:uFillTx/>
+                <a:latin typeface="Calibri"/>
+                <a:ea typeface=""/>
+                <a:cs typeface=""/>
+              </a:rPr>
+              <a:t>Dim. Reduced Test</a:t>
+            </a:r>
+          </a:p>
+          <a:p>
+            <a:pPr marL="0" marR="0" lvl="0" indent="0" algn="ctr" defTabSz="457200" eaLnBrk="1" fontAlgn="auto" latinLnBrk="0" hangingPunct="1">
+              <a:lnSpc>
+                <a:spcPct val="100000"/>
+              </a:lnSpc>
+              <a:spcBef>
+                <a:spcPts val="0"/>
+              </a:spcBef>
+              <a:spcAft>
+                <a:spcPts val="0"/>
+              </a:spcAft>
+              <a:buClrTx/>
+              <a:buSzTx/>
+              <a:buFontTx/>
+              <a:buNone/>
+              <a:tabLst/>
+              <a:defRPr/>
+            </a:pPr>
+            <a:r>
+              <a:rPr kumimoji="0" lang="en-US" sz="1600" b="1" i="0" u="none" strike="noStrike" kern="0" cap="none" spc="0" normalizeH="0" baseline="0" noProof="0" dirty="0" smtClean="0">
+                <a:ln>
+                  <a:noFill/>
+                </a:ln>
+                <a:solidFill>
+                  <a:prstClr val="white"/>
+                </a:solidFill>
+                <a:effectLst/>
+                <a:uLnTx/>
+                <a:uFillTx/>
+                <a:latin typeface="Calibri"/>
+                <a:ea typeface=""/>
+                <a:cs typeface=""/>
+              </a:rPr>
+              <a:t>20%</a:t>
+            </a:r>
+          </a:p>
+        </p:txBody>
+      </p:sp>
+      <p:cxnSp>
+        <p:nvCxnSpPr>
+          <p:cNvPr id="80" name="Curved Connector 12"/>
+          <p:cNvCxnSpPr/>
+          <p:nvPr/>
+        </p:nvCxnSpPr>
+        <p:spPr>
+          <a:xfrm rot="16200000" flipH="1">
+            <a:off x="9258971" y="9299291"/>
+            <a:ext cx="261031" cy="559984"/>
+          </a:xfrm>
+          <a:prstGeom prst="bentConnector3">
+            <a:avLst>
+              <a:gd name="adj1" fmla="val 50000"/>
+            </a:avLst>
+          </a:prstGeom>
+          <a:noFill/>
+          <a:ln w="25400" cap="flat" cmpd="sng" algn="ctr">
+            <a:solidFill>
+              <a:srgbClr val="000000"/>
+            </a:solidFill>
+            <a:prstDash val="solid"/>
+            <a:headEnd type="none"/>
+            <a:tailEnd type="triangle"/>
+          </a:ln>
+          <a:effectLst/>
+        </p:spPr>
+      </p:cxnSp>
+      <p:sp>
+        <p:nvSpPr>
+          <p:cNvPr id="81" name="Alternate Process 80"/>
+          <p:cNvSpPr/>
+          <p:nvPr/>
+        </p:nvSpPr>
+        <p:spPr>
+          <a:xfrm>
+            <a:off x="5362697" y="10713125"/>
+            <a:ext cx="2769763" cy="1231278"/>
+          </a:xfrm>
+          <a:prstGeom prst="flowChartAlternateProcess">
+            <a:avLst/>
+          </a:prstGeom>
+          <a:solidFill>
+            <a:srgbClr val="C0504D">
+              <a:lumMod val="75000"/>
+            </a:srgbClr>
+          </a:solidFill>
+          <a:ln w="9525" cap="flat" cmpd="sng" algn="ctr">
+            <a:solidFill>
+              <a:srgbClr val="632523"/>
+            </a:solidFill>
+            <a:prstDash val="solid"/>
+          </a:ln>
+          <a:effectLst/>
+        </p:spPr>
+        <p:txBody>
+          <a:bodyPr lIns="0" rIns="0" bIns="0" rtlCol="0" anchor="ctr"/>
+          <a:lstStyle/>
+          <a:p>
+            <a:pPr algn="ctr" defTabSz="457200">
+              <a:defRPr/>
+            </a:pPr>
+            <a:r>
+              <a:rPr lang="en-US" sz="1600" b="1" kern="0" dirty="0" smtClean="0">
+                <a:solidFill>
+                  <a:prstClr val="white"/>
+                </a:solidFill>
+              </a:rPr>
+              <a:t>Train 3 </a:t>
+            </a:r>
+            <a:r>
+              <a:rPr lang="en-US" sz="1600" b="1" kern="0" dirty="0">
+                <a:solidFill>
+                  <a:prstClr val="white"/>
+                </a:solidFill>
+              </a:rPr>
+              <a:t>SVM kernels or RF</a:t>
+            </a:r>
+          </a:p>
+          <a:p>
+            <a:pPr marL="0" marR="0" lvl="0" indent="0" algn="ctr" defTabSz="457200" eaLnBrk="1" fontAlgn="auto" latinLnBrk="0" hangingPunct="1">
+              <a:lnSpc>
+                <a:spcPct val="100000"/>
+              </a:lnSpc>
+              <a:spcBef>
+                <a:spcPts val="0"/>
+              </a:spcBef>
+              <a:spcAft>
+                <a:spcPts val="0"/>
+              </a:spcAft>
+              <a:buClrTx/>
+              <a:buSzTx/>
+              <a:buFontTx/>
+              <a:buNone/>
+              <a:tabLst/>
+              <a:defRPr/>
+            </a:pPr>
+            <a:r>
+              <a:rPr lang="en-US" sz="1600" b="1" kern="0" noProof="0" dirty="0" smtClean="0">
+                <a:solidFill>
+                  <a:prstClr val="white"/>
+                </a:solidFill>
+                <a:latin typeface="Calibri"/>
+                <a:ea typeface=""/>
+                <a:cs typeface=""/>
+              </a:rPr>
+              <a:t>with</a:t>
+            </a:r>
+            <a:r>
+              <a:rPr kumimoji="0" lang="en-US" sz="1600" b="1" i="0" u="none" strike="noStrike" kern="0" cap="none" spc="0" normalizeH="0" baseline="0" noProof="0" dirty="0" smtClean="0">
+                <a:ln>
+                  <a:noFill/>
+                </a:ln>
+                <a:solidFill>
+                  <a:prstClr val="white"/>
+                </a:solidFill>
+                <a:effectLst/>
+                <a:uLnTx/>
+                <a:uFillTx/>
+                <a:latin typeface="Calibri"/>
+                <a:ea typeface=""/>
+                <a:cs typeface=""/>
+              </a:rPr>
+              <a:t> tuning</a:t>
+            </a:r>
+            <a:endParaRPr kumimoji="0" lang="en-US" sz="1050" b="1" i="0" u="none" strike="noStrike" kern="0" cap="none" spc="0" normalizeH="0" baseline="0" noProof="0" dirty="0" smtClean="0">
+              <a:ln>
+                <a:noFill/>
+              </a:ln>
+              <a:solidFill>
+                <a:prstClr val="white"/>
+              </a:solidFill>
+              <a:effectLst/>
+              <a:uLnTx/>
+              <a:uFillTx/>
+              <a:latin typeface="Calibri"/>
+              <a:ea typeface=""/>
+              <a:cs typeface=""/>
+            </a:endParaRPr>
+          </a:p>
+        </p:txBody>
+      </p:sp>
+      <p:cxnSp>
+        <p:nvCxnSpPr>
+          <p:cNvPr id="82" name="Curved Connector 12"/>
+          <p:cNvCxnSpPr/>
+          <p:nvPr/>
+        </p:nvCxnSpPr>
+        <p:spPr>
+          <a:xfrm flipV="1">
+            <a:off x="8297561" y="11349039"/>
+            <a:ext cx="134235" cy="0"/>
+          </a:xfrm>
+          <a:prstGeom prst="bentConnector3">
+            <a:avLst>
+              <a:gd name="adj1" fmla="val -110837"/>
+            </a:avLst>
+          </a:prstGeom>
+          <a:noFill/>
+          <a:ln w="25400" cap="flat" cmpd="sng" algn="ctr">
+            <a:solidFill>
+              <a:srgbClr val="000000"/>
+            </a:solidFill>
+            <a:prstDash val="solid"/>
+            <a:headEnd type="none"/>
+            <a:tailEnd type="triangle"/>
+          </a:ln>
+          <a:effectLst/>
+        </p:spPr>
+      </p:cxnSp>
+      <p:cxnSp>
+        <p:nvCxnSpPr>
+          <p:cNvPr id="83" name="Curved Connector 12"/>
+          <p:cNvCxnSpPr/>
+          <p:nvPr/>
+        </p:nvCxnSpPr>
+        <p:spPr>
+          <a:xfrm rot="5400000">
+            <a:off x="9170178" y="10254372"/>
+            <a:ext cx="351226" cy="647376"/>
+          </a:xfrm>
+          <a:prstGeom prst="bentConnector3">
+            <a:avLst>
+              <a:gd name="adj1" fmla="val 50000"/>
+            </a:avLst>
+          </a:prstGeom>
+          <a:noFill/>
+          <a:ln w="25400" cap="flat" cmpd="sng" algn="ctr">
+            <a:solidFill>
+              <a:srgbClr val="000000"/>
+            </a:solidFill>
+            <a:prstDash val="solid"/>
+            <a:headEnd type="none"/>
+            <a:tailEnd type="triangle"/>
+          </a:ln>
+          <a:effectLst/>
+        </p:spPr>
+      </p:cxnSp>
+      <p:sp>
+        <p:nvSpPr>
+          <p:cNvPr id="84" name="Alternate Process 83"/>
+          <p:cNvSpPr/>
+          <p:nvPr/>
+        </p:nvSpPr>
+        <p:spPr>
+          <a:xfrm>
+            <a:off x="9779327" y="10971422"/>
+            <a:ext cx="1012905" cy="758403"/>
+          </a:xfrm>
+          <a:prstGeom prst="flowChartAlternateProcess">
+            <a:avLst/>
+          </a:prstGeom>
+          <a:solidFill>
+            <a:srgbClr val="9BBB59">
+              <a:lumMod val="75000"/>
+            </a:srgbClr>
+          </a:solidFill>
+          <a:ln w="9525" cap="flat" cmpd="sng" algn="ctr">
+            <a:solidFill>
+              <a:srgbClr val="9BBB59">
+                <a:shade val="95000"/>
+                <a:satMod val="105000"/>
+              </a:srgbClr>
+            </a:solidFill>
+            <a:prstDash val="solid"/>
+          </a:ln>
+          <a:effectLst/>
+        </p:spPr>
+        <p:txBody>
+          <a:bodyPr lIns="18288" rIns="18288" rtlCol="0" anchor="ctr"/>
+          <a:lstStyle/>
+          <a:p>
+            <a:pPr marL="0" marR="0" lvl="0" indent="0" algn="ctr" defTabSz="457200" eaLnBrk="1" fontAlgn="auto" latinLnBrk="0" hangingPunct="1">
+              <a:lnSpc>
+                <a:spcPct val="100000"/>
+              </a:lnSpc>
+              <a:spcBef>
+                <a:spcPts val="0"/>
+              </a:spcBef>
+              <a:spcAft>
+                <a:spcPts val="0"/>
+              </a:spcAft>
+              <a:buClrTx/>
+              <a:buSzTx/>
+              <a:buFontTx/>
+              <a:buNone/>
+              <a:tabLst/>
+              <a:defRPr/>
+            </a:pPr>
+            <a:r>
+              <a:rPr kumimoji="0" lang="en-US" sz="1600" b="1" i="0" u="none" strike="noStrike" kern="0" cap="none" spc="0" normalizeH="0" baseline="0" noProof="0" dirty="0" smtClean="0">
+                <a:ln>
+                  <a:noFill/>
+                </a:ln>
+                <a:solidFill>
+                  <a:prstClr val="white"/>
+                </a:solidFill>
+                <a:effectLst/>
+                <a:uLnTx/>
+                <a:uFillTx/>
+                <a:latin typeface="Calibri"/>
+                <a:ea typeface=""/>
+                <a:cs typeface=""/>
+              </a:rPr>
+              <a:t>Prediction</a:t>
+            </a:r>
+          </a:p>
+        </p:txBody>
+      </p:sp>
+      <p:cxnSp>
+        <p:nvCxnSpPr>
+          <p:cNvPr id="88" name="Curved Connector 12"/>
+          <p:cNvCxnSpPr/>
+          <p:nvPr/>
+        </p:nvCxnSpPr>
+        <p:spPr>
+          <a:xfrm>
+            <a:off x="9623165" y="11348792"/>
+            <a:ext cx="156164" cy="0"/>
+          </a:xfrm>
+          <a:prstGeom prst="bentConnector3">
+            <a:avLst>
+              <a:gd name="adj1" fmla="val 50000"/>
+            </a:avLst>
+          </a:prstGeom>
+          <a:noFill/>
+          <a:ln w="25400" cap="flat" cmpd="sng" algn="ctr">
+            <a:solidFill>
+              <a:srgbClr val="000000"/>
+            </a:solidFill>
+            <a:prstDash val="solid"/>
+            <a:headEnd type="none"/>
+            <a:tailEnd type="triangle"/>
+          </a:ln>
+          <a:effectLst/>
+        </p:spPr>
+      </p:cxnSp>
+      <p:sp>
+        <p:nvSpPr>
+          <p:cNvPr id="89" name="Rectangle 88"/>
+          <p:cNvSpPr/>
+          <p:nvPr/>
+        </p:nvSpPr>
+        <p:spPr>
+          <a:xfrm>
+            <a:off x="5066422" y="5421052"/>
+            <a:ext cx="5759111" cy="6680211"/>
+          </a:xfrm>
+          <a:prstGeom prst="rect">
+            <a:avLst/>
+          </a:prstGeom>
+          <a:noFill/>
+          <a:ln w="28575" cap="flat" cmpd="sng" algn="ctr">
+            <a:solidFill>
+              <a:srgbClr val="F79646">
+                <a:lumMod val="75000"/>
+              </a:srgbClr>
+            </a:solidFill>
+            <a:prstDash val="solid"/>
+          </a:ln>
+          <a:effectLst/>
+        </p:spPr>
+        <p:txBody>
+          <a:bodyPr rtlCol="0" anchor="ctr"/>
+          <a:lstStyle/>
+          <a:p>
+            <a:pPr marL="0" marR="0" lvl="0" indent="0" algn="ctr" defTabSz="457200" eaLnBrk="1" fontAlgn="auto" latinLnBrk="0" hangingPunct="1">
+              <a:lnSpc>
+                <a:spcPct val="100000"/>
+              </a:lnSpc>
+              <a:spcBef>
+                <a:spcPts val="0"/>
+              </a:spcBef>
+              <a:spcAft>
+                <a:spcPts val="0"/>
+              </a:spcAft>
+              <a:buClrTx/>
+              <a:buSzTx/>
+              <a:buFontTx/>
+              <a:buNone/>
+              <a:tabLst/>
+              <a:defRPr/>
+            </a:pPr>
+            <a:endParaRPr kumimoji="0" lang="en-US" sz="2000" b="0" i="0" u="none" strike="noStrike" kern="0" cap="none" spc="0" normalizeH="0" baseline="0" noProof="0" smtClean="0">
+              <a:ln>
+                <a:noFill/>
+              </a:ln>
+              <a:solidFill>
+                <a:prstClr val="white"/>
+              </a:solidFill>
+              <a:effectLst/>
+              <a:uLnTx/>
+              <a:uFillTx/>
+              <a:latin typeface="Calibri"/>
+              <a:ea typeface=""/>
+              <a:cs typeface=""/>
+            </a:endParaRPr>
+          </a:p>
+        </p:txBody>
+      </p:sp>
+      <p:sp>
+        <p:nvSpPr>
+          <p:cNvPr id="90" name="Rectangle 89"/>
+          <p:cNvSpPr/>
+          <p:nvPr/>
+        </p:nvSpPr>
+        <p:spPr>
+          <a:xfrm>
+            <a:off x="5066422" y="5047538"/>
+            <a:ext cx="5759112" cy="343838"/>
+          </a:xfrm>
+          <a:prstGeom prst="rect">
+            <a:avLst/>
+          </a:prstGeom>
+          <a:solidFill>
+            <a:srgbClr val="F79646">
+              <a:lumMod val="60000"/>
+              <a:lumOff val="40000"/>
+              <a:alpha val="50000"/>
+            </a:srgbClr>
+          </a:solidFill>
+          <a:ln w="28575" cap="flat" cmpd="sng" algn="ctr">
+            <a:solidFill>
+              <a:srgbClr val="E46C0A"/>
+            </a:solidFill>
+            <a:prstDash val="solid"/>
+          </a:ln>
+          <a:effectLst/>
+        </p:spPr>
+        <p:txBody>
+          <a:bodyPr lIns="182880" rtlCol="0" anchor="ctr"/>
+          <a:lstStyle/>
+          <a:p>
+            <a:pPr marL="0" marR="0" lvl="0" indent="0" defTabSz="457200" eaLnBrk="1" fontAlgn="auto" latinLnBrk="0" hangingPunct="1">
+              <a:lnSpc>
+                <a:spcPct val="100000"/>
+              </a:lnSpc>
+              <a:spcBef>
+                <a:spcPts val="0"/>
+              </a:spcBef>
+              <a:spcAft>
+                <a:spcPts val="0"/>
+              </a:spcAft>
+              <a:buClrTx/>
+              <a:buSzTx/>
+              <a:buFontTx/>
+              <a:buNone/>
+              <a:tabLst/>
+              <a:defRPr/>
+            </a:pPr>
+            <a:r>
+              <a:rPr kumimoji="0" lang="en-US" sz="2000" b="1" i="0" u="none" strike="noStrike" kern="0" cap="none" spc="0" normalizeH="0" baseline="0" noProof="0" dirty="0" smtClean="0">
+                <a:ln>
+                  <a:noFill/>
+                </a:ln>
+                <a:solidFill>
+                  <a:prstClr val="black"/>
+                </a:solidFill>
+                <a:effectLst/>
+                <a:uLnTx/>
+                <a:uFillTx/>
+                <a:latin typeface="Calibri"/>
+                <a:ea typeface=""/>
+                <a:cs typeface=""/>
+              </a:rPr>
+              <a:t>Recalculate </a:t>
+            </a:r>
+            <a:r>
+              <a:rPr lang="en-US" sz="2000" b="1" kern="0" dirty="0" smtClean="0">
+                <a:solidFill>
+                  <a:prstClr val="black"/>
+                </a:solidFill>
+                <a:latin typeface="Calibri"/>
+                <a:ea typeface=""/>
+                <a:cs typeface=""/>
+              </a:rPr>
+              <a:t>60</a:t>
+            </a:r>
+            <a:r>
+              <a:rPr kumimoji="0" lang="en-US" sz="2000" b="1" i="0" u="none" strike="noStrike" kern="0" cap="none" spc="0" normalizeH="0" baseline="0" noProof="0" dirty="0" smtClean="0">
+                <a:ln>
+                  <a:noFill/>
+                </a:ln>
+                <a:solidFill>
+                  <a:prstClr val="black"/>
+                </a:solidFill>
+                <a:effectLst/>
+                <a:uLnTx/>
+                <a:uFillTx/>
+                <a:latin typeface="Calibri"/>
+                <a:ea typeface=""/>
+                <a:cs typeface=""/>
+              </a:rPr>
+              <a:t> times</a:t>
+            </a:r>
+          </a:p>
+        </p:txBody>
+      </p:sp>
+      <p:sp>
+        <p:nvSpPr>
+          <p:cNvPr id="91" name="Alternate Process 90"/>
+          <p:cNvSpPr/>
+          <p:nvPr/>
+        </p:nvSpPr>
+        <p:spPr>
+          <a:xfrm>
+            <a:off x="5801424" y="7548463"/>
+            <a:ext cx="1900740" cy="622108"/>
+          </a:xfrm>
+          <a:prstGeom prst="flowChartAlternateProcess">
+            <a:avLst/>
+          </a:prstGeom>
+          <a:solidFill>
+            <a:srgbClr val="C0504D">
+              <a:lumMod val="75000"/>
+            </a:srgbClr>
+          </a:solidFill>
+          <a:ln w="9525" cap="flat" cmpd="sng" algn="ctr">
+            <a:solidFill>
+              <a:srgbClr val="632523"/>
+            </a:solidFill>
+            <a:prstDash val="solid"/>
+          </a:ln>
+          <a:effectLst/>
+        </p:spPr>
+        <p:txBody>
+          <a:bodyPr rtlCol="0" anchor="ctr"/>
+          <a:lstStyle/>
+          <a:p>
+            <a:pPr marL="0" marR="0" lvl="0" indent="0" algn="ctr" defTabSz="457200" eaLnBrk="1" fontAlgn="auto" latinLnBrk="0" hangingPunct="1">
+              <a:lnSpc>
+                <a:spcPct val="100000"/>
+              </a:lnSpc>
+              <a:spcBef>
+                <a:spcPts val="0"/>
+              </a:spcBef>
+              <a:spcAft>
+                <a:spcPts val="0"/>
+              </a:spcAft>
+              <a:buClrTx/>
+              <a:buSzTx/>
+              <a:buFontTx/>
+              <a:buNone/>
+              <a:tabLst/>
+              <a:defRPr/>
+            </a:pPr>
+            <a:r>
+              <a:rPr kumimoji="0" lang="en-US" sz="1600" b="1" i="0" u="none" strike="noStrike" kern="0" cap="none" spc="0" normalizeH="0" baseline="0" noProof="0" dirty="0" smtClean="0">
+                <a:ln>
+                  <a:noFill/>
+                </a:ln>
+                <a:solidFill>
+                  <a:prstClr val="white"/>
+                </a:solidFill>
+                <a:effectLst/>
+                <a:uLnTx/>
+                <a:uFillTx/>
+                <a:latin typeface="Calibri"/>
+                <a:ea typeface=""/>
+                <a:cs typeface=""/>
+              </a:rPr>
+              <a:t>Batch Correction (</a:t>
+            </a:r>
+            <a:r>
+              <a:rPr kumimoji="0" lang="en-US" sz="1600" b="1" i="0" u="none" strike="noStrike" kern="0" cap="none" spc="0" normalizeH="0" baseline="0" noProof="0" dirty="0" err="1" smtClean="0">
+                <a:ln>
+                  <a:noFill/>
+                </a:ln>
+                <a:solidFill>
+                  <a:prstClr val="white"/>
+                </a:solidFill>
+                <a:effectLst/>
+                <a:uLnTx/>
+                <a:uFillTx/>
+                <a:latin typeface="Calibri"/>
+                <a:ea typeface=""/>
+                <a:cs typeface=""/>
+              </a:rPr>
+              <a:t>fSVA</a:t>
+            </a:r>
+            <a:r>
+              <a:rPr kumimoji="0" lang="en-US" sz="1600" b="1" i="0" u="none" strike="noStrike" kern="0" cap="none" spc="0" normalizeH="0" baseline="0" noProof="0" dirty="0" smtClean="0">
+                <a:ln>
+                  <a:noFill/>
+                </a:ln>
+                <a:solidFill>
+                  <a:prstClr val="white"/>
+                </a:solidFill>
+                <a:effectLst/>
+                <a:uLnTx/>
+                <a:uFillTx/>
+                <a:latin typeface="Calibri"/>
+                <a:ea typeface=""/>
+                <a:cs typeface=""/>
+              </a:rPr>
+              <a:t>)</a:t>
+            </a:r>
+          </a:p>
+        </p:txBody>
+      </p:sp>
+      <p:sp>
+        <p:nvSpPr>
+          <p:cNvPr id="92" name="Preparation 91"/>
+          <p:cNvSpPr/>
+          <p:nvPr/>
+        </p:nvSpPr>
+        <p:spPr>
+          <a:xfrm>
+            <a:off x="8332239" y="7307361"/>
+            <a:ext cx="1554477" cy="1005840"/>
+          </a:xfrm>
+          <a:prstGeom prst="flowChartPreparation">
+            <a:avLst/>
+          </a:prstGeom>
+          <a:solidFill>
+            <a:srgbClr val="F79646">
+              <a:lumMod val="75000"/>
+            </a:srgbClr>
+          </a:solidFill>
+          <a:ln w="9525" cap="flat" cmpd="sng" algn="ctr">
+            <a:solidFill>
+              <a:srgbClr val="4F81BD">
+                <a:shade val="95000"/>
+                <a:satMod val="105000"/>
+              </a:srgbClr>
+            </a:solidFill>
+            <a:prstDash val="solid"/>
+          </a:ln>
+          <a:effectLst/>
+        </p:spPr>
+        <p:txBody>
+          <a:bodyPr lIns="0" rIns="0" rtlCol="0" anchor="ctr"/>
+          <a:lstStyle/>
+          <a:p>
+            <a:pPr marL="0" marR="0" lvl="0" indent="0" algn="ctr" defTabSz="457200" eaLnBrk="1" fontAlgn="auto" latinLnBrk="0" hangingPunct="1">
+              <a:lnSpc>
+                <a:spcPct val="100000"/>
+              </a:lnSpc>
+              <a:spcBef>
+                <a:spcPts val="0"/>
+              </a:spcBef>
+              <a:spcAft>
+                <a:spcPts val="0"/>
+              </a:spcAft>
+              <a:buClrTx/>
+              <a:buSzTx/>
+              <a:buFontTx/>
+              <a:buNone/>
+              <a:tabLst/>
+              <a:defRPr/>
+            </a:pPr>
+            <a:r>
+              <a:rPr kumimoji="0" lang="en-US" sz="1600" b="1" i="0" u="none" strike="noStrike" kern="0" cap="none" spc="0" normalizeH="0" baseline="0" noProof="0" dirty="0" smtClean="0">
+                <a:ln>
+                  <a:noFill/>
+                </a:ln>
+                <a:solidFill>
+                  <a:prstClr val="white"/>
+                </a:solidFill>
+                <a:effectLst/>
+                <a:uLnTx/>
+                <a:uFillTx/>
+                <a:latin typeface="Calibri"/>
+                <a:ea typeface=""/>
+                <a:cs typeface=""/>
+              </a:rPr>
+              <a:t>Batch</a:t>
+            </a:r>
+            <a:br>
+              <a:rPr kumimoji="0" lang="en-US" sz="1600" b="1" i="0" u="none" strike="noStrike" kern="0" cap="none" spc="0" normalizeH="0" baseline="0" noProof="0" dirty="0" smtClean="0">
+                <a:ln>
+                  <a:noFill/>
+                </a:ln>
+                <a:solidFill>
+                  <a:prstClr val="white"/>
+                </a:solidFill>
+                <a:effectLst/>
+                <a:uLnTx/>
+                <a:uFillTx/>
+                <a:latin typeface="Calibri"/>
+                <a:ea typeface=""/>
+                <a:cs typeface=""/>
+              </a:rPr>
+            </a:br>
+            <a:r>
+              <a:rPr kumimoji="0" lang="en-US" sz="1600" b="1" i="0" u="none" strike="noStrike" kern="0" cap="none" spc="0" normalizeH="0" baseline="0" noProof="0" dirty="0" smtClean="0">
+                <a:ln>
+                  <a:noFill/>
+                </a:ln>
+                <a:solidFill>
+                  <a:prstClr val="white"/>
+                </a:solidFill>
+                <a:effectLst/>
+                <a:uLnTx/>
+                <a:uFillTx/>
+                <a:latin typeface="Calibri"/>
+                <a:ea typeface=""/>
+                <a:cs typeface=""/>
+              </a:rPr>
+              <a:t>correction object</a:t>
+            </a:r>
+          </a:p>
+        </p:txBody>
+      </p:sp>
+      <p:cxnSp>
+        <p:nvCxnSpPr>
+          <p:cNvPr id="93" name="Elbow Connector 92"/>
+          <p:cNvCxnSpPr/>
+          <p:nvPr/>
+        </p:nvCxnSpPr>
+        <p:spPr>
+          <a:xfrm rot="5400000">
+            <a:off x="9228430" y="6932349"/>
+            <a:ext cx="256077" cy="493948"/>
+          </a:xfrm>
+          <a:prstGeom prst="bentConnector3">
+            <a:avLst>
+              <a:gd name="adj1" fmla="val 50000"/>
+            </a:avLst>
+          </a:prstGeom>
+          <a:noFill/>
+          <a:ln w="25400" cap="flat" cmpd="sng" algn="ctr">
+            <a:solidFill>
+              <a:sysClr val="windowText" lastClr="000000"/>
+            </a:solidFill>
+            <a:prstDash val="solid"/>
+            <a:tailEnd type="triangle"/>
+          </a:ln>
+          <a:effectLst/>
+        </p:spPr>
+      </p:cxnSp>
+      <p:cxnSp>
+        <p:nvCxnSpPr>
+          <p:cNvPr id="94" name="Elbow Connector 93"/>
+          <p:cNvCxnSpPr/>
+          <p:nvPr/>
+        </p:nvCxnSpPr>
+        <p:spPr>
+          <a:xfrm rot="5400000">
+            <a:off x="9050962" y="8384416"/>
+            <a:ext cx="129728" cy="0"/>
+          </a:xfrm>
+          <a:prstGeom prst="bentConnector3">
+            <a:avLst/>
+          </a:prstGeom>
+          <a:noFill/>
+          <a:ln w="25400" cap="flat" cmpd="sng" algn="ctr">
+            <a:solidFill>
+              <a:sysClr val="windowText" lastClr="000000"/>
+            </a:solidFill>
+            <a:prstDash val="solid"/>
+            <a:tailEnd type="triangle"/>
+          </a:ln>
+          <a:effectLst/>
+        </p:spPr>
+      </p:cxnSp>
+      <p:cxnSp>
+        <p:nvCxnSpPr>
+          <p:cNvPr id="95" name="Elbow Connector 94"/>
+          <p:cNvCxnSpPr/>
+          <p:nvPr/>
+        </p:nvCxnSpPr>
+        <p:spPr>
+          <a:xfrm flipV="1">
+            <a:off x="7702166" y="7810280"/>
+            <a:ext cx="630075" cy="0"/>
+          </a:xfrm>
+          <a:prstGeom prst="bentConnector3">
+            <a:avLst/>
+          </a:prstGeom>
+          <a:noFill/>
+          <a:ln w="25400" cap="flat" cmpd="sng" algn="ctr">
+            <a:solidFill>
+              <a:srgbClr val="000000"/>
+            </a:solidFill>
+            <a:prstDash val="solid"/>
+            <a:headEnd type="none"/>
+            <a:tailEnd type="triangle"/>
+          </a:ln>
+          <a:effectLst/>
+        </p:spPr>
+      </p:cxnSp>
+      <p:sp>
+        <p:nvSpPr>
+          <p:cNvPr id="96" name="Rectangle 95"/>
+          <p:cNvSpPr/>
+          <p:nvPr/>
+        </p:nvSpPr>
+        <p:spPr>
+          <a:xfrm rot="16200000">
+            <a:off x="5426741" y="6564396"/>
+            <a:ext cx="785872" cy="307335"/>
+          </a:xfrm>
+          <a:prstGeom prst="rect">
+            <a:avLst/>
+          </a:prstGeom>
+          <a:solidFill>
+            <a:srgbClr val="9BBB59">
+              <a:lumMod val="50000"/>
+            </a:srgbClr>
+          </a:solidFill>
+          <a:ln w="9525" cap="flat" cmpd="sng" algn="ctr">
+            <a:noFill/>
+            <a:prstDash val="solid"/>
+          </a:ln>
+          <a:effectLst>
+            <a:outerShdw blurRad="40000" dist="23000" dir="5400000" rotWithShape="0">
+              <a:srgbClr val="000000">
+                <a:alpha val="35000"/>
+              </a:srgbClr>
+            </a:outerShdw>
+          </a:effectLst>
+        </p:spPr>
+        <p:txBody>
+          <a:bodyPr rtlCol="0" anchor="ctr"/>
+          <a:lstStyle/>
+          <a:p>
+            <a:pPr marL="0" marR="0" lvl="0" indent="0" algn="ctr" defTabSz="457200" eaLnBrk="1" fontAlgn="auto" latinLnBrk="0" hangingPunct="1">
+              <a:lnSpc>
+                <a:spcPct val="100000"/>
+              </a:lnSpc>
+              <a:spcBef>
+                <a:spcPts val="0"/>
+              </a:spcBef>
+              <a:spcAft>
+                <a:spcPts val="0"/>
+              </a:spcAft>
+              <a:buClrTx/>
+              <a:buSzTx/>
+              <a:buFontTx/>
+              <a:buNone/>
+              <a:tabLst/>
+              <a:defRPr/>
+            </a:pPr>
+            <a:r>
+              <a:rPr kumimoji="0" lang="en-US" sz="1050" b="1" i="0" u="none" strike="noStrike" kern="0" cap="none" spc="0" normalizeH="0" baseline="0" noProof="0" dirty="0" smtClean="0">
+                <a:ln>
+                  <a:noFill/>
+                </a:ln>
+                <a:solidFill>
+                  <a:prstClr val="white"/>
+                </a:solidFill>
+                <a:effectLst/>
+                <a:uLnTx/>
+                <a:uFillTx/>
+                <a:latin typeface="Andale Mono" charset="0"/>
+                <a:ea typeface="Andale Mono" charset="0"/>
+                <a:cs typeface="Andale Mono" charset="0"/>
+              </a:rPr>
+              <a:t>Labels</a:t>
+            </a:r>
+          </a:p>
+        </p:txBody>
+      </p:sp>
+      <p:sp>
+        <p:nvSpPr>
+          <p:cNvPr id="117" name="Alternate Process 116"/>
+          <p:cNvSpPr/>
+          <p:nvPr/>
+        </p:nvSpPr>
+        <p:spPr>
+          <a:xfrm>
+            <a:off x="5806313" y="8534717"/>
+            <a:ext cx="1894390" cy="792138"/>
+          </a:xfrm>
+          <a:prstGeom prst="flowChartAlternateProcess">
+            <a:avLst/>
+          </a:prstGeom>
+          <a:solidFill>
+            <a:srgbClr val="C0504D">
+              <a:lumMod val="75000"/>
+            </a:srgbClr>
+          </a:solidFill>
+          <a:ln w="9525" cap="flat" cmpd="sng" algn="ctr">
+            <a:solidFill>
+              <a:srgbClr val="632523"/>
+            </a:solidFill>
+            <a:prstDash val="solid"/>
+          </a:ln>
+          <a:effectLst/>
+        </p:spPr>
+        <p:txBody>
+          <a:bodyPr rtlCol="0" anchor="ctr"/>
+          <a:lstStyle/>
+          <a:p>
+            <a:pPr marL="0" marR="0" lvl="0" indent="0" algn="ctr" defTabSz="457200" eaLnBrk="1" fontAlgn="auto" latinLnBrk="0" hangingPunct="1">
+              <a:lnSpc>
+                <a:spcPct val="100000"/>
+              </a:lnSpc>
+              <a:spcBef>
+                <a:spcPts val="0"/>
+              </a:spcBef>
+              <a:spcAft>
+                <a:spcPts val="0"/>
+              </a:spcAft>
+              <a:buClrTx/>
+              <a:buSzTx/>
+              <a:buFontTx/>
+              <a:buNone/>
+              <a:tabLst/>
+              <a:defRPr/>
+            </a:pPr>
+            <a:r>
+              <a:rPr kumimoji="0" lang="en-US" sz="1600" b="1" i="0" u="none" strike="noStrike" kern="0" cap="none" spc="0" normalizeH="0" baseline="0" noProof="0" dirty="0" smtClean="0">
+                <a:ln>
+                  <a:noFill/>
+                </a:ln>
+                <a:solidFill>
+                  <a:prstClr val="white"/>
+                </a:solidFill>
+                <a:effectLst/>
+                <a:uLnTx/>
+                <a:uFillTx/>
+                <a:latin typeface="Calibri"/>
+                <a:ea typeface=""/>
+                <a:cs typeface=""/>
+              </a:rPr>
+              <a:t>PCA</a:t>
+            </a:r>
+          </a:p>
+        </p:txBody>
+      </p:sp>
+      <p:cxnSp>
+        <p:nvCxnSpPr>
+          <p:cNvPr id="118" name="Elbow Connector 117"/>
+          <p:cNvCxnSpPr/>
+          <p:nvPr/>
+        </p:nvCxnSpPr>
+        <p:spPr>
+          <a:xfrm rot="16200000" flipH="1">
+            <a:off x="6570584" y="8351791"/>
+            <a:ext cx="364147" cy="1702"/>
+          </a:xfrm>
+          <a:prstGeom prst="bentConnector3">
+            <a:avLst/>
+          </a:prstGeom>
+          <a:noFill/>
+          <a:ln w="25400" cap="flat" cmpd="sng" algn="ctr">
+            <a:solidFill>
+              <a:sysClr val="windowText" lastClr="000000"/>
+            </a:solidFill>
+            <a:prstDash val="solid"/>
+            <a:tailEnd type="triangle"/>
+          </a:ln>
+          <a:effectLst/>
+        </p:spPr>
+      </p:cxnSp>
+      <p:cxnSp>
+        <p:nvCxnSpPr>
+          <p:cNvPr id="119" name="Elbow Connector 118"/>
+          <p:cNvCxnSpPr/>
+          <p:nvPr/>
+        </p:nvCxnSpPr>
+        <p:spPr>
+          <a:xfrm flipV="1">
+            <a:off x="7702164" y="8974251"/>
+            <a:ext cx="630075" cy="0"/>
+          </a:xfrm>
+          <a:prstGeom prst="bentConnector3">
+            <a:avLst/>
+          </a:prstGeom>
+          <a:noFill/>
+          <a:ln w="25400" cap="flat" cmpd="sng" algn="ctr">
+            <a:solidFill>
+              <a:srgbClr val="000000"/>
+            </a:solidFill>
+            <a:prstDash val="solid"/>
+            <a:headEnd type="none"/>
+            <a:tailEnd type="triangle"/>
+          </a:ln>
+          <a:effectLst/>
+        </p:spPr>
+      </p:cxnSp>
+      <p:cxnSp>
+        <p:nvCxnSpPr>
+          <p:cNvPr id="120" name="Elbow Connector 119"/>
+          <p:cNvCxnSpPr>
+            <a:endCxn id="90" idx="0"/>
+          </p:cNvCxnSpPr>
+          <p:nvPr/>
+        </p:nvCxnSpPr>
+        <p:spPr>
+          <a:xfrm rot="5400000">
+            <a:off x="6058564" y="10021799"/>
+            <a:ext cx="1389888" cy="0"/>
+          </a:xfrm>
+          <a:prstGeom prst="bentConnector3">
+            <a:avLst>
+              <a:gd name="adj1" fmla="val 50000"/>
+            </a:avLst>
+          </a:prstGeom>
+          <a:ln w="19050">
+            <a:tailEnd type="triangle"/>
+          </a:ln>
+        </p:spPr>
+        <p:style>
+          <a:lnRef idx="3">
+            <a:schemeClr val="dk1"/>
+          </a:lnRef>
+          <a:fillRef idx="0">
+            <a:schemeClr val="dk1"/>
+          </a:fillRef>
+          <a:effectRef idx="2">
+            <a:schemeClr val="dk1"/>
+          </a:effectRef>
+          <a:fontRef idx="minor">
+            <a:schemeClr val="tx1"/>
+          </a:fontRef>
+        </p:style>
+      </p:cxnSp>
+      <p:cxnSp>
+        <p:nvCxnSpPr>
+          <p:cNvPr id="122" name="Elbow Connector 121"/>
+          <p:cNvCxnSpPr>
+            <a:stCxn id="116" idx="4"/>
+            <a:endCxn id="69" idx="4"/>
+          </p:cNvCxnSpPr>
+          <p:nvPr/>
+        </p:nvCxnSpPr>
+        <p:spPr>
+          <a:xfrm rot="5400000" flipH="1" flipV="1">
+            <a:off x="5707563" y="8829134"/>
+            <a:ext cx="199270" cy="6429807"/>
+          </a:xfrm>
+          <a:prstGeom prst="bentConnector3">
+            <a:avLst>
+              <a:gd name="adj1" fmla="val -428099"/>
+            </a:avLst>
+          </a:prstGeom>
+          <a:noFill/>
+          <a:ln w="25400" cap="flat" cmpd="sng" algn="ctr">
+            <a:solidFill>
+              <a:sysClr val="windowText" lastClr="000000"/>
+            </a:solidFill>
+            <a:prstDash val="solid"/>
+            <a:tailEnd type="triangle"/>
+          </a:ln>
+          <a:effectLst/>
+        </p:spPr>
+      </p:cxnSp>
+      <p:cxnSp>
+        <p:nvCxnSpPr>
+          <p:cNvPr id="917" name="Elbow Connector 916"/>
+          <p:cNvCxnSpPr>
+            <a:stCxn id="67" idx="3"/>
+            <a:endCxn id="64" idx="1"/>
+          </p:cNvCxnSpPr>
+          <p:nvPr/>
+        </p:nvCxnSpPr>
+        <p:spPr>
+          <a:xfrm flipV="1">
+            <a:off x="74579" y="4348929"/>
+            <a:ext cx="1447690" cy="6399"/>
+          </a:xfrm>
+          <a:prstGeom prst="bentConnector3">
+            <a:avLst>
+              <a:gd name="adj1" fmla="val 50000"/>
+            </a:avLst>
+          </a:prstGeom>
+          <a:noFill/>
+          <a:ln w="25400" cap="flat" cmpd="sng" algn="ctr">
+            <a:solidFill>
+              <a:sysClr val="windowText" lastClr="000000"/>
+            </a:solidFill>
+            <a:prstDash val="solid"/>
+            <a:tailEnd type="triangle"/>
+          </a:ln>
+          <a:effectLst/>
+        </p:spPr>
+      </p:cxnSp>
+      <p:grpSp>
+        <p:nvGrpSpPr>
+          <p:cNvPr id="1490" name="Group 1489"/>
+          <p:cNvGrpSpPr/>
+          <p:nvPr/>
+        </p:nvGrpSpPr>
+        <p:grpSpPr>
+          <a:xfrm>
+            <a:off x="136588" y="5762933"/>
+            <a:ext cx="4432034" cy="6380740"/>
+            <a:chOff x="136588" y="5762933"/>
+            <a:chExt cx="4432034" cy="6380740"/>
+          </a:xfrm>
+        </p:grpSpPr>
+        <p:grpSp>
+          <p:nvGrpSpPr>
+            <p:cNvPr id="97" name="Group 96"/>
+            <p:cNvGrpSpPr/>
+            <p:nvPr/>
+          </p:nvGrpSpPr>
+          <p:grpSpPr>
+            <a:xfrm>
+              <a:off x="1344428" y="6283837"/>
+              <a:ext cx="1960384" cy="857644"/>
+              <a:chOff x="1041919" y="3762817"/>
+              <a:chExt cx="1876606" cy="857644"/>
+            </a:xfrm>
+          </p:grpSpPr>
+          <p:sp>
+            <p:nvSpPr>
+              <p:cNvPr id="98" name="Alternate Process 97"/>
+              <p:cNvSpPr/>
+              <p:nvPr/>
+            </p:nvSpPr>
+            <p:spPr>
+              <a:xfrm>
+                <a:off x="1282990" y="3840883"/>
+                <a:ext cx="1635535" cy="659955"/>
+              </a:xfrm>
+              <a:prstGeom prst="flowChartAlternateProcess">
+                <a:avLst/>
+              </a:prstGeom>
+              <a:solidFill>
+                <a:srgbClr val="9BBB59">
+                  <a:lumMod val="75000"/>
+                </a:srgbClr>
+              </a:solidFill>
+              <a:ln w="9525" cap="flat" cmpd="sng" algn="ctr">
+                <a:solidFill>
+                  <a:srgbClr val="9BBB59">
+                    <a:shade val="95000"/>
+                    <a:satMod val="105000"/>
+                  </a:srgbClr>
+                </a:solidFill>
+                <a:prstDash val="solid"/>
+              </a:ln>
+              <a:effectLst/>
+            </p:spPr>
+            <p:txBody>
+              <a:bodyPr lIns="0" rIns="0" rtlCol="0" anchor="ctr"/>
+              <a:lstStyle/>
+              <a:p>
+                <a:pPr marL="0" marR="0" lvl="0" indent="0" algn="ctr" defTabSz="457200" eaLnBrk="1" fontAlgn="auto" latinLnBrk="0" hangingPunct="1">
+                  <a:lnSpc>
+                    <a:spcPct val="100000"/>
+                  </a:lnSpc>
+                  <a:spcBef>
+                    <a:spcPts val="0"/>
+                  </a:spcBef>
+                  <a:spcAft>
+                    <a:spcPts val="0"/>
+                  </a:spcAft>
+                  <a:buClrTx/>
+                  <a:buSzTx/>
+                  <a:buFontTx/>
+                  <a:buNone/>
+                  <a:tabLst/>
+                  <a:defRPr/>
+                </a:pPr>
+                <a:r>
+                  <a:rPr kumimoji="0" lang="en-US" sz="1400" b="1" i="0" u="none" strike="noStrike" kern="0" cap="none" spc="0" normalizeH="0" baseline="0" noProof="0" dirty="0" smtClean="0">
+                    <a:ln>
+                      <a:noFill/>
+                    </a:ln>
+                    <a:solidFill>
+                      <a:prstClr val="white"/>
+                    </a:solidFill>
+                    <a:effectLst/>
+                    <a:uLnTx/>
+                    <a:uFillTx/>
+                    <a:latin typeface="Calibri"/>
+                    <a:ea typeface=""/>
+                    <a:cs typeface=""/>
+                  </a:rPr>
+                  <a:t>Training set</a:t>
+                </a:r>
+                <a:br>
+                  <a:rPr kumimoji="0" lang="en-US" sz="1400" b="1" i="0" u="none" strike="noStrike" kern="0" cap="none" spc="0" normalizeH="0" baseline="0" noProof="0" dirty="0" smtClean="0">
+                    <a:ln>
+                      <a:noFill/>
+                    </a:ln>
+                    <a:solidFill>
+                      <a:prstClr val="white"/>
+                    </a:solidFill>
+                    <a:effectLst/>
+                    <a:uLnTx/>
+                    <a:uFillTx/>
+                    <a:latin typeface="Calibri"/>
+                    <a:ea typeface=""/>
+                    <a:cs typeface=""/>
+                  </a:rPr>
+                </a:br>
+                <a:r>
+                  <a:rPr kumimoji="0" lang="en-US" sz="1400" b="1" i="0" u="none" strike="noStrike" kern="0" cap="none" spc="0" normalizeH="0" baseline="0" noProof="0" dirty="0" smtClean="0">
+                    <a:ln>
+                      <a:noFill/>
+                    </a:ln>
+                    <a:solidFill>
+                      <a:prstClr val="white"/>
+                    </a:solidFill>
+                    <a:effectLst/>
+                    <a:uLnTx/>
+                    <a:uFillTx/>
+                    <a:latin typeface="Calibri"/>
+                    <a:ea typeface=""/>
+                    <a:cs typeface=""/>
+                  </a:rPr>
+                  <a:t>80%</a:t>
+                </a:r>
+              </a:p>
+            </p:txBody>
+          </p:sp>
+          <p:sp>
+            <p:nvSpPr>
+              <p:cNvPr id="99" name="Rectangle 98"/>
+              <p:cNvSpPr/>
+              <p:nvPr/>
+            </p:nvSpPr>
+            <p:spPr>
+              <a:xfrm rot="16200000">
+                <a:off x="734482" y="4070254"/>
+                <a:ext cx="857644" cy="242770"/>
+              </a:xfrm>
+              <a:prstGeom prst="rect">
+                <a:avLst/>
+              </a:prstGeom>
+              <a:solidFill>
+                <a:srgbClr val="9BBB59">
+                  <a:lumMod val="50000"/>
+                </a:srgbClr>
+              </a:solidFill>
+              <a:ln w="9525" cap="flat" cmpd="sng" algn="ctr">
+                <a:noFill/>
+                <a:prstDash val="solid"/>
+              </a:ln>
+              <a:effectLst>
+                <a:outerShdw blurRad="40000" dist="23000" dir="5400000" rotWithShape="0">
+                  <a:srgbClr val="000000">
+                    <a:alpha val="35000"/>
+                  </a:srgbClr>
+                </a:outerShdw>
+              </a:effectLst>
+            </p:spPr>
+            <p:txBody>
+              <a:bodyPr rtlCol="0" anchor="ctr"/>
+              <a:lstStyle/>
+              <a:p>
+                <a:pPr marL="0" marR="0" lvl="0" indent="0" algn="ctr" defTabSz="914360" eaLnBrk="1" fontAlgn="auto" latinLnBrk="0" hangingPunct="1">
+                  <a:lnSpc>
+                    <a:spcPct val="100000"/>
+                  </a:lnSpc>
+                  <a:spcBef>
+                    <a:spcPts val="0"/>
+                  </a:spcBef>
+                  <a:spcAft>
+                    <a:spcPts val="0"/>
+                  </a:spcAft>
+                  <a:buClrTx/>
+                  <a:buSzTx/>
+                  <a:buFontTx/>
+                  <a:buNone/>
+                  <a:tabLst/>
+                  <a:defRPr/>
+                </a:pPr>
+                <a:r>
+                  <a:rPr kumimoji="0" lang="en-US" sz="1050" b="1" i="0" u="none" strike="noStrike" kern="0" cap="none" spc="0" normalizeH="0" baseline="0" noProof="0" dirty="0" smtClean="0">
+                    <a:ln>
+                      <a:noFill/>
+                    </a:ln>
+                    <a:solidFill>
+                      <a:prstClr val="white"/>
+                    </a:solidFill>
+                    <a:effectLst/>
+                    <a:uLnTx/>
+                    <a:uFillTx/>
+                    <a:latin typeface="Andale Mono" charset="0"/>
+                    <a:ea typeface="Andale Mono" charset="0"/>
+                    <a:cs typeface="Andale Mono" charset="0"/>
+                  </a:rPr>
+                  <a:t>Labels</a:t>
+                </a:r>
+              </a:p>
+            </p:txBody>
+          </p:sp>
+        </p:grpSp>
+        <p:sp>
+          <p:nvSpPr>
+            <p:cNvPr id="101" name="Alternate Process 100"/>
+            <p:cNvSpPr/>
+            <p:nvPr/>
+          </p:nvSpPr>
+          <p:spPr>
+            <a:xfrm>
+              <a:off x="1225297" y="7561311"/>
+              <a:ext cx="2312422" cy="706377"/>
+            </a:xfrm>
+            <a:prstGeom prst="flowChartAlternateProcess">
+              <a:avLst/>
+            </a:prstGeom>
+            <a:solidFill>
+              <a:srgbClr val="C0504D">
+                <a:lumMod val="75000"/>
+              </a:srgbClr>
+            </a:solidFill>
+            <a:ln w="9525" cap="flat" cmpd="sng" algn="ctr">
+              <a:solidFill>
+                <a:srgbClr val="632523"/>
+              </a:solidFill>
+              <a:prstDash val="solid"/>
+            </a:ln>
+            <a:effectLst/>
+          </p:spPr>
+          <p:txBody>
+            <a:bodyPr lIns="0" rIns="0" rtlCol="0" anchor="ctr"/>
+            <a:lstStyle/>
+            <a:p>
+              <a:pPr lvl="0" algn="ctr" defTabSz="457200">
+                <a:defRPr/>
+              </a:pPr>
+              <a:r>
+                <a:rPr lang="en-US" sz="1400" b="1" kern="0" dirty="0">
+                  <a:solidFill>
+                    <a:prstClr val="white"/>
+                  </a:solidFill>
+                </a:rPr>
+                <a:t>Semi-random data division</a:t>
+              </a:r>
+            </a:p>
+            <a:p>
+              <a:pPr lvl="0" algn="ctr" defTabSz="457200">
+                <a:defRPr/>
+              </a:pPr>
+              <a:r>
+                <a:rPr lang="en-US" sz="1400" b="1" kern="0" dirty="0">
+                  <a:solidFill>
+                    <a:prstClr val="white"/>
+                  </a:solidFill>
+                </a:rPr>
+                <a:t>(Protect </a:t>
+              </a:r>
+              <a:r>
+                <a:rPr lang="en-US" sz="1400" b="1" kern="0" dirty="0" smtClean="0">
+                  <a:solidFill>
+                    <a:prstClr val="white"/>
+                  </a:solidFill>
+                </a:rPr>
+                <a:t>sub-sample </a:t>
+              </a:r>
+              <a:r>
+                <a:rPr lang="en-US" sz="1400" b="1" kern="0" dirty="0">
+                  <a:solidFill>
+                    <a:prstClr val="white"/>
+                  </a:solidFill>
+                </a:rPr>
+                <a:t>ratios)</a:t>
+              </a:r>
+              <a:endParaRPr lang="en-US" sz="1400" kern="0" dirty="0">
+                <a:solidFill>
+                  <a:prstClr val="white"/>
+                </a:solidFill>
+              </a:endParaRPr>
+            </a:p>
+          </p:txBody>
+        </p:sp>
+        <p:sp>
+          <p:nvSpPr>
+            <p:cNvPr id="102" name="Oval 101"/>
+            <p:cNvSpPr>
+              <a:spLocks noChangeAspect="1"/>
+            </p:cNvSpPr>
+            <p:nvPr/>
+          </p:nvSpPr>
+          <p:spPr>
+            <a:xfrm>
+              <a:off x="2119187" y="9692375"/>
+              <a:ext cx="1097280" cy="1101599"/>
+            </a:xfrm>
+            <a:prstGeom prst="ellipse">
+              <a:avLst/>
+            </a:prstGeom>
+            <a:solidFill>
+              <a:srgbClr val="4F81BD">
+                <a:lumMod val="40000"/>
+                <a:lumOff val="60000"/>
+              </a:srgbClr>
+            </a:solidFill>
+            <a:ln w="9525" cap="flat" cmpd="sng" algn="ctr">
+              <a:noFill/>
+              <a:prstDash val="solid"/>
+            </a:ln>
+            <a:effectLst/>
+          </p:spPr>
+          <p:txBody>
+            <a:bodyPr lIns="0" tIns="0" rIns="0" rtlCol="0" anchor="ctr"/>
+            <a:lstStyle/>
+            <a:p>
+              <a:pPr algn="ctr" defTabSz="914360">
+                <a:defRPr/>
+              </a:pPr>
+              <a:r>
+                <a:rPr kumimoji="0" lang="en-US" sz="1400" b="1" i="0" u="none" strike="noStrike" kern="0" cap="none" spc="0" normalizeH="0" baseline="0" noProof="0" dirty="0" smtClean="0">
+                  <a:ln>
+                    <a:noFill/>
+                  </a:ln>
+                  <a:solidFill>
+                    <a:prstClr val="black"/>
+                  </a:solidFill>
+                  <a:effectLst/>
+                  <a:uLnTx/>
+                  <a:uFillTx/>
+                  <a:latin typeface="Calibri"/>
+                  <a:ea typeface=""/>
+                  <a:cs typeface=""/>
+                </a:rPr>
+                <a:t>Model</a:t>
+              </a:r>
+              <a:endParaRPr kumimoji="0" lang="en-US" sz="1200" b="1" i="0" u="none" strike="noStrike" kern="0" cap="none" spc="0" normalizeH="0" baseline="-25000" noProof="0" dirty="0" smtClean="0">
+                <a:ln>
+                  <a:noFill/>
+                </a:ln>
+                <a:solidFill>
+                  <a:prstClr val="black"/>
+                </a:solidFill>
+                <a:effectLst/>
+                <a:uLnTx/>
+                <a:uFillTx/>
+                <a:latin typeface="Calibri"/>
+                <a:ea typeface=""/>
+                <a:cs typeface=""/>
+              </a:endParaRPr>
+            </a:p>
+          </p:txBody>
+        </p:sp>
+        <p:sp>
+          <p:nvSpPr>
+            <p:cNvPr id="103" name="Alternate Process 102"/>
+            <p:cNvSpPr/>
+            <p:nvPr/>
+          </p:nvSpPr>
+          <p:spPr>
+            <a:xfrm>
+              <a:off x="390196" y="8687518"/>
+              <a:ext cx="1330437" cy="830105"/>
+            </a:xfrm>
+            <a:prstGeom prst="flowChartAlternateProcess">
+              <a:avLst/>
+            </a:prstGeom>
+            <a:solidFill>
+              <a:srgbClr val="9BBB59">
+                <a:lumMod val="75000"/>
+              </a:srgbClr>
+            </a:solidFill>
+            <a:ln w="9525" cap="flat" cmpd="sng" algn="ctr">
+              <a:solidFill>
+                <a:srgbClr val="9BBB59">
+                  <a:shade val="95000"/>
+                  <a:satMod val="105000"/>
+                </a:srgbClr>
+              </a:solidFill>
+              <a:prstDash val="solid"/>
+            </a:ln>
+            <a:effectLst/>
+          </p:spPr>
+          <p:txBody>
+            <a:bodyPr lIns="0" rIns="91440" rtlCol="0" anchor="ctr"/>
+            <a:lstStyle/>
+            <a:p>
+              <a:pPr marL="0" marR="0" lvl="0" indent="0" algn="ctr" defTabSz="914360" eaLnBrk="1" fontAlgn="auto" latinLnBrk="0" hangingPunct="1">
+                <a:lnSpc>
+                  <a:spcPct val="100000"/>
+                </a:lnSpc>
+                <a:spcBef>
+                  <a:spcPts val="0"/>
+                </a:spcBef>
+                <a:spcAft>
+                  <a:spcPts val="0"/>
+                </a:spcAft>
+                <a:buClrTx/>
+                <a:buSzTx/>
+                <a:buFontTx/>
+                <a:buNone/>
+                <a:tabLst/>
+                <a:defRPr/>
+              </a:pPr>
+              <a:r>
+                <a:rPr kumimoji="0" lang="en-US" sz="1400" b="1" i="0" u="none" strike="noStrike" kern="0" cap="none" spc="0" normalizeH="0" baseline="0" noProof="0" dirty="0" smtClean="0">
+                  <a:ln>
+                    <a:noFill/>
+                  </a:ln>
+                  <a:solidFill>
+                    <a:prstClr val="white"/>
+                  </a:solidFill>
+                  <a:effectLst/>
+                  <a:uLnTx/>
+                  <a:uFillTx/>
+                  <a:latin typeface="Calibri"/>
+                  <a:ea typeface=""/>
+                  <a:cs typeface=""/>
+                </a:rPr>
+                <a:t>Training set</a:t>
+              </a:r>
+              <a:br>
+                <a:rPr kumimoji="0" lang="en-US" sz="1400" b="1" i="0" u="none" strike="noStrike" kern="0" cap="none" spc="0" normalizeH="0" baseline="0" noProof="0" dirty="0" smtClean="0">
+                  <a:ln>
+                    <a:noFill/>
+                  </a:ln>
+                  <a:solidFill>
+                    <a:prstClr val="white"/>
+                  </a:solidFill>
+                  <a:effectLst/>
+                  <a:uLnTx/>
+                  <a:uFillTx/>
+                  <a:latin typeface="Calibri"/>
+                  <a:ea typeface=""/>
+                  <a:cs typeface=""/>
+                </a:rPr>
+              </a:br>
+              <a:r>
+                <a:rPr kumimoji="0" lang="en-US" sz="1400" b="1" i="0" u="none" strike="noStrike" kern="0" cap="none" spc="0" normalizeH="0" baseline="0" noProof="0" dirty="0" smtClean="0">
+                  <a:ln>
+                    <a:noFill/>
+                  </a:ln>
+                  <a:solidFill>
+                    <a:prstClr val="white"/>
+                  </a:solidFill>
+                  <a:effectLst/>
+                  <a:uLnTx/>
+                  <a:uFillTx/>
+                  <a:latin typeface="Calibri"/>
+                  <a:ea typeface=""/>
+                  <a:cs typeface=""/>
+                </a:rPr>
+                <a:t>60%</a:t>
+              </a:r>
+            </a:p>
+          </p:txBody>
+        </p:sp>
+        <p:sp>
+          <p:nvSpPr>
+            <p:cNvPr id="104" name="Alternate Process 103"/>
+            <p:cNvSpPr/>
+            <p:nvPr/>
+          </p:nvSpPr>
+          <p:spPr>
+            <a:xfrm>
+              <a:off x="3028571" y="8687518"/>
+              <a:ext cx="1192313" cy="819181"/>
+            </a:xfrm>
+            <a:prstGeom prst="flowChartAlternateProcess">
+              <a:avLst/>
+            </a:prstGeom>
+            <a:solidFill>
+              <a:srgbClr val="9BBB59">
+                <a:lumMod val="75000"/>
+              </a:srgbClr>
+            </a:solidFill>
+            <a:ln w="9525" cap="flat" cmpd="sng" algn="ctr">
+              <a:solidFill>
+                <a:srgbClr val="9BBB59">
+                  <a:shade val="95000"/>
+                  <a:satMod val="105000"/>
+                </a:srgbClr>
+              </a:solidFill>
+              <a:prstDash val="solid"/>
+            </a:ln>
+            <a:effectLst/>
+          </p:spPr>
+          <p:txBody>
+            <a:bodyPr rtlCol="0" anchor="ctr"/>
+            <a:lstStyle/>
+            <a:p>
+              <a:pPr marL="0" marR="0" lvl="0" indent="0" algn="ctr" defTabSz="914360" eaLnBrk="1" fontAlgn="auto" latinLnBrk="0" hangingPunct="1">
+                <a:lnSpc>
+                  <a:spcPct val="100000"/>
+                </a:lnSpc>
+                <a:spcBef>
+                  <a:spcPts val="0"/>
+                </a:spcBef>
+                <a:spcAft>
+                  <a:spcPts val="0"/>
+                </a:spcAft>
+                <a:buClrTx/>
+                <a:buSzTx/>
+                <a:buFontTx/>
+                <a:buNone/>
+                <a:tabLst/>
+                <a:defRPr/>
+              </a:pPr>
+              <a:r>
+                <a:rPr kumimoji="0" lang="en-US" sz="1400" b="1" i="0" u="none" strike="noStrike" kern="0" cap="none" spc="0" normalizeH="0" baseline="0" noProof="0" dirty="0" smtClean="0">
+                  <a:ln>
+                    <a:noFill/>
+                  </a:ln>
+                  <a:solidFill>
+                    <a:prstClr val="white"/>
+                  </a:solidFill>
+                  <a:effectLst/>
+                  <a:uLnTx/>
+                  <a:uFillTx/>
+                  <a:latin typeface="Calibri"/>
+                  <a:ea typeface=""/>
+                  <a:cs typeface=""/>
+                </a:rPr>
+                <a:t>Tune set</a:t>
+              </a:r>
+              <a:br>
+                <a:rPr kumimoji="0" lang="en-US" sz="1400" b="1" i="0" u="none" strike="noStrike" kern="0" cap="none" spc="0" normalizeH="0" baseline="0" noProof="0" dirty="0" smtClean="0">
+                  <a:ln>
+                    <a:noFill/>
+                  </a:ln>
+                  <a:solidFill>
+                    <a:prstClr val="white"/>
+                  </a:solidFill>
+                  <a:effectLst/>
+                  <a:uLnTx/>
+                  <a:uFillTx/>
+                  <a:latin typeface="Calibri"/>
+                  <a:ea typeface=""/>
+                  <a:cs typeface=""/>
+                </a:rPr>
+              </a:br>
+              <a:r>
+                <a:rPr kumimoji="0" lang="en-US" sz="1400" b="1" i="0" u="none" strike="noStrike" kern="0" cap="none" spc="0" normalizeH="0" baseline="0" noProof="0" dirty="0" smtClean="0">
+                  <a:ln>
+                    <a:noFill/>
+                  </a:ln>
+                  <a:solidFill>
+                    <a:prstClr val="white"/>
+                  </a:solidFill>
+                  <a:effectLst/>
+                  <a:uLnTx/>
+                  <a:uFillTx/>
+                  <a:latin typeface="Calibri"/>
+                  <a:ea typeface=""/>
+                  <a:cs typeface=""/>
+                </a:rPr>
+                <a:t>20%</a:t>
+              </a:r>
+            </a:p>
+          </p:txBody>
+        </p:sp>
+        <p:sp>
+          <p:nvSpPr>
+            <p:cNvPr id="105" name="Alternate Process 104"/>
+            <p:cNvSpPr/>
+            <p:nvPr/>
+          </p:nvSpPr>
+          <p:spPr>
+            <a:xfrm>
+              <a:off x="150888" y="9850586"/>
+              <a:ext cx="1820537" cy="801746"/>
+            </a:xfrm>
+            <a:prstGeom prst="flowChartAlternateProcess">
+              <a:avLst/>
+            </a:prstGeom>
+            <a:solidFill>
+              <a:srgbClr val="C0504D">
+                <a:lumMod val="75000"/>
+              </a:srgbClr>
+            </a:solidFill>
+            <a:ln w="9525" cap="flat" cmpd="sng" algn="ctr">
+              <a:solidFill>
+                <a:srgbClr val="C0504D">
+                  <a:lumMod val="50000"/>
+                </a:srgbClr>
+              </a:solidFill>
+              <a:prstDash val="solid"/>
+            </a:ln>
+            <a:effectLst/>
+          </p:spPr>
+          <p:txBody>
+            <a:bodyPr lIns="0" rIns="0" rtlCol="0" anchor="ctr"/>
+            <a:lstStyle/>
+            <a:p>
+              <a:pPr marL="0" marR="0" lvl="0" indent="0" defTabSz="914360" eaLnBrk="1" fontAlgn="auto" latinLnBrk="0" hangingPunct="1">
+                <a:lnSpc>
+                  <a:spcPct val="100000"/>
+                </a:lnSpc>
+                <a:spcBef>
+                  <a:spcPts val="0"/>
+                </a:spcBef>
+                <a:spcAft>
+                  <a:spcPts val="0"/>
+                </a:spcAft>
+                <a:buClrTx/>
+                <a:buSzTx/>
+                <a:buFontTx/>
+                <a:buNone/>
+                <a:tabLst/>
+                <a:defRPr/>
+              </a:pPr>
+              <a:r>
+                <a:rPr lang="en-US" sz="1400" b="1" kern="0" dirty="0" smtClean="0">
+                  <a:solidFill>
+                    <a:prstClr val="white"/>
+                  </a:solidFill>
+                  <a:latin typeface="Calibri"/>
+                  <a:ea typeface=""/>
+                  <a:cs typeface=""/>
+                </a:rPr>
+                <a:t>3 SVM kernels or</a:t>
+              </a:r>
+              <a:r>
+                <a:rPr lang="en-US" sz="1400" b="1" kern="0" dirty="0">
+                  <a:solidFill>
+                    <a:prstClr val="white"/>
+                  </a:solidFill>
+                  <a:latin typeface="Calibri"/>
+                  <a:ea typeface=""/>
+                  <a:cs typeface=""/>
+                </a:rPr>
+                <a:t> </a:t>
+              </a:r>
+              <a:r>
+                <a:rPr lang="en-US" sz="1400" b="1" kern="0" dirty="0" smtClean="0">
+                  <a:solidFill>
+                    <a:prstClr val="white"/>
+                  </a:solidFill>
+                  <a:latin typeface="Calibri"/>
+                  <a:ea typeface=""/>
+                  <a:cs typeface=""/>
+                </a:rPr>
+                <a:t>RF</a:t>
+              </a:r>
+            </a:p>
+            <a:p>
+              <a:pPr marL="0" marR="0" lvl="0" indent="0" defTabSz="914360" eaLnBrk="1" fontAlgn="auto" latinLnBrk="0" hangingPunct="1">
+                <a:lnSpc>
+                  <a:spcPct val="100000"/>
+                </a:lnSpc>
+                <a:spcBef>
+                  <a:spcPts val="0"/>
+                </a:spcBef>
+                <a:spcAft>
+                  <a:spcPts val="0"/>
+                </a:spcAft>
+                <a:buClrTx/>
+                <a:buSzTx/>
+                <a:buFontTx/>
+                <a:buNone/>
+                <a:tabLst/>
+                <a:defRPr/>
+              </a:pPr>
+              <a:r>
+                <a:rPr kumimoji="0" lang="en-US" sz="1400" i="0" u="none" strike="noStrike" kern="0" cap="none" spc="0" normalizeH="0" baseline="0" noProof="0" dirty="0" smtClean="0">
+                  <a:ln>
+                    <a:noFill/>
+                  </a:ln>
+                  <a:solidFill>
+                    <a:prstClr val="white"/>
+                  </a:solidFill>
+                  <a:effectLst/>
+                  <a:uLnTx/>
+                  <a:uFillTx/>
+                  <a:latin typeface="Calibri"/>
+                  <a:ea typeface=""/>
+                  <a:cs typeface=""/>
+                </a:rPr>
+                <a:t>Class weight normalization</a:t>
+              </a:r>
+            </a:p>
+          </p:txBody>
+        </p:sp>
+        <p:sp>
+          <p:nvSpPr>
+            <p:cNvPr id="106" name="Alternate Process 105"/>
+            <p:cNvSpPr/>
+            <p:nvPr/>
+          </p:nvSpPr>
+          <p:spPr>
+            <a:xfrm>
+              <a:off x="3373472" y="9888437"/>
+              <a:ext cx="1195150" cy="690931"/>
+            </a:xfrm>
+            <a:prstGeom prst="flowChartAlternateProcess">
+              <a:avLst/>
+            </a:prstGeom>
+            <a:solidFill>
+              <a:srgbClr val="9BBB59">
+                <a:lumMod val="75000"/>
+              </a:srgbClr>
+            </a:solidFill>
+            <a:ln w="9525" cap="flat" cmpd="sng" algn="ctr">
+              <a:solidFill>
+                <a:srgbClr val="9BBB59">
+                  <a:shade val="95000"/>
+                  <a:satMod val="105000"/>
+                </a:srgbClr>
+              </a:solidFill>
+              <a:prstDash val="solid"/>
+            </a:ln>
+            <a:effectLst/>
+          </p:spPr>
+          <p:txBody>
+            <a:bodyPr lIns="0" rIns="0" rtlCol="0" anchor="ctr"/>
+            <a:lstStyle/>
+            <a:p>
+              <a:pPr marL="0" marR="0" lvl="0" indent="0" algn="ctr" defTabSz="914360" eaLnBrk="1" fontAlgn="auto" latinLnBrk="0" hangingPunct="1">
+                <a:lnSpc>
+                  <a:spcPct val="100000"/>
+                </a:lnSpc>
+                <a:spcBef>
+                  <a:spcPts val="0"/>
+                </a:spcBef>
+                <a:spcAft>
+                  <a:spcPts val="0"/>
+                </a:spcAft>
+                <a:buClrTx/>
+                <a:buSzTx/>
+                <a:buFontTx/>
+                <a:buNone/>
+                <a:tabLst/>
+                <a:defRPr/>
+              </a:pPr>
+              <a:r>
+                <a:rPr kumimoji="0" lang="en-US" sz="1400" b="1" i="0" u="none" strike="noStrike" kern="0" cap="none" spc="0" normalizeH="0" baseline="0" noProof="0" dirty="0" smtClean="0">
+                  <a:ln>
+                    <a:noFill/>
+                  </a:ln>
+                  <a:solidFill>
+                    <a:prstClr val="white"/>
+                  </a:solidFill>
+                  <a:effectLst/>
+                  <a:uLnTx/>
+                  <a:uFillTx/>
+                  <a:latin typeface="Calibri"/>
+                  <a:ea typeface=""/>
+                  <a:cs typeface=""/>
+                </a:rPr>
+                <a:t>Parameter dependent prediction</a:t>
+              </a:r>
+            </a:p>
+          </p:txBody>
+        </p:sp>
+        <p:cxnSp>
+          <p:nvCxnSpPr>
+            <p:cNvPr id="107" name="Straight Arrow Connector 106"/>
+            <p:cNvCxnSpPr/>
+            <p:nvPr/>
+          </p:nvCxnSpPr>
+          <p:spPr>
+            <a:xfrm flipH="1">
+              <a:off x="2360614" y="7021858"/>
+              <a:ext cx="0" cy="539453"/>
+            </a:xfrm>
+            <a:prstGeom prst="straightConnector1">
+              <a:avLst/>
+            </a:prstGeom>
+            <a:noFill/>
+            <a:ln w="25400" cap="flat" cmpd="sng" algn="ctr">
+              <a:solidFill>
+                <a:sysClr val="windowText" lastClr="000000"/>
+              </a:solidFill>
+              <a:prstDash val="solid"/>
+              <a:tailEnd type="triangle"/>
+            </a:ln>
+            <a:effectLst/>
+          </p:spPr>
+        </p:cxnSp>
+        <p:cxnSp>
+          <p:nvCxnSpPr>
+            <p:cNvPr id="108" name="Straight Arrow Connector 107"/>
+            <p:cNvCxnSpPr/>
+            <p:nvPr/>
+          </p:nvCxnSpPr>
+          <p:spPr>
+            <a:xfrm flipH="1">
+              <a:off x="960574" y="9517623"/>
+              <a:ext cx="6978" cy="332963"/>
+            </a:xfrm>
+            <a:prstGeom prst="straightConnector1">
+              <a:avLst/>
+            </a:prstGeom>
+            <a:noFill/>
+            <a:ln w="25400" cap="flat" cmpd="sng" algn="ctr">
+              <a:solidFill>
+                <a:sysClr val="windowText" lastClr="000000"/>
+              </a:solidFill>
+              <a:prstDash val="solid"/>
+              <a:tailEnd type="triangle"/>
+            </a:ln>
+            <a:effectLst/>
+          </p:spPr>
+        </p:cxnSp>
+        <p:cxnSp>
+          <p:nvCxnSpPr>
+            <p:cNvPr id="111" name="Straight Arrow Connector 110"/>
+            <p:cNvCxnSpPr/>
+            <p:nvPr/>
+          </p:nvCxnSpPr>
+          <p:spPr>
+            <a:xfrm>
+              <a:off x="1965728" y="10227810"/>
+              <a:ext cx="153459" cy="0"/>
+            </a:xfrm>
+            <a:prstGeom prst="straightConnector1">
+              <a:avLst/>
+            </a:prstGeom>
+            <a:noFill/>
+            <a:ln w="25400" cap="flat" cmpd="sng" algn="ctr">
+              <a:solidFill>
+                <a:sysClr val="windowText" lastClr="000000"/>
+              </a:solidFill>
+              <a:prstDash val="solid"/>
+              <a:tailEnd type="triangle"/>
+            </a:ln>
+            <a:effectLst/>
+          </p:spPr>
+        </p:cxnSp>
+        <p:cxnSp>
+          <p:nvCxnSpPr>
+            <p:cNvPr id="112" name="Straight Arrow Connector 111"/>
+            <p:cNvCxnSpPr/>
+            <p:nvPr/>
+          </p:nvCxnSpPr>
+          <p:spPr>
+            <a:xfrm flipV="1">
+              <a:off x="3216467" y="10227810"/>
+              <a:ext cx="180579" cy="0"/>
+            </a:xfrm>
+            <a:prstGeom prst="straightConnector1">
+              <a:avLst/>
+            </a:prstGeom>
+            <a:noFill/>
+            <a:ln w="25400" cap="flat" cmpd="sng" algn="ctr">
+              <a:solidFill>
+                <a:sysClr val="windowText" lastClr="000000"/>
+              </a:solidFill>
+              <a:prstDash val="solid"/>
+              <a:tailEnd type="triangle"/>
+            </a:ln>
+            <a:effectLst/>
+          </p:spPr>
+        </p:cxnSp>
+        <p:cxnSp>
+          <p:nvCxnSpPr>
+            <p:cNvPr id="113" name="Elbow Connector 112"/>
+            <p:cNvCxnSpPr>
+              <a:stCxn id="112" idx="2"/>
+            </p:cNvCxnSpPr>
+            <p:nvPr/>
+          </p:nvCxnSpPr>
+          <p:spPr>
+            <a:xfrm rot="5400000">
+              <a:off x="3053440" y="9121087"/>
+              <a:ext cx="185676" cy="956901"/>
+            </a:xfrm>
+            <a:prstGeom prst="bentConnector3">
+              <a:avLst>
+                <a:gd name="adj1" fmla="val 50000"/>
+              </a:avLst>
+            </a:prstGeom>
+            <a:noFill/>
+            <a:ln w="25400" cap="flat" cmpd="sng" algn="ctr">
+              <a:solidFill>
+                <a:sysClr val="windowText" lastClr="000000"/>
+              </a:solidFill>
+              <a:prstDash val="solid"/>
+              <a:tailEnd type="triangle"/>
+            </a:ln>
+            <a:effectLst/>
+          </p:spPr>
+        </p:cxnSp>
+        <p:sp>
+          <p:nvSpPr>
+            <p:cNvPr id="114" name="Right Brace 113"/>
+            <p:cNvSpPr/>
+            <p:nvPr/>
+          </p:nvSpPr>
+          <p:spPr>
+            <a:xfrm rot="5400000">
+              <a:off x="2397560" y="8903653"/>
+              <a:ext cx="389471" cy="3952651"/>
+            </a:xfrm>
+            <a:prstGeom prst="rightBrace">
+              <a:avLst>
+                <a:gd name="adj1" fmla="val 38126"/>
+                <a:gd name="adj2" fmla="val 50025"/>
+              </a:avLst>
+            </a:prstGeom>
+            <a:noFill/>
+            <a:ln w="38100" cap="flat" cmpd="sng" algn="ctr">
+              <a:solidFill>
+                <a:sysClr val="windowText" lastClr="000000"/>
+              </a:solidFill>
+              <a:prstDash val="solid"/>
+            </a:ln>
+            <a:effectLst/>
+          </p:spPr>
+          <p:txBody>
+            <a:bodyPr rtlCol="0" anchor="ctr"/>
+            <a:lstStyle/>
+            <a:p>
+              <a:pPr marL="0" marR="0" lvl="0" indent="0" algn="ctr" defTabSz="914360" eaLnBrk="1" fontAlgn="auto" latinLnBrk="0" hangingPunct="1">
+                <a:lnSpc>
+                  <a:spcPct val="100000"/>
+                </a:lnSpc>
+                <a:spcBef>
+                  <a:spcPts val="0"/>
+                </a:spcBef>
+                <a:spcAft>
+                  <a:spcPts val="0"/>
+                </a:spcAft>
+                <a:buClrTx/>
+                <a:buSzTx/>
+                <a:buFontTx/>
+                <a:buNone/>
+                <a:tabLst/>
+                <a:defRPr/>
+              </a:pPr>
+              <a:endParaRPr kumimoji="0" lang="en-US" sz="1800" b="0" i="0" u="none" strike="noStrike" kern="0" cap="none" spc="0" normalizeH="0" baseline="0" noProof="0" smtClean="0">
+                <a:ln>
+                  <a:noFill/>
+                </a:ln>
+                <a:solidFill>
+                  <a:prstClr val="black"/>
+                </a:solidFill>
+                <a:effectLst/>
+                <a:uLnTx/>
+                <a:uFillTx/>
+                <a:latin typeface="Calibri"/>
+                <a:ea typeface=""/>
+                <a:cs typeface=""/>
+              </a:endParaRPr>
+            </a:p>
+          </p:txBody>
+        </p:sp>
+        <p:sp>
+          <p:nvSpPr>
+            <p:cNvPr id="115" name="TextBox 114"/>
+            <p:cNvSpPr txBox="1"/>
+            <p:nvPr/>
+          </p:nvSpPr>
+          <p:spPr>
+            <a:xfrm>
+              <a:off x="894201" y="5762933"/>
+              <a:ext cx="3186546" cy="400110"/>
+            </a:xfrm>
+            <a:prstGeom prst="rect">
+              <a:avLst/>
+            </a:prstGeom>
+            <a:noFill/>
+          </p:spPr>
+          <p:txBody>
+            <a:bodyPr wrap="square" rtlCol="0">
+              <a:spAutoFit/>
+            </a:bodyPr>
+            <a:lstStyle/>
+            <a:p>
+              <a:pPr marL="0" marR="0" lvl="0" indent="0" algn="ctr" defTabSz="914360" eaLnBrk="1" fontAlgn="auto" latinLnBrk="0" hangingPunct="1">
+                <a:lnSpc>
+                  <a:spcPct val="100000"/>
+                </a:lnSpc>
+                <a:spcBef>
+                  <a:spcPts val="0"/>
+                </a:spcBef>
+                <a:spcAft>
+                  <a:spcPts val="0"/>
+                </a:spcAft>
+                <a:buClrTx/>
+                <a:buSzTx/>
+                <a:buFontTx/>
+                <a:buNone/>
+                <a:tabLst/>
+                <a:defRPr/>
+              </a:pPr>
+              <a:r>
+                <a:rPr kumimoji="0" lang="en-US" sz="2000" b="1" i="0" u="sng" strike="noStrike" kern="0" cap="none" spc="0" normalizeH="0" baseline="0" noProof="0" dirty="0" smtClean="0">
+                  <a:ln>
+                    <a:noFill/>
+                  </a:ln>
+                  <a:solidFill>
+                    <a:prstClr val="black"/>
+                  </a:solidFill>
+                  <a:effectLst/>
+                  <a:uLnTx/>
+                  <a:uFillTx/>
+                </a:rPr>
+                <a:t>SVM Training with Tuning</a:t>
+              </a:r>
+            </a:p>
+          </p:txBody>
+        </p:sp>
+        <p:sp>
+          <p:nvSpPr>
+            <p:cNvPr id="116" name="Oval 115"/>
+            <p:cNvSpPr>
+              <a:spLocks noChangeAspect="1"/>
+            </p:cNvSpPr>
+            <p:nvPr/>
+          </p:nvSpPr>
+          <p:spPr>
+            <a:xfrm>
+              <a:off x="2112235" y="11180589"/>
+              <a:ext cx="960120" cy="963084"/>
+            </a:xfrm>
+            <a:prstGeom prst="ellipse">
+              <a:avLst/>
+            </a:prstGeom>
+            <a:solidFill>
+              <a:srgbClr val="FFC000"/>
+            </a:solidFill>
+            <a:ln w="9525" cap="flat" cmpd="sng" algn="ctr">
+              <a:noFill/>
+              <a:prstDash val="solid"/>
+            </a:ln>
+            <a:effectLst/>
+          </p:spPr>
+          <p:txBody>
+            <a:bodyPr rtlCol="0" anchor="ctr"/>
+            <a:lstStyle/>
+            <a:p>
+              <a:pPr marL="0" marR="0" lvl="0" indent="0" algn="ctr" defTabSz="914360" eaLnBrk="1" fontAlgn="auto" latinLnBrk="0" hangingPunct="1">
+                <a:lnSpc>
+                  <a:spcPct val="100000"/>
+                </a:lnSpc>
+                <a:spcBef>
+                  <a:spcPts val="0"/>
+                </a:spcBef>
+                <a:spcAft>
+                  <a:spcPts val="0"/>
+                </a:spcAft>
+                <a:buClrTx/>
+                <a:buSzTx/>
+                <a:buFontTx/>
+                <a:buNone/>
+                <a:tabLst/>
+                <a:defRPr/>
+              </a:pPr>
+              <a:r>
+                <a:rPr kumimoji="0" lang="en-US" sz="1400" b="1" i="0" u="none" strike="noStrike" kern="0" cap="none" spc="0" normalizeH="0" baseline="0" noProof="0" dirty="0" smtClean="0">
+                  <a:ln>
+                    <a:noFill/>
+                  </a:ln>
+                  <a:solidFill>
+                    <a:prstClr val="black"/>
+                  </a:solidFill>
+                  <a:effectLst/>
+                  <a:uLnTx/>
+                  <a:uFillTx/>
+                  <a:latin typeface="Calibri"/>
+                  <a:ea typeface=""/>
+                  <a:cs typeface=""/>
+                </a:rPr>
+                <a:t>Best</a:t>
+              </a:r>
+            </a:p>
+            <a:p>
+              <a:pPr marL="0" marR="0" lvl="0" indent="0" algn="ctr" defTabSz="914360" eaLnBrk="1" fontAlgn="auto" latinLnBrk="0" hangingPunct="1">
+                <a:lnSpc>
+                  <a:spcPct val="100000"/>
+                </a:lnSpc>
+                <a:spcBef>
+                  <a:spcPts val="0"/>
+                </a:spcBef>
+                <a:spcAft>
+                  <a:spcPts val="0"/>
+                </a:spcAft>
+                <a:buClrTx/>
+                <a:buSzTx/>
+                <a:buFontTx/>
+                <a:buNone/>
+                <a:tabLst/>
+                <a:defRPr/>
+              </a:pPr>
+              <a:r>
+                <a:rPr kumimoji="0" lang="en-US" sz="1400" b="1" i="0" u="none" strike="noStrike" kern="0" cap="none" spc="0" normalizeH="0" baseline="0" noProof="0" dirty="0" smtClean="0">
+                  <a:ln>
+                    <a:noFill/>
+                  </a:ln>
+                  <a:solidFill>
+                    <a:prstClr val="black"/>
+                  </a:solidFill>
+                  <a:effectLst/>
+                  <a:uLnTx/>
+                  <a:uFillTx/>
+                  <a:latin typeface="Calibri"/>
+                  <a:ea typeface=""/>
+                  <a:cs typeface=""/>
+                </a:rPr>
+                <a:t>Model</a:t>
+              </a:r>
+            </a:p>
+          </p:txBody>
+        </p:sp>
+        <p:cxnSp>
+          <p:nvCxnSpPr>
+            <p:cNvPr id="1261" name="Elbow Connector 1260"/>
+            <p:cNvCxnSpPr>
+              <a:stCxn id="101" idx="1"/>
+            </p:cNvCxnSpPr>
+            <p:nvPr/>
+          </p:nvCxnSpPr>
+          <p:spPr>
+            <a:xfrm rot="10800000" flipV="1">
+              <a:off x="980505" y="7914500"/>
+              <a:ext cx="244792" cy="773018"/>
+            </a:xfrm>
+            <a:prstGeom prst="bentConnector2">
+              <a:avLst/>
+            </a:prstGeom>
+            <a:noFill/>
+            <a:ln w="25400" cap="flat" cmpd="sng" algn="ctr">
+              <a:solidFill>
+                <a:sysClr val="windowText" lastClr="000000"/>
+              </a:solidFill>
+              <a:prstDash val="solid"/>
+              <a:tailEnd type="triangle"/>
+            </a:ln>
+            <a:effectLst/>
+          </p:spPr>
+        </p:cxnSp>
+        <p:cxnSp>
+          <p:nvCxnSpPr>
+            <p:cNvPr id="1478" name="Elbow Connector 1477"/>
+            <p:cNvCxnSpPr>
+              <a:stCxn id="101" idx="3"/>
+              <a:endCxn id="104" idx="0"/>
+            </p:cNvCxnSpPr>
+            <p:nvPr/>
+          </p:nvCxnSpPr>
+          <p:spPr>
+            <a:xfrm>
+              <a:off x="3537719" y="7914500"/>
+              <a:ext cx="87009" cy="773018"/>
+            </a:xfrm>
+            <a:prstGeom prst="bentConnector2">
+              <a:avLst/>
+            </a:prstGeom>
+            <a:noFill/>
+            <a:ln w="25400" cap="flat" cmpd="sng" algn="ctr">
+              <a:solidFill>
+                <a:sysClr val="windowText" lastClr="000000"/>
+              </a:solidFill>
+              <a:prstDash val="solid"/>
+              <a:tailEnd type="triangle"/>
+            </a:ln>
+            <a:effectLst/>
+          </p:spPr>
+        </p:cxnSp>
+        <p:sp>
+          <p:nvSpPr>
+            <p:cNvPr id="1482" name="Rectangle 1481"/>
+            <p:cNvSpPr/>
+            <p:nvPr/>
+          </p:nvSpPr>
+          <p:spPr>
+            <a:xfrm rot="16200000">
+              <a:off x="-165430" y="8989792"/>
+              <a:ext cx="857644" cy="253608"/>
+            </a:xfrm>
+            <a:prstGeom prst="rect">
+              <a:avLst/>
+            </a:prstGeom>
+            <a:solidFill>
+              <a:srgbClr val="9BBB59">
+                <a:lumMod val="50000"/>
+              </a:srgbClr>
+            </a:solidFill>
+            <a:ln w="9525" cap="flat" cmpd="sng" algn="ctr">
+              <a:noFill/>
+              <a:prstDash val="solid"/>
+            </a:ln>
+            <a:effectLst>
+              <a:outerShdw blurRad="40000" dist="23000" dir="5400000" rotWithShape="0">
+                <a:srgbClr val="000000">
+                  <a:alpha val="35000"/>
+                </a:srgbClr>
+              </a:outerShdw>
+            </a:effectLst>
+          </p:spPr>
+          <p:txBody>
+            <a:bodyPr rtlCol="0" anchor="ctr"/>
+            <a:lstStyle/>
+            <a:p>
+              <a:pPr marL="0" marR="0" lvl="0" indent="0" algn="ctr" defTabSz="914360" eaLnBrk="1" fontAlgn="auto" latinLnBrk="0" hangingPunct="1">
+                <a:lnSpc>
+                  <a:spcPct val="100000"/>
+                </a:lnSpc>
+                <a:spcBef>
+                  <a:spcPts val="0"/>
+                </a:spcBef>
+                <a:spcAft>
+                  <a:spcPts val="0"/>
+                </a:spcAft>
+                <a:buClrTx/>
+                <a:buSzTx/>
+                <a:buFontTx/>
+                <a:buNone/>
+                <a:tabLst/>
+                <a:defRPr/>
+              </a:pPr>
+              <a:r>
+                <a:rPr kumimoji="0" lang="en-US" sz="1050" b="1" i="0" u="none" strike="noStrike" kern="0" cap="none" spc="0" normalizeH="0" baseline="0" noProof="0" dirty="0" smtClean="0">
+                  <a:ln>
+                    <a:noFill/>
+                  </a:ln>
+                  <a:solidFill>
+                    <a:prstClr val="white"/>
+                  </a:solidFill>
+                  <a:effectLst/>
+                  <a:uLnTx/>
+                  <a:uFillTx/>
+                  <a:latin typeface="Andale Mono" charset="0"/>
+                  <a:ea typeface="Andale Mono" charset="0"/>
+                  <a:cs typeface="Andale Mono" charset="0"/>
+                </a:rPr>
+                <a:t>Labels</a:t>
+              </a:r>
+            </a:p>
+          </p:txBody>
+        </p:sp>
+      </p:grpSp>
+    </p:spTree>
+    <p:extLst>
+      <p:ext uri="{BB962C8B-B14F-4D97-AF65-F5344CB8AC3E}">
+        <p14:creationId xmlns:p14="http://schemas.microsoft.com/office/powerpoint/2010/main" val="1268789370"/>
+      </p:ext>
+    </p:extLst>
+  </p:cSld>
+  <p:clrMapOvr>
+    <a:masterClrMapping/>
+  </p:clrMapOvr>
+</p:sld>
+</file>
+
 <file path=ppt/theme/theme1.xml><?xml version="1.0" encoding="utf-8"?>
 <a:theme xmlns:a="http://schemas.openxmlformats.org/drawingml/2006/main" name="Theme1">
   <a:themeElements>

</xml_diff>

<commit_message>
changes in figures and tables
small changes in figures and tables
</commit_message>
<xml_diff>
--- a/text/figures/figrue_preperation/Figure2_Pipelinev6.pptx
+++ b/text/figures/figrue_preperation/Figure2_Pipelinev6.pptx
@@ -198,7 +198,7 @@
           <a:p>
             <a:fld id="{80C3A0DF-E67B-874F-B4A4-3E5F3D83D257}" type="datetimeFigureOut">
               <a:rPr lang="en-US" smtClean="0"/>
-              <a:t>4/13/17</a:t>
+              <a:t>5/17/18</a:t>
             </a:fld>
             <a:endParaRPr lang="en-US"/>
           </a:p>
@@ -262,38 +262,37 @@
           <a:p>
             <a:pPr lvl="0"/>
             <a:r>
-              <a:rPr lang="en-US" smtClean="0"/>
+              <a:rPr lang="en-US"/>
               <a:t>Click to edit Master text styles</a:t>
             </a:r>
           </a:p>
           <a:p>
             <a:pPr lvl="1"/>
             <a:r>
-              <a:rPr lang="en-US" smtClean="0"/>
+              <a:rPr lang="en-US"/>
               <a:t>Second level</a:t>
             </a:r>
           </a:p>
           <a:p>
             <a:pPr lvl="2"/>
             <a:r>
-              <a:rPr lang="en-US" smtClean="0"/>
+              <a:rPr lang="en-US"/>
               <a:t>Third level</a:t>
             </a:r>
           </a:p>
           <a:p>
             <a:pPr lvl="3"/>
             <a:r>
-              <a:rPr lang="en-US" smtClean="0"/>
+              <a:rPr lang="en-US"/>
               <a:t>Fourth level</a:t>
             </a:r>
           </a:p>
           <a:p>
             <a:pPr lvl="4"/>
             <a:r>
-              <a:rPr lang="en-US" smtClean="0"/>
+              <a:rPr lang="en-US"/>
               <a:t>Fifth level</a:t>
             </a:r>
-            <a:endParaRPr lang="en-US"/>
           </a:p>
         </p:txBody>
       </p:sp>
@@ -508,7 +507,7 @@
           </a:lstStyle>
           <a:p>
             <a:r>
-              <a:rPr lang="en-US" smtClean="0"/>
+              <a:rPr lang="en-US"/>
               <a:t>Click to edit Master title style</a:t>
             </a:r>
             <a:endParaRPr lang="en-US" dirty="0"/>
@@ -573,7 +572,7 @@
           </a:lstStyle>
           <a:p>
             <a:r>
-              <a:rPr lang="en-US" smtClean="0"/>
+              <a:rPr lang="en-US"/>
               <a:t>Click to edit Master subtitle style</a:t>
             </a:r>
             <a:endParaRPr lang="en-US" dirty="0"/>
@@ -597,7 +596,7 @@
           <a:p>
             <a:fld id="{4856EAA0-066D-F742-A240-D4440EBDD303}" type="datetimeFigureOut">
               <a:rPr lang="en-US" smtClean="0"/>
-              <a:t>4/13/17</a:t>
+              <a:t>5/17/18</a:t>
             </a:fld>
             <a:endParaRPr lang="en-US"/>
           </a:p>
@@ -691,7 +690,7 @@
           <a:lstStyle/>
           <a:p>
             <a:r>
-              <a:rPr lang="en-US" smtClean="0"/>
+              <a:rPr lang="en-US"/>
               <a:t>Click to edit Master title style</a:t>
             </a:r>
             <a:endParaRPr lang="en-US" dirty="0"/>
@@ -715,35 +714,35 @@
           <a:p>
             <a:pPr lvl="0"/>
             <a:r>
-              <a:rPr lang="en-US" smtClean="0"/>
+              <a:rPr lang="en-US"/>
               <a:t>Click to edit Master text styles</a:t>
             </a:r>
           </a:p>
           <a:p>
             <a:pPr lvl="1"/>
             <a:r>
-              <a:rPr lang="en-US" smtClean="0"/>
+              <a:rPr lang="en-US"/>
               <a:t>Second level</a:t>
             </a:r>
           </a:p>
           <a:p>
             <a:pPr lvl="2"/>
             <a:r>
-              <a:rPr lang="en-US" smtClean="0"/>
+              <a:rPr lang="en-US"/>
               <a:t>Third level</a:t>
             </a:r>
           </a:p>
           <a:p>
             <a:pPr lvl="3"/>
             <a:r>
-              <a:rPr lang="en-US" smtClean="0"/>
+              <a:rPr lang="en-US"/>
               <a:t>Fourth level</a:t>
             </a:r>
           </a:p>
           <a:p>
             <a:pPr lvl="4"/>
             <a:r>
-              <a:rPr lang="en-US" smtClean="0"/>
+              <a:rPr lang="en-US"/>
               <a:t>Fifth level</a:t>
             </a:r>
             <a:endParaRPr lang="en-US" dirty="0"/>
@@ -767,7 +766,7 @@
           <a:p>
             <a:fld id="{4856EAA0-066D-F742-A240-D4440EBDD303}" type="datetimeFigureOut">
               <a:rPr lang="en-US" smtClean="0"/>
-              <a:t>4/13/17</a:t>
+              <a:t>5/17/18</a:t>
             </a:fld>
             <a:endParaRPr lang="en-US"/>
           </a:p>
@@ -866,7 +865,7 @@
           <a:lstStyle/>
           <a:p>
             <a:r>
-              <a:rPr lang="en-US" smtClean="0"/>
+              <a:rPr lang="en-US"/>
               <a:t>Click to edit Master title style</a:t>
             </a:r>
             <a:endParaRPr lang="en-US" dirty="0"/>
@@ -895,35 +894,35 @@
           <a:p>
             <a:pPr lvl="0"/>
             <a:r>
-              <a:rPr lang="en-US" smtClean="0"/>
+              <a:rPr lang="en-US"/>
               <a:t>Click to edit Master text styles</a:t>
             </a:r>
           </a:p>
           <a:p>
             <a:pPr lvl="1"/>
             <a:r>
-              <a:rPr lang="en-US" smtClean="0"/>
+              <a:rPr lang="en-US"/>
               <a:t>Second level</a:t>
             </a:r>
           </a:p>
           <a:p>
             <a:pPr lvl="2"/>
             <a:r>
-              <a:rPr lang="en-US" smtClean="0"/>
+              <a:rPr lang="en-US"/>
               <a:t>Third level</a:t>
             </a:r>
           </a:p>
           <a:p>
             <a:pPr lvl="3"/>
             <a:r>
-              <a:rPr lang="en-US" smtClean="0"/>
+              <a:rPr lang="en-US"/>
               <a:t>Fourth level</a:t>
             </a:r>
           </a:p>
           <a:p>
             <a:pPr lvl="4"/>
             <a:r>
-              <a:rPr lang="en-US" smtClean="0"/>
+              <a:rPr lang="en-US"/>
               <a:t>Fifth level</a:t>
             </a:r>
             <a:endParaRPr lang="en-US" dirty="0"/>
@@ -947,7 +946,7 @@
           <a:p>
             <a:fld id="{4856EAA0-066D-F742-A240-D4440EBDD303}" type="datetimeFigureOut">
               <a:rPr lang="en-US" smtClean="0"/>
-              <a:t>4/13/17</a:t>
+              <a:t>5/17/18</a:t>
             </a:fld>
             <a:endParaRPr lang="en-US"/>
           </a:p>
@@ -1041,7 +1040,7 @@
           <a:lstStyle/>
           <a:p>
             <a:r>
-              <a:rPr lang="en-US" smtClean="0"/>
+              <a:rPr lang="en-US"/>
               <a:t>Click to edit Master title style</a:t>
             </a:r>
             <a:endParaRPr lang="en-US" dirty="0"/>
@@ -1065,35 +1064,35 @@
           <a:p>
             <a:pPr lvl="0"/>
             <a:r>
-              <a:rPr lang="en-US" smtClean="0"/>
+              <a:rPr lang="en-US"/>
               <a:t>Click to edit Master text styles</a:t>
             </a:r>
           </a:p>
           <a:p>
             <a:pPr lvl="1"/>
             <a:r>
-              <a:rPr lang="en-US" smtClean="0"/>
+              <a:rPr lang="en-US"/>
               <a:t>Second level</a:t>
             </a:r>
           </a:p>
           <a:p>
             <a:pPr lvl="2"/>
             <a:r>
-              <a:rPr lang="en-US" smtClean="0"/>
+              <a:rPr lang="en-US"/>
               <a:t>Third level</a:t>
             </a:r>
           </a:p>
           <a:p>
             <a:pPr lvl="3"/>
             <a:r>
-              <a:rPr lang="en-US" smtClean="0"/>
+              <a:rPr lang="en-US"/>
               <a:t>Fourth level</a:t>
             </a:r>
           </a:p>
           <a:p>
             <a:pPr lvl="4"/>
             <a:r>
-              <a:rPr lang="en-US" smtClean="0"/>
+              <a:rPr lang="en-US"/>
               <a:t>Fifth level</a:t>
             </a:r>
             <a:endParaRPr lang="en-US" dirty="0"/>
@@ -1117,7 +1116,7 @@
           <a:p>
             <a:fld id="{4856EAA0-066D-F742-A240-D4440EBDD303}" type="datetimeFigureOut">
               <a:rPr lang="en-US" smtClean="0"/>
-              <a:t>4/13/17</a:t>
+              <a:t>5/17/18</a:t>
             </a:fld>
             <a:endParaRPr lang="en-US"/>
           </a:p>
@@ -1220,7 +1219,7 @@
           </a:lstStyle>
           <a:p>
             <a:r>
-              <a:rPr lang="en-US" smtClean="0"/>
+              <a:rPr lang="en-US"/>
               <a:t>Click to edit Master title style</a:t>
             </a:r>
             <a:endParaRPr lang="en-US" dirty="0"/>
@@ -1338,7 +1337,7 @@
           <a:p>
             <a:pPr lvl="0"/>
             <a:r>
-              <a:rPr lang="en-US" smtClean="0"/>
+              <a:rPr lang="en-US"/>
               <a:t>Click to edit Master text styles</a:t>
             </a:r>
           </a:p>
@@ -1361,7 +1360,7 @@
           <a:p>
             <a:fld id="{4856EAA0-066D-F742-A240-D4440EBDD303}" type="datetimeFigureOut">
               <a:rPr lang="en-US" smtClean="0"/>
-              <a:t>4/13/17</a:t>
+              <a:t>5/17/18</a:t>
             </a:fld>
             <a:endParaRPr lang="en-US"/>
           </a:p>
@@ -1455,7 +1454,7 @@
           <a:lstStyle/>
           <a:p>
             <a:r>
-              <a:rPr lang="en-US" smtClean="0"/>
+              <a:rPr lang="en-US"/>
               <a:t>Click to edit Master title style</a:t>
             </a:r>
             <a:endParaRPr lang="en-US" dirty="0"/>
@@ -1484,35 +1483,35 @@
           <a:p>
             <a:pPr lvl="0"/>
             <a:r>
-              <a:rPr lang="en-US" smtClean="0"/>
+              <a:rPr lang="en-US"/>
               <a:t>Click to edit Master text styles</a:t>
             </a:r>
           </a:p>
           <a:p>
             <a:pPr lvl="1"/>
             <a:r>
-              <a:rPr lang="en-US" smtClean="0"/>
+              <a:rPr lang="en-US"/>
               <a:t>Second level</a:t>
             </a:r>
           </a:p>
           <a:p>
             <a:pPr lvl="2"/>
             <a:r>
-              <a:rPr lang="en-US" smtClean="0"/>
+              <a:rPr lang="en-US"/>
               <a:t>Third level</a:t>
             </a:r>
           </a:p>
           <a:p>
             <a:pPr lvl="3"/>
             <a:r>
-              <a:rPr lang="en-US" smtClean="0"/>
+              <a:rPr lang="en-US"/>
               <a:t>Fourth level</a:t>
             </a:r>
           </a:p>
           <a:p>
             <a:pPr lvl="4"/>
             <a:r>
-              <a:rPr lang="en-US" smtClean="0"/>
+              <a:rPr lang="en-US"/>
               <a:t>Fifth level</a:t>
             </a:r>
             <a:endParaRPr lang="en-US" dirty="0"/>
@@ -1541,35 +1540,35 @@
           <a:p>
             <a:pPr lvl="0"/>
             <a:r>
-              <a:rPr lang="en-US" smtClean="0"/>
+              <a:rPr lang="en-US"/>
               <a:t>Click to edit Master text styles</a:t>
             </a:r>
           </a:p>
           <a:p>
             <a:pPr lvl="1"/>
             <a:r>
-              <a:rPr lang="en-US" smtClean="0"/>
+              <a:rPr lang="en-US"/>
               <a:t>Second level</a:t>
             </a:r>
           </a:p>
           <a:p>
             <a:pPr lvl="2"/>
             <a:r>
-              <a:rPr lang="en-US" smtClean="0"/>
+              <a:rPr lang="en-US"/>
               <a:t>Third level</a:t>
             </a:r>
           </a:p>
           <a:p>
             <a:pPr lvl="3"/>
             <a:r>
-              <a:rPr lang="en-US" smtClean="0"/>
+              <a:rPr lang="en-US"/>
               <a:t>Fourth level</a:t>
             </a:r>
           </a:p>
           <a:p>
             <a:pPr lvl="4"/>
             <a:r>
-              <a:rPr lang="en-US" smtClean="0"/>
+              <a:rPr lang="en-US"/>
               <a:t>Fifth level</a:t>
             </a:r>
             <a:endParaRPr lang="en-US" dirty="0"/>
@@ -1593,7 +1592,7 @@
           <a:p>
             <a:fld id="{4856EAA0-066D-F742-A240-D4440EBDD303}" type="datetimeFigureOut">
               <a:rPr lang="en-US" smtClean="0"/>
-              <a:t>4/13/17</a:t>
+              <a:t>5/17/18</a:t>
             </a:fld>
             <a:endParaRPr lang="en-US"/>
           </a:p>
@@ -1692,7 +1691,7 @@
           <a:lstStyle/>
           <a:p>
             <a:r>
-              <a:rPr lang="en-US" smtClean="0"/>
+              <a:rPr lang="en-US"/>
               <a:t>Click to edit Master title style</a:t>
             </a:r>
             <a:endParaRPr lang="en-US" dirty="0"/>
@@ -1758,7 +1757,7 @@
           <a:p>
             <a:pPr lvl="0"/>
             <a:r>
-              <a:rPr lang="en-US" smtClean="0"/>
+              <a:rPr lang="en-US"/>
               <a:t>Click to edit Master text styles</a:t>
             </a:r>
           </a:p>
@@ -1786,35 +1785,35 @@
           <a:p>
             <a:pPr lvl="0"/>
             <a:r>
-              <a:rPr lang="en-US" smtClean="0"/>
+              <a:rPr lang="en-US"/>
               <a:t>Click to edit Master text styles</a:t>
             </a:r>
           </a:p>
           <a:p>
             <a:pPr lvl="1"/>
             <a:r>
-              <a:rPr lang="en-US" smtClean="0"/>
+              <a:rPr lang="en-US"/>
               <a:t>Second level</a:t>
             </a:r>
           </a:p>
           <a:p>
             <a:pPr lvl="2"/>
             <a:r>
-              <a:rPr lang="en-US" smtClean="0"/>
+              <a:rPr lang="en-US"/>
               <a:t>Third level</a:t>
             </a:r>
           </a:p>
           <a:p>
             <a:pPr lvl="3"/>
             <a:r>
-              <a:rPr lang="en-US" smtClean="0"/>
+              <a:rPr lang="en-US"/>
               <a:t>Fourth level</a:t>
             </a:r>
           </a:p>
           <a:p>
             <a:pPr lvl="4"/>
             <a:r>
-              <a:rPr lang="en-US" smtClean="0"/>
+              <a:rPr lang="en-US"/>
               <a:t>Fifth level</a:t>
             </a:r>
             <a:endParaRPr lang="en-US" dirty="0"/>
@@ -1880,7 +1879,7 @@
           <a:p>
             <a:pPr lvl="0"/>
             <a:r>
-              <a:rPr lang="en-US" smtClean="0"/>
+              <a:rPr lang="en-US"/>
               <a:t>Click to edit Master text styles</a:t>
             </a:r>
           </a:p>
@@ -1908,35 +1907,35 @@
           <a:p>
             <a:pPr lvl="0"/>
             <a:r>
-              <a:rPr lang="en-US" smtClean="0"/>
+              <a:rPr lang="en-US"/>
               <a:t>Click to edit Master text styles</a:t>
             </a:r>
           </a:p>
           <a:p>
             <a:pPr lvl="1"/>
             <a:r>
-              <a:rPr lang="en-US" smtClean="0"/>
+              <a:rPr lang="en-US"/>
               <a:t>Second level</a:t>
             </a:r>
           </a:p>
           <a:p>
             <a:pPr lvl="2"/>
             <a:r>
-              <a:rPr lang="en-US" smtClean="0"/>
+              <a:rPr lang="en-US"/>
               <a:t>Third level</a:t>
             </a:r>
           </a:p>
           <a:p>
             <a:pPr lvl="3"/>
             <a:r>
-              <a:rPr lang="en-US" smtClean="0"/>
+              <a:rPr lang="en-US"/>
               <a:t>Fourth level</a:t>
             </a:r>
           </a:p>
           <a:p>
             <a:pPr lvl="4"/>
             <a:r>
-              <a:rPr lang="en-US" smtClean="0"/>
+              <a:rPr lang="en-US"/>
               <a:t>Fifth level</a:t>
             </a:r>
             <a:endParaRPr lang="en-US" dirty="0"/>
@@ -1960,7 +1959,7 @@
           <a:p>
             <a:fld id="{4856EAA0-066D-F742-A240-D4440EBDD303}" type="datetimeFigureOut">
               <a:rPr lang="en-US" smtClean="0"/>
-              <a:t>4/13/17</a:t>
+              <a:t>5/17/18</a:t>
             </a:fld>
             <a:endParaRPr lang="en-US"/>
           </a:p>
@@ -2054,7 +2053,7 @@
           <a:lstStyle/>
           <a:p>
             <a:r>
-              <a:rPr lang="en-US" smtClean="0"/>
+              <a:rPr lang="en-US"/>
               <a:t>Click to edit Master title style</a:t>
             </a:r>
             <a:endParaRPr lang="en-US" dirty="0"/>
@@ -2078,7 +2077,7 @@
           <a:p>
             <a:fld id="{4856EAA0-066D-F742-A240-D4440EBDD303}" type="datetimeFigureOut">
               <a:rPr lang="en-US" smtClean="0"/>
-              <a:t>4/13/17</a:t>
+              <a:t>5/17/18</a:t>
             </a:fld>
             <a:endParaRPr lang="en-US"/>
           </a:p>
@@ -2173,7 +2172,7 @@
           <a:p>
             <a:fld id="{4856EAA0-066D-F742-A240-D4440EBDD303}" type="datetimeFigureOut">
               <a:rPr lang="en-US" smtClean="0"/>
-              <a:t>4/13/17</a:t>
+              <a:t>5/17/18</a:t>
             </a:fld>
             <a:endParaRPr lang="en-US"/>
           </a:p>
@@ -2276,7 +2275,7 @@
           </a:lstStyle>
           <a:p>
             <a:r>
-              <a:rPr lang="en-US" smtClean="0"/>
+              <a:rPr lang="en-US"/>
               <a:t>Click to edit Master title style</a:t>
             </a:r>
             <a:endParaRPr lang="en-US" dirty="0"/>
@@ -2333,35 +2332,35 @@
           <a:p>
             <a:pPr lvl="0"/>
             <a:r>
-              <a:rPr lang="en-US" smtClean="0"/>
+              <a:rPr lang="en-US"/>
               <a:t>Click to edit Master text styles</a:t>
             </a:r>
           </a:p>
           <a:p>
             <a:pPr lvl="1"/>
             <a:r>
-              <a:rPr lang="en-US" smtClean="0"/>
+              <a:rPr lang="en-US"/>
               <a:t>Second level</a:t>
             </a:r>
           </a:p>
           <a:p>
             <a:pPr lvl="2"/>
             <a:r>
-              <a:rPr lang="en-US" smtClean="0"/>
+              <a:rPr lang="en-US"/>
               <a:t>Third level</a:t>
             </a:r>
           </a:p>
           <a:p>
             <a:pPr lvl="3"/>
             <a:r>
-              <a:rPr lang="en-US" smtClean="0"/>
+              <a:rPr lang="en-US"/>
               <a:t>Fourth level</a:t>
             </a:r>
           </a:p>
           <a:p>
             <a:pPr lvl="4"/>
             <a:r>
-              <a:rPr lang="en-US" smtClean="0"/>
+              <a:rPr lang="en-US"/>
               <a:t>Fifth level</a:t>
             </a:r>
             <a:endParaRPr lang="en-US" dirty="0"/>
@@ -2427,7 +2426,7 @@
           <a:p>
             <a:pPr lvl="0"/>
             <a:r>
-              <a:rPr lang="en-US" smtClean="0"/>
+              <a:rPr lang="en-US"/>
               <a:t>Click to edit Master text styles</a:t>
             </a:r>
           </a:p>
@@ -2450,7 +2449,7 @@
           <a:p>
             <a:fld id="{4856EAA0-066D-F742-A240-D4440EBDD303}" type="datetimeFigureOut">
               <a:rPr lang="en-US" smtClean="0"/>
-              <a:t>4/13/17</a:t>
+              <a:t>5/17/18</a:t>
             </a:fld>
             <a:endParaRPr lang="en-US"/>
           </a:p>
@@ -2553,7 +2552,7 @@
           </a:lstStyle>
           <a:p>
             <a:r>
-              <a:rPr lang="en-US" smtClean="0"/>
+              <a:rPr lang="en-US"/>
               <a:t>Click to edit Master title style</a:t>
             </a:r>
             <a:endParaRPr lang="en-US" dirty="0"/>
@@ -2618,7 +2617,7 @@
           </a:lstStyle>
           <a:p>
             <a:r>
-              <a:rPr lang="en-US" smtClean="0"/>
+              <a:rPr lang="en-US"/>
               <a:t>Drag picture to placeholder or click icon to add</a:t>
             </a:r>
             <a:endParaRPr lang="en-US" dirty="0"/>
@@ -2684,7 +2683,7 @@
           <a:p>
             <a:pPr lvl="0"/>
             <a:r>
-              <a:rPr lang="en-US" smtClean="0"/>
+              <a:rPr lang="en-US"/>
               <a:t>Click to edit Master text styles</a:t>
             </a:r>
           </a:p>
@@ -2707,7 +2706,7 @@
           <a:p>
             <a:fld id="{4856EAA0-066D-F742-A240-D4440EBDD303}" type="datetimeFigureOut">
               <a:rPr lang="en-US" smtClean="0"/>
-              <a:t>4/13/17</a:t>
+              <a:t>5/17/18</a:t>
             </a:fld>
             <a:endParaRPr lang="en-US"/>
           </a:p>
@@ -2816,7 +2815,7 @@
           <a:lstStyle/>
           <a:p>
             <a:r>
-              <a:rPr lang="en-US" smtClean="0"/>
+              <a:rPr lang="en-US"/>
               <a:t>Click to edit Master title style</a:t>
             </a:r>
             <a:endParaRPr lang="en-US" dirty="0"/>
@@ -2850,35 +2849,35 @@
           <a:p>
             <a:pPr lvl="0"/>
             <a:r>
-              <a:rPr lang="en-US" smtClean="0"/>
+              <a:rPr lang="en-US"/>
               <a:t>Click to edit Master text styles</a:t>
             </a:r>
           </a:p>
           <a:p>
             <a:pPr lvl="1"/>
             <a:r>
-              <a:rPr lang="en-US" smtClean="0"/>
+              <a:rPr lang="en-US"/>
               <a:t>Second level</a:t>
             </a:r>
           </a:p>
           <a:p>
             <a:pPr lvl="2"/>
             <a:r>
-              <a:rPr lang="en-US" smtClean="0"/>
+              <a:rPr lang="en-US"/>
               <a:t>Third level</a:t>
             </a:r>
           </a:p>
           <a:p>
             <a:pPr lvl="3"/>
             <a:r>
-              <a:rPr lang="en-US" smtClean="0"/>
+              <a:rPr lang="en-US"/>
               <a:t>Fourth level</a:t>
             </a:r>
           </a:p>
           <a:p>
             <a:pPr lvl="4"/>
             <a:r>
-              <a:rPr lang="en-US" smtClean="0"/>
+              <a:rPr lang="en-US"/>
               <a:t>Fifth level</a:t>
             </a:r>
             <a:endParaRPr lang="en-US" dirty="0"/>
@@ -2920,7 +2919,7 @@
           <a:p>
             <a:fld id="{4856EAA0-066D-F742-A240-D4440EBDD303}" type="datetimeFigureOut">
               <a:rPr lang="en-US" smtClean="0"/>
-              <a:t>4/13/17</a:t>
+              <a:t>5/17/18</a:t>
             </a:fld>
             <a:endParaRPr lang="en-US"/>
           </a:p>
@@ -3381,7 +3380,7 @@
               <a:tabLst/>
               <a:defRPr/>
             </a:pPr>
-            <a:endParaRPr kumimoji="0" lang="en-US" sz="2800" b="1" i="0" u="none" strike="noStrike" kern="0" cap="none" spc="300" normalizeH="0" baseline="0" noProof="0" dirty="0" smtClean="0">
+            <a:endParaRPr kumimoji="0" lang="en-US" sz="2800" b="1" i="0" u="none" strike="noStrike" kern="0" cap="none" spc="300" normalizeH="0" baseline="0" noProof="0" dirty="0">
               <a:ln>
                 <a:noFill/>
               </a:ln>
@@ -3475,7 +3474,7 @@
               <a:defRPr/>
             </a:pPr>
             <a:r>
-              <a:rPr kumimoji="0" lang="en-US" sz="1600" b="1" i="0" u="none" strike="noStrike" kern="0" cap="none" spc="0" normalizeH="0" baseline="0" noProof="0" dirty="0" smtClean="0">
+              <a:rPr kumimoji="0" lang="en-US" sz="1600" b="1" i="0" u="none" strike="noStrike" kern="0" cap="none" spc="0" normalizeH="0" baseline="0" noProof="0" dirty="0">
                 <a:ln>
                   <a:noFill/>
                 </a:ln>
@@ -3489,7 +3488,7 @@
                 <a:ea typeface=""/>
                 <a:cs typeface=""/>
               </a:rPr>
-              <a:t>INITIAL DATA PREPERATION</a:t>
+              <a:t>INITIAL DATA PREPARATION</a:t>
             </a:r>
           </a:p>
           <a:p>
@@ -3511,7 +3510,7 @@
               <a:defRPr/>
             </a:pPr>
             <a:r>
-              <a:rPr kumimoji="0" lang="en-US" sz="1600" b="1" i="0" u="none" strike="noStrike" kern="0" cap="none" spc="0" normalizeH="0" baseline="0" noProof="0" dirty="0" smtClean="0">
+              <a:rPr kumimoji="0" lang="en-US" sz="1600" b="1" i="0" u="none" strike="noStrike" kern="0" cap="none" spc="0" normalizeH="0" baseline="0" noProof="0" dirty="0">
                 <a:ln>
                   <a:noFill/>
                 </a:ln>
@@ -3527,7 +3526,7 @@
               </a:rPr>
               <a:t>DeSeq2, log transform.</a:t>
             </a:r>
-            <a:endParaRPr kumimoji="0" lang="en-US" sz="1400" b="1" i="0" u="none" strike="noStrike" kern="0" cap="none" spc="0" normalizeH="0" baseline="0" noProof="0" dirty="0" smtClean="0">
+            <a:endParaRPr kumimoji="0" lang="en-US" sz="1400" b="1" i="0" u="none" strike="noStrike" kern="0" cap="none" spc="0" normalizeH="0" baseline="0" noProof="0" dirty="0">
               <a:ln>
                 <a:noFill/>
               </a:ln>
@@ -3608,7 +3607,7 @@
                 <a:defRPr/>
               </a:pPr>
               <a:r>
-                <a:rPr kumimoji="0" lang="en-US" sz="1600" b="1" i="0" u="none" strike="noStrike" kern="0" cap="none" spc="0" normalizeH="0" baseline="0" noProof="0" dirty="0" smtClean="0">
+                <a:rPr kumimoji="0" lang="en-US" sz="1600" b="1" i="0" u="none" strike="noStrike" kern="0" cap="none" spc="0" normalizeH="0" baseline="0" noProof="0" dirty="0">
                   <a:ln>
                     <a:noFill/>
                   </a:ln>
@@ -3680,7 +3679,7 @@
                 <a:defRPr/>
               </a:pPr>
               <a:r>
-                <a:rPr kumimoji="0" lang="en-US" sz="1200" b="1" i="0" u="none" strike="noStrike" kern="0" cap="none" spc="0" normalizeH="0" baseline="0" noProof="0" dirty="0" smtClean="0">
+                <a:rPr kumimoji="0" lang="en-US" sz="1200" b="1" i="0" u="none" strike="noStrike" kern="0" cap="none" spc="0" normalizeH="0" baseline="0" noProof="0" dirty="0">
                   <a:ln>
                     <a:noFill/>
                   </a:ln>
@@ -3748,7 +3747,7 @@
               <a:defRPr/>
             </a:pPr>
             <a:r>
-              <a:rPr kumimoji="0" lang="en-US" sz="1600" b="1" i="0" u="none" strike="noStrike" kern="0" cap="none" spc="0" normalizeH="0" baseline="0" noProof="0" dirty="0" smtClean="0">
+              <a:rPr kumimoji="0" lang="en-US" sz="1600" b="1" i="0" u="none" strike="noStrike" kern="0" cap="none" spc="0" normalizeH="0" baseline="0" noProof="0" dirty="0">
                 <a:ln>
                   <a:noFill/>
                 </a:ln>
@@ -3816,7 +3815,7 @@
               <a:defRPr/>
             </a:pPr>
             <a:r>
-              <a:rPr kumimoji="0" lang="en-US" sz="1600" b="1" i="0" u="none" strike="noStrike" kern="0" cap="none" spc="0" normalizeH="0" baseline="0" noProof="0" dirty="0" smtClean="0">
+              <a:rPr kumimoji="0" lang="en-US" sz="1600" b="1" i="0" u="none" strike="noStrike" kern="0" cap="none" spc="0" normalizeH="0" baseline="0" noProof="0" dirty="0">
                 <a:ln>
                   <a:noFill/>
                 </a:ln>
@@ -3852,7 +3851,7 @@
               <a:defRPr/>
             </a:pPr>
             <a:r>
-              <a:rPr kumimoji="0" lang="en-US" sz="1600" b="1" i="0" u="none" strike="noStrike" kern="0" cap="none" spc="0" normalizeH="0" baseline="0" noProof="0" dirty="0" smtClean="0">
+              <a:rPr kumimoji="0" lang="en-US" sz="1600" b="1" i="0" u="none" strike="noStrike" kern="0" cap="none" spc="0" normalizeH="0" baseline="0" noProof="0" dirty="0">
                 <a:ln>
                   <a:noFill/>
                 </a:ln>
@@ -3868,7 +3867,7 @@
               </a:rPr>
               <a:t>(Protect sub-sample ratios)</a:t>
             </a:r>
-            <a:endParaRPr kumimoji="0" lang="en-US" sz="1600" b="0" i="0" u="none" strike="noStrike" kern="0" cap="none" spc="0" normalizeH="0" baseline="0" noProof="0" dirty="0" smtClean="0">
+            <a:endParaRPr kumimoji="0" lang="en-US" sz="1600" b="0" i="0" u="none" strike="noStrike" kern="0" cap="none" spc="0" normalizeH="0" baseline="0" noProof="0" dirty="0">
               <a:ln>
                 <a:noFill/>
               </a:ln>
@@ -3937,7 +3936,7 @@
               <a:defRPr/>
             </a:pPr>
             <a:r>
-              <a:rPr kumimoji="0" lang="en-US" sz="1600" b="1" i="0" u="none" strike="noStrike" kern="0" cap="none" spc="0" normalizeH="0" baseline="0" noProof="0" dirty="0" smtClean="0">
+              <a:rPr kumimoji="0" lang="en-US" sz="1600" b="1" i="0" u="none" strike="noStrike" kern="0" cap="none" spc="0" normalizeH="0" baseline="0" noProof="0" dirty="0">
                 <a:ln>
                   <a:noFill/>
                 </a:ln>
@@ -3954,7 +3953,7 @@
               <a:t>Training set</a:t>
             </a:r>
             <a:br>
-              <a:rPr kumimoji="0" lang="en-US" sz="1600" b="1" i="0" u="none" strike="noStrike" kern="0" cap="none" spc="0" normalizeH="0" baseline="0" noProof="0" dirty="0" smtClean="0">
+              <a:rPr kumimoji="0" lang="en-US" sz="1600" b="1" i="0" u="none" strike="noStrike" kern="0" cap="none" spc="0" normalizeH="0" baseline="0" noProof="0" dirty="0">
                 <a:ln>
                   <a:noFill/>
                 </a:ln>
@@ -3970,7 +3969,7 @@
               </a:rPr>
             </a:br>
             <a:r>
-              <a:rPr kumimoji="0" lang="en-US" sz="1600" b="1" i="0" u="none" strike="noStrike" kern="0" cap="none" spc="0" normalizeH="0" baseline="0" noProof="0" dirty="0" smtClean="0">
+              <a:rPr kumimoji="0" lang="en-US" sz="1600" b="1" i="0" u="none" strike="noStrike" kern="0" cap="none" spc="0" normalizeH="0" baseline="0" noProof="0" dirty="0">
                 <a:ln>
                   <a:noFill/>
                 </a:ln>
@@ -4041,7 +4040,7 @@
               <a:defRPr/>
             </a:pPr>
             <a:r>
-              <a:rPr kumimoji="0" lang="en-US" sz="1600" b="1" i="0" u="none" strike="noStrike" kern="0" cap="none" spc="0" normalizeH="0" baseline="0" noProof="0" dirty="0" smtClean="0">
+              <a:rPr kumimoji="0" lang="en-US" sz="1600" b="1" i="0" u="none" strike="noStrike" kern="0" cap="none" spc="0" normalizeH="0" baseline="0" noProof="0" dirty="0">
                 <a:ln>
                   <a:noFill/>
                 </a:ln>
@@ -4058,7 +4057,7 @@
               <a:t>Test set</a:t>
             </a:r>
             <a:br>
-              <a:rPr kumimoji="0" lang="en-US" sz="1600" b="1" i="0" u="none" strike="noStrike" kern="0" cap="none" spc="0" normalizeH="0" baseline="0" noProof="0" dirty="0" smtClean="0">
+              <a:rPr kumimoji="0" lang="en-US" sz="1600" b="1" i="0" u="none" strike="noStrike" kern="0" cap="none" spc="0" normalizeH="0" baseline="0" noProof="0" dirty="0">
                 <a:ln>
                   <a:noFill/>
                 </a:ln>
@@ -4074,7 +4073,7 @@
               </a:rPr>
             </a:br>
             <a:r>
-              <a:rPr kumimoji="0" lang="en-US" sz="1600" b="1" i="0" u="none" strike="noStrike" kern="0" cap="none" spc="0" normalizeH="0" baseline="0" noProof="0" dirty="0" smtClean="0">
+              <a:rPr kumimoji="0" lang="en-US" sz="1600" b="1" i="0" u="none" strike="noStrike" kern="0" cap="none" spc="0" normalizeH="0" baseline="0" noProof="0" dirty="0">
                 <a:ln>
                   <a:noFill/>
                 </a:ln>
@@ -4223,7 +4222,7 @@
               <a:defRPr/>
             </a:pPr>
             <a:r>
-              <a:rPr kumimoji="0" lang="en-US" sz="1400" b="1" i="0" u="none" strike="noStrike" kern="0" cap="none" spc="0" normalizeH="0" baseline="0" noProof="0" dirty="0" smtClean="0">
+              <a:rPr kumimoji="0" lang="en-US" sz="1400" b="1" i="0" u="none" strike="noStrike" kern="0" cap="none" spc="0" normalizeH="0" baseline="0" noProof="0" dirty="0">
                 <a:ln>
                   <a:noFill/>
                 </a:ln>
@@ -4240,7 +4239,7 @@
               <a:t>PCA</a:t>
             </a:r>
             <a:br>
-              <a:rPr kumimoji="0" lang="en-US" sz="1400" b="1" i="0" u="none" strike="noStrike" kern="0" cap="none" spc="0" normalizeH="0" baseline="0" noProof="0" dirty="0" smtClean="0">
+              <a:rPr kumimoji="0" lang="en-US" sz="1400" b="1" i="0" u="none" strike="noStrike" kern="0" cap="none" spc="0" normalizeH="0" baseline="0" noProof="0" dirty="0">
                 <a:ln>
                   <a:noFill/>
                 </a:ln>
@@ -4256,7 +4255,7 @@
               </a:rPr>
             </a:br>
             <a:r>
-              <a:rPr kumimoji="0" lang="en-US" sz="1600" b="1" i="0" u="none" strike="noStrike" kern="0" cap="none" spc="0" normalizeH="0" baseline="0" noProof="0" dirty="0" smtClean="0">
+              <a:rPr kumimoji="0" lang="en-US" sz="1600" b="1" i="0" u="none" strike="noStrike" kern="0" cap="none" spc="0" normalizeH="0" baseline="0" noProof="0" dirty="0">
                 <a:ln>
                   <a:noFill/>
                 </a:ln>
@@ -4273,7 +4272,7 @@
               <a:t>rotation</a:t>
             </a:r>
             <a:r>
-              <a:rPr kumimoji="0" lang="en-US" sz="1400" b="1" i="0" u="none" strike="noStrike" kern="0" cap="none" spc="0" normalizeH="0" baseline="0" noProof="0" dirty="0" smtClean="0">
+              <a:rPr kumimoji="0" lang="en-US" sz="1400" b="1" i="0" u="none" strike="noStrike" kern="0" cap="none" spc="0" normalizeH="0" baseline="0" noProof="0" dirty="0">
                 <a:ln>
                   <a:noFill/>
                 </a:ln>
@@ -4344,7 +4343,7 @@
               <a:defRPr/>
             </a:pPr>
             <a:r>
-              <a:rPr kumimoji="0" lang="en-US" sz="1600" b="1" i="0" u="none" strike="noStrike" kern="0" cap="none" spc="0" normalizeH="0" baseline="0" noProof="0" dirty="0" smtClean="0">
+              <a:rPr kumimoji="0" lang="en-US" sz="1600" b="1" i="0" u="none" strike="noStrike" kern="0" cap="none" spc="0" normalizeH="0" baseline="0" noProof="0" dirty="0">
                 <a:ln>
                   <a:noFill/>
                 </a:ln>
@@ -4380,7 +4379,7 @@
               <a:defRPr/>
             </a:pPr>
             <a:r>
-              <a:rPr kumimoji="0" lang="en-US" sz="1600" b="1" i="0" u="none" strike="noStrike" kern="0" cap="none" spc="0" normalizeH="0" baseline="0" noProof="0" dirty="0" smtClean="0">
+              <a:rPr kumimoji="0" lang="en-US" sz="1600" b="1" i="0" u="none" strike="noStrike" kern="0" cap="none" spc="0" normalizeH="0" baseline="0" noProof="0" dirty="0">
                 <a:ln>
                   <a:noFill/>
                 </a:ln>
@@ -4462,20 +4461,12 @@
               <a:defRPr/>
             </a:pPr>
             <a:r>
-              <a:rPr lang="en-US" sz="1600" b="1" kern="0" dirty="0" smtClean="0">
-                <a:solidFill>
-                  <a:prstClr val="white"/>
-                </a:solidFill>
-              </a:rPr>
-              <a:t>Train 3 </a:t>
-            </a:r>
-            <a:r>
               <a:rPr lang="en-US" sz="1600" b="1" kern="0" dirty="0">
                 <a:solidFill>
                   <a:prstClr val="white"/>
                 </a:solidFill>
               </a:rPr>
-              <a:t>SVM kernels or RF</a:t>
+              <a:t>Train 3 SVM kernels or RF</a:t>
             </a:r>
           </a:p>
           <a:p>
@@ -4497,7 +4488,7 @@
               <a:defRPr/>
             </a:pPr>
             <a:r>
-              <a:rPr lang="en-US" sz="1600" b="1" kern="0" noProof="0" dirty="0" smtClean="0">
+              <a:rPr lang="en-US" sz="1600" b="1" kern="0" noProof="0" dirty="0">
                 <a:solidFill>
                   <a:prstClr val="white"/>
                 </a:solidFill>
@@ -4508,7 +4499,7 @@
               <a:t>with</a:t>
             </a:r>
             <a:r>
-              <a:rPr kumimoji="0" lang="en-US" sz="1600" b="1" i="0" u="none" strike="noStrike" kern="0" cap="none" spc="0" normalizeH="0" baseline="0" noProof="0" dirty="0" smtClean="0">
+              <a:rPr kumimoji="0" lang="en-US" sz="1600" b="1" i="0" u="none" strike="noStrike" kern="0" cap="none" spc="0" normalizeH="0" baseline="0" noProof="0" dirty="0">
                 <a:ln>
                   <a:noFill/>
                 </a:ln>
@@ -4524,7 +4515,7 @@
               </a:rPr>
               <a:t> tuning</a:t>
             </a:r>
-            <a:endParaRPr kumimoji="0" lang="en-US" sz="1050" b="1" i="0" u="none" strike="noStrike" kern="0" cap="none" spc="0" normalizeH="0" baseline="0" noProof="0" dirty="0" smtClean="0">
+            <a:endParaRPr kumimoji="0" lang="en-US" sz="1050" b="1" i="0" u="none" strike="noStrike" kern="0" cap="none" spc="0" normalizeH="0" baseline="0" noProof="0" dirty="0">
               <a:ln>
                 <a:noFill/>
               </a:ln>
@@ -4649,7 +4640,7 @@
               <a:defRPr/>
             </a:pPr>
             <a:r>
-              <a:rPr kumimoji="0" lang="en-US" sz="1600" b="1" i="0" u="none" strike="noStrike" kern="0" cap="none" spc="0" normalizeH="0" baseline="0" noProof="0" dirty="0" smtClean="0">
+              <a:rPr kumimoji="0" lang="en-US" sz="1600" b="1" i="0" u="none" strike="noStrike" kern="0" cap="none" spc="0" normalizeH="0" baseline="0" noProof="0" dirty="0">
                 <a:ln>
                   <a:noFill/>
                 </a:ln>
@@ -4742,7 +4733,7 @@
               <a:tabLst/>
               <a:defRPr/>
             </a:pPr>
-            <a:endParaRPr kumimoji="0" lang="en-US" sz="2000" b="0" i="0" u="none" strike="noStrike" kern="0" cap="none" spc="0" normalizeH="0" baseline="0" noProof="0" smtClean="0">
+            <a:endParaRPr kumimoji="0" lang="en-US" sz="2000" b="0" i="0" u="none" strike="noStrike" kern="0" cap="none" spc="0" normalizeH="0" baseline="0" noProof="0">
               <a:ln>
                 <a:noFill/>
               </a:ln>
@@ -4810,7 +4801,7 @@
               <a:defRPr/>
             </a:pPr>
             <a:r>
-              <a:rPr kumimoji="0" lang="en-US" sz="2000" b="1" i="0" u="none" strike="noStrike" kern="0" cap="none" spc="0" normalizeH="0" baseline="0" noProof="0" dirty="0" smtClean="0">
+              <a:rPr kumimoji="0" lang="en-US" sz="2000" b="1" i="0" u="none" strike="noStrike" kern="0" cap="none" spc="0" normalizeH="0" baseline="0" noProof="0" dirty="0">
                 <a:ln>
                   <a:noFill/>
                 </a:ln>
@@ -4827,7 +4818,7 @@
               <a:t>Recalculate </a:t>
             </a:r>
             <a:r>
-              <a:rPr lang="en-US" sz="2000" b="1" kern="0" dirty="0" smtClean="0">
+              <a:rPr lang="en-US" sz="2000" b="1" kern="0" dirty="0">
                 <a:solidFill>
                   <a:prstClr val="black"/>
                 </a:solidFill>
@@ -4838,7 +4829,7 @@
               <a:t>60</a:t>
             </a:r>
             <a:r>
-              <a:rPr kumimoji="0" lang="en-US" sz="2000" b="1" i="0" u="none" strike="noStrike" kern="0" cap="none" spc="0" normalizeH="0" baseline="0" noProof="0" dirty="0" smtClean="0">
+              <a:rPr kumimoji="0" lang="en-US" sz="2000" b="1" i="0" u="none" strike="noStrike" kern="0" cap="none" spc="0" normalizeH="0" baseline="0" noProof="0" dirty="0">
                 <a:ln>
                   <a:noFill/>
                 </a:ln>
@@ -4906,7 +4897,7 @@
               <a:defRPr/>
             </a:pPr>
             <a:r>
-              <a:rPr kumimoji="0" lang="en-US" sz="1600" b="1" i="0" u="none" strike="noStrike" kern="0" cap="none" spc="0" normalizeH="0" baseline="0" noProof="0" dirty="0" smtClean="0">
+              <a:rPr kumimoji="0" lang="en-US" sz="1600" b="1" i="0" u="none" strike="noStrike" kern="0" cap="none" spc="0" normalizeH="0" baseline="0" noProof="0" dirty="0">
                 <a:ln>
                   <a:noFill/>
                 </a:ln>
@@ -4923,7 +4914,7 @@
               <a:t>Batch Correction (</a:t>
             </a:r>
             <a:r>
-              <a:rPr kumimoji="0" lang="en-US" sz="1600" b="1" i="0" u="none" strike="noStrike" kern="0" cap="none" spc="0" normalizeH="0" baseline="0" noProof="0" dirty="0" err="1" smtClean="0">
+              <a:rPr kumimoji="0" lang="en-US" sz="1600" b="1" i="0" u="none" strike="noStrike" kern="0" cap="none" spc="0" normalizeH="0" baseline="0" noProof="0" dirty="0" err="1">
                 <a:ln>
                   <a:noFill/>
                 </a:ln>
@@ -4940,7 +4931,7 @@
               <a:t>fSVA</a:t>
             </a:r>
             <a:r>
-              <a:rPr kumimoji="0" lang="en-US" sz="1600" b="1" i="0" u="none" strike="noStrike" kern="0" cap="none" spc="0" normalizeH="0" baseline="0" noProof="0" dirty="0" smtClean="0">
+              <a:rPr kumimoji="0" lang="en-US" sz="1600" b="1" i="0" u="none" strike="noStrike" kern="0" cap="none" spc="0" normalizeH="0" baseline="0" noProof="0" dirty="0">
                 <a:ln>
                   <a:noFill/>
                 </a:ln>
@@ -5011,7 +5002,7 @@
               <a:defRPr/>
             </a:pPr>
             <a:r>
-              <a:rPr kumimoji="0" lang="en-US" sz="1600" b="1" i="0" u="none" strike="noStrike" kern="0" cap="none" spc="0" normalizeH="0" baseline="0" noProof="0" dirty="0" smtClean="0">
+              <a:rPr kumimoji="0" lang="en-US" sz="1600" b="1" i="0" u="none" strike="noStrike" kern="0" cap="none" spc="0" normalizeH="0" baseline="0" noProof="0" dirty="0">
                 <a:ln>
                   <a:noFill/>
                 </a:ln>
@@ -5028,7 +5019,7 @@
               <a:t>Batch</a:t>
             </a:r>
             <a:br>
-              <a:rPr kumimoji="0" lang="en-US" sz="1600" b="1" i="0" u="none" strike="noStrike" kern="0" cap="none" spc="0" normalizeH="0" baseline="0" noProof="0" dirty="0" smtClean="0">
+              <a:rPr kumimoji="0" lang="en-US" sz="1600" b="1" i="0" u="none" strike="noStrike" kern="0" cap="none" spc="0" normalizeH="0" baseline="0" noProof="0" dirty="0">
                 <a:ln>
                   <a:noFill/>
                 </a:ln>
@@ -5044,7 +5035,7 @@
               </a:rPr>
             </a:br>
             <a:r>
-              <a:rPr kumimoji="0" lang="en-US" sz="1600" b="1" i="0" u="none" strike="noStrike" kern="0" cap="none" spc="0" normalizeH="0" baseline="0" noProof="0" dirty="0" smtClean="0">
+              <a:rPr kumimoji="0" lang="en-US" sz="1600" b="1" i="0" u="none" strike="noStrike" kern="0" cap="none" spc="0" normalizeH="0" baseline="0" noProof="0" dirty="0">
                 <a:ln>
                   <a:noFill/>
                 </a:ln>
@@ -5194,7 +5185,7 @@
               <a:defRPr/>
             </a:pPr>
             <a:r>
-              <a:rPr kumimoji="0" lang="en-US" sz="1050" b="1" i="0" u="none" strike="noStrike" kern="0" cap="none" spc="0" normalizeH="0" baseline="0" noProof="0" dirty="0" smtClean="0">
+              <a:rPr kumimoji="0" lang="en-US" sz="1050" b="1" i="0" u="none" strike="noStrike" kern="0" cap="none" spc="0" normalizeH="0" baseline="0" noProof="0" dirty="0">
                 <a:ln>
                   <a:noFill/>
                 </a:ln>
@@ -5262,7 +5253,7 @@
               <a:defRPr/>
             </a:pPr>
             <a:r>
-              <a:rPr kumimoji="0" lang="en-US" sz="1600" b="1" i="0" u="none" strike="noStrike" kern="0" cap="none" spc="0" normalizeH="0" baseline="0" noProof="0" dirty="0" smtClean="0">
+              <a:rPr kumimoji="0" lang="en-US" sz="1600" b="1" i="0" u="none" strike="noStrike" kern="0" cap="none" spc="0" normalizeH="0" baseline="0" noProof="0" dirty="0">
                 <a:ln>
                   <a:noFill/>
                 </a:ln>
@@ -5506,7 +5497,7 @@
                   <a:defRPr/>
                 </a:pPr>
                 <a:r>
-                  <a:rPr kumimoji="0" lang="en-US" sz="1400" b="1" i="0" u="none" strike="noStrike" kern="0" cap="none" spc="0" normalizeH="0" baseline="0" noProof="0" dirty="0" smtClean="0">
+                  <a:rPr kumimoji="0" lang="en-US" sz="1400" b="1" i="0" u="none" strike="noStrike" kern="0" cap="none" spc="0" normalizeH="0" baseline="0" noProof="0" dirty="0">
                     <a:ln>
                       <a:noFill/>
                     </a:ln>
@@ -5523,7 +5514,7 @@
                   <a:t>Training set</a:t>
                 </a:r>
                 <a:br>
-                  <a:rPr kumimoji="0" lang="en-US" sz="1400" b="1" i="0" u="none" strike="noStrike" kern="0" cap="none" spc="0" normalizeH="0" baseline="0" noProof="0" dirty="0" smtClean="0">
+                  <a:rPr kumimoji="0" lang="en-US" sz="1400" b="1" i="0" u="none" strike="noStrike" kern="0" cap="none" spc="0" normalizeH="0" baseline="0" noProof="0" dirty="0">
                     <a:ln>
                       <a:noFill/>
                     </a:ln>
@@ -5539,7 +5530,7 @@
                   </a:rPr>
                 </a:br>
                 <a:r>
-                  <a:rPr kumimoji="0" lang="en-US" sz="1400" b="1" i="0" u="none" strike="noStrike" kern="0" cap="none" spc="0" normalizeH="0" baseline="0" noProof="0" dirty="0" smtClean="0">
+                  <a:rPr kumimoji="0" lang="en-US" sz="1400" b="1" i="0" u="none" strike="noStrike" kern="0" cap="none" spc="0" normalizeH="0" baseline="0" noProof="0" dirty="0">
                     <a:ln>
                       <a:noFill/>
                     </a:ln>
@@ -5611,7 +5602,7 @@
                   <a:defRPr/>
                 </a:pPr>
                 <a:r>
-                  <a:rPr kumimoji="0" lang="en-US" sz="1050" b="1" i="0" u="none" strike="noStrike" kern="0" cap="none" spc="0" normalizeH="0" baseline="0" noProof="0" dirty="0" smtClean="0">
+                  <a:rPr kumimoji="0" lang="en-US" sz="1050" b="1" i="0" u="none" strike="noStrike" kern="0" cap="none" spc="0" normalizeH="0" baseline="0" noProof="0" dirty="0">
                     <a:ln>
                       <a:noFill/>
                     </a:ln>
@@ -5684,23 +5675,7 @@
                     <a:prstClr val="white"/>
                   </a:solidFill>
                 </a:rPr>
-                <a:t>(Protect </a:t>
-              </a:r>
-              <a:r>
-                <a:rPr lang="en-US" sz="1400" b="1" kern="0" dirty="0" smtClean="0">
-                  <a:solidFill>
-                    <a:prstClr val="white"/>
-                  </a:solidFill>
-                </a:rPr>
-                <a:t>sub-sample </a:t>
-              </a:r>
-              <a:r>
-                <a:rPr lang="en-US" sz="1400" b="1" kern="0" dirty="0">
-                  <a:solidFill>
-                    <a:prstClr val="white"/>
-                  </a:solidFill>
-                </a:rPr>
-                <a:t>ratios)</a:t>
+                <a:t>(Protect sub-sample ratios)</a:t>
               </a:r>
               <a:endParaRPr lang="en-US" sz="1400" kern="0" dirty="0">
                 <a:solidFill>
@@ -5746,7 +5721,7 @@
                 <a:defRPr/>
               </a:pPr>
               <a:r>
-                <a:rPr kumimoji="0" lang="en-US" sz="1400" b="1" i="0" u="none" strike="noStrike" kern="0" cap="none" spc="0" normalizeH="0" baseline="0" noProof="0" dirty="0" smtClean="0">
+                <a:rPr kumimoji="0" lang="en-US" sz="1400" b="1" i="0" u="none" strike="noStrike" kern="0" cap="none" spc="0" normalizeH="0" baseline="0" noProof="0" dirty="0">
                   <a:ln>
                     <a:noFill/>
                   </a:ln>
@@ -5762,7 +5737,7 @@
                 </a:rPr>
                 <a:t>Model</a:t>
               </a:r>
-              <a:endParaRPr kumimoji="0" lang="en-US" sz="1200" b="1" i="0" u="none" strike="noStrike" kern="0" cap="none" spc="0" normalizeH="0" baseline="-25000" noProof="0" dirty="0" smtClean="0">
+              <a:endParaRPr kumimoji="0" lang="en-US" sz="1200" b="1" i="0" u="none" strike="noStrike" kern="0" cap="none" spc="0" normalizeH="0" baseline="-25000" noProof="0" dirty="0">
                 <a:ln>
                   <a:noFill/>
                 </a:ln>
@@ -5831,7 +5806,7 @@
                 <a:defRPr/>
               </a:pPr>
               <a:r>
-                <a:rPr kumimoji="0" lang="en-US" sz="1400" b="1" i="0" u="none" strike="noStrike" kern="0" cap="none" spc="0" normalizeH="0" baseline="0" noProof="0" dirty="0" smtClean="0">
+                <a:rPr kumimoji="0" lang="en-US" sz="1400" b="1" i="0" u="none" strike="noStrike" kern="0" cap="none" spc="0" normalizeH="0" baseline="0" noProof="0" dirty="0">
                   <a:ln>
                     <a:noFill/>
                   </a:ln>
@@ -5848,7 +5823,7 @@
                 <a:t>Training set</a:t>
               </a:r>
               <a:br>
-                <a:rPr kumimoji="0" lang="en-US" sz="1400" b="1" i="0" u="none" strike="noStrike" kern="0" cap="none" spc="0" normalizeH="0" baseline="0" noProof="0" dirty="0" smtClean="0">
+                <a:rPr kumimoji="0" lang="en-US" sz="1400" b="1" i="0" u="none" strike="noStrike" kern="0" cap="none" spc="0" normalizeH="0" baseline="0" noProof="0" dirty="0">
                   <a:ln>
                     <a:noFill/>
                   </a:ln>
@@ -5864,7 +5839,7 @@
                 </a:rPr>
               </a:br>
               <a:r>
-                <a:rPr kumimoji="0" lang="en-US" sz="1400" b="1" i="0" u="none" strike="noStrike" kern="0" cap="none" spc="0" normalizeH="0" baseline="0" noProof="0" dirty="0" smtClean="0">
+                <a:rPr kumimoji="0" lang="en-US" sz="1400" b="1" i="0" u="none" strike="noStrike" kern="0" cap="none" spc="0" normalizeH="0" baseline="0" noProof="0" dirty="0">
                   <a:ln>
                     <a:noFill/>
                   </a:ln>
@@ -5935,7 +5910,7 @@
                 <a:defRPr/>
               </a:pPr>
               <a:r>
-                <a:rPr kumimoji="0" lang="en-US" sz="1400" b="1" i="0" u="none" strike="noStrike" kern="0" cap="none" spc="0" normalizeH="0" baseline="0" noProof="0" dirty="0" smtClean="0">
+                <a:rPr kumimoji="0" lang="en-US" sz="1400" b="1" i="0" u="none" strike="noStrike" kern="0" cap="none" spc="0" normalizeH="0" baseline="0" noProof="0" dirty="0">
                   <a:ln>
                     <a:noFill/>
                   </a:ln>
@@ -5952,7 +5927,7 @@
                 <a:t>Tune set</a:t>
               </a:r>
               <a:br>
-                <a:rPr kumimoji="0" lang="en-US" sz="1400" b="1" i="0" u="none" strike="noStrike" kern="0" cap="none" spc="0" normalizeH="0" baseline="0" noProof="0" dirty="0" smtClean="0">
+                <a:rPr kumimoji="0" lang="en-US" sz="1400" b="1" i="0" u="none" strike="noStrike" kern="0" cap="none" spc="0" normalizeH="0" baseline="0" noProof="0" dirty="0">
                   <a:ln>
                     <a:noFill/>
                   </a:ln>
@@ -5968,7 +5943,7 @@
                 </a:rPr>
               </a:br>
               <a:r>
-                <a:rPr kumimoji="0" lang="en-US" sz="1400" b="1" i="0" u="none" strike="noStrike" kern="0" cap="none" spc="0" normalizeH="0" baseline="0" noProof="0" dirty="0" smtClean="0">
+                <a:rPr kumimoji="0" lang="en-US" sz="1400" b="1" i="0" u="none" strike="noStrike" kern="0" cap="none" spc="0" normalizeH="0" baseline="0" noProof="0" dirty="0">
                   <a:ln>
                     <a:noFill/>
                   </a:ln>
@@ -6038,17 +6013,6 @@
                 <a:defRPr/>
               </a:pPr>
               <a:r>
-                <a:rPr lang="en-US" sz="1400" b="1" kern="0" dirty="0" smtClean="0">
-                  <a:solidFill>
-                    <a:prstClr val="white"/>
-                  </a:solidFill>
-                  <a:latin typeface="Calibri"/>
-                  <a:ea typeface=""/>
-                  <a:cs typeface=""/>
-                </a:rPr>
-                <a:t>3 SVM kernels or</a:t>
-              </a:r>
-              <a:r>
                 <a:rPr lang="en-US" sz="1400" b="1" kern="0" dirty="0">
                   <a:solidFill>
                     <a:prstClr val="white"/>
@@ -6057,18 +6021,7 @@
                   <a:ea typeface=""/>
                   <a:cs typeface=""/>
                 </a:rPr>
-                <a:t> </a:t>
-              </a:r>
-              <a:r>
-                <a:rPr lang="en-US" sz="1400" b="1" kern="0" dirty="0" smtClean="0">
-                  <a:solidFill>
-                    <a:prstClr val="white"/>
-                  </a:solidFill>
-                  <a:latin typeface="Calibri"/>
-                  <a:ea typeface=""/>
-                  <a:cs typeface=""/>
-                </a:rPr>
-                <a:t>RF</a:t>
+                <a:t>3 SVM kernels or RF</a:t>
               </a:r>
             </a:p>
             <a:p>
@@ -6090,7 +6043,7 @@
                 <a:defRPr/>
               </a:pPr>
               <a:r>
-                <a:rPr kumimoji="0" lang="en-US" sz="1400" i="0" u="none" strike="noStrike" kern="0" cap="none" spc="0" normalizeH="0" baseline="0" noProof="0" dirty="0" smtClean="0">
+                <a:rPr kumimoji="0" lang="en-US" sz="1400" i="0" u="none" strike="noStrike" kern="0" cap="none" spc="0" normalizeH="0" baseline="0" noProof="0" dirty="0">
                   <a:ln>
                     <a:noFill/>
                   </a:ln>
@@ -6161,7 +6114,7 @@
                 <a:defRPr/>
               </a:pPr>
               <a:r>
-                <a:rPr kumimoji="0" lang="en-US" sz="1400" b="1" i="0" u="none" strike="noStrike" kern="0" cap="none" spc="0" normalizeH="0" baseline="0" noProof="0" dirty="0" smtClean="0">
+                <a:rPr kumimoji="0" lang="en-US" sz="1400" b="1" i="0" u="none" strike="noStrike" kern="0" cap="none" spc="0" normalizeH="0" baseline="0" noProof="0" dirty="0">
                   <a:ln>
                     <a:noFill/>
                   </a:ln>
@@ -6356,7 +6309,7 @@
                 <a:tabLst/>
                 <a:defRPr/>
               </a:pPr>
-              <a:endParaRPr kumimoji="0" lang="en-US" sz="1800" b="0" i="0" u="none" strike="noStrike" kern="0" cap="none" spc="0" normalizeH="0" baseline="0" noProof="0" smtClean="0">
+              <a:endParaRPr kumimoji="0" lang="en-US" sz="1800" b="0" i="0" u="none" strike="noStrike" kern="0" cap="none" spc="0" normalizeH="0" baseline="0" noProof="0">
                 <a:ln>
                   <a:noFill/>
                 </a:ln>
@@ -6413,7 +6366,7 @@
                 <a:defRPr/>
               </a:pPr>
               <a:r>
-                <a:rPr kumimoji="0" lang="en-US" sz="2000" b="1" i="0" u="sng" strike="noStrike" kern="0" cap="none" spc="0" normalizeH="0" baseline="0" noProof="0" dirty="0" smtClean="0">
+                <a:rPr kumimoji="0" lang="en-US" sz="2000" b="1" i="0" u="sng" strike="noStrike" kern="0" cap="none" spc="0" normalizeH="0" baseline="0" noProof="0" dirty="0">
                   <a:ln>
                     <a:noFill/>
                   </a:ln>
@@ -6476,7 +6429,7 @@
                 <a:defRPr/>
               </a:pPr>
               <a:r>
-                <a:rPr kumimoji="0" lang="en-US" sz="1400" b="1" i="0" u="none" strike="noStrike" kern="0" cap="none" spc="0" normalizeH="0" baseline="0" noProof="0" dirty="0" smtClean="0">
+                <a:rPr kumimoji="0" lang="en-US" sz="1400" b="1" i="0" u="none" strike="noStrike" kern="0" cap="none" spc="0" normalizeH="0" baseline="0" noProof="0" dirty="0">
                   <a:ln>
                     <a:noFill/>
                   </a:ln>
@@ -6512,7 +6465,7 @@
                 <a:defRPr/>
               </a:pPr>
               <a:r>
-                <a:rPr kumimoji="0" lang="en-US" sz="1400" b="1" i="0" u="none" strike="noStrike" kern="0" cap="none" spc="0" normalizeH="0" baseline="0" noProof="0" dirty="0" smtClean="0">
+                <a:rPr kumimoji="0" lang="en-US" sz="1400" b="1" i="0" u="none" strike="noStrike" kern="0" cap="none" spc="0" normalizeH="0" baseline="0" noProof="0" dirty="0">
                   <a:ln>
                     <a:noFill/>
                   </a:ln>
@@ -6639,7 +6592,7 @@
                 <a:defRPr/>
               </a:pPr>
               <a:r>
-                <a:rPr kumimoji="0" lang="en-US" sz="1050" b="1" i="0" u="none" strike="noStrike" kern="0" cap="none" spc="0" normalizeH="0" baseline="0" noProof="0" dirty="0" smtClean="0">
+                <a:rPr kumimoji="0" lang="en-US" sz="1050" b="1" i="0" u="none" strike="noStrike" kern="0" cap="none" spc="0" normalizeH="0" baseline="0" noProof="0" dirty="0">
                   <a:ln>
                     <a:noFill/>
                   </a:ln>
@@ -6745,7 +6698,7 @@
               <a:tabLst/>
               <a:defRPr/>
             </a:pPr>
-            <a:endParaRPr kumimoji="0" lang="en-US" sz="2800" b="1" i="0" u="none" strike="noStrike" kern="0" cap="none" spc="300" normalizeH="0" baseline="0" noProof="0" dirty="0" smtClean="0">
+            <a:endParaRPr kumimoji="0" lang="en-US" sz="2800" b="1" i="0" u="none" strike="noStrike" kern="0" cap="none" spc="300" normalizeH="0" baseline="0" noProof="0" dirty="0">
               <a:ln>
                 <a:noFill/>
               </a:ln>
@@ -6839,7 +6792,7 @@
               <a:defRPr/>
             </a:pPr>
             <a:r>
-              <a:rPr kumimoji="0" lang="en-US" sz="1600" b="1" i="0" u="none" strike="noStrike" kern="0" cap="none" spc="0" normalizeH="0" baseline="0" noProof="0" dirty="0" smtClean="0">
+              <a:rPr kumimoji="0" lang="en-US" sz="1600" b="1" i="0" u="none" strike="noStrike" kern="0" cap="none" spc="0" normalizeH="0" baseline="0" noProof="0" dirty="0">
                 <a:ln>
                   <a:noFill/>
                 </a:ln>
@@ -6875,7 +6828,7 @@
               <a:defRPr/>
             </a:pPr>
             <a:r>
-              <a:rPr kumimoji="0" lang="en-US" sz="1600" b="1" i="0" u="none" strike="noStrike" kern="0" cap="none" spc="0" normalizeH="0" baseline="0" noProof="0" dirty="0" smtClean="0">
+              <a:rPr kumimoji="0" lang="en-US" sz="1600" b="1" i="0" u="none" strike="noStrike" kern="0" cap="none" spc="0" normalizeH="0" baseline="0" noProof="0" dirty="0">
                 <a:ln>
                   <a:noFill/>
                 </a:ln>
@@ -6891,7 +6844,7 @@
               </a:rPr>
               <a:t>DeSeq2, log transform.</a:t>
             </a:r>
-            <a:endParaRPr kumimoji="0" lang="en-US" sz="1400" b="1" i="0" u="none" strike="noStrike" kern="0" cap="none" spc="0" normalizeH="0" baseline="0" noProof="0" dirty="0" smtClean="0">
+            <a:endParaRPr kumimoji="0" lang="en-US" sz="1400" b="1" i="0" u="none" strike="noStrike" kern="0" cap="none" spc="0" normalizeH="0" baseline="0" noProof="0" dirty="0">
               <a:ln>
                 <a:noFill/>
               </a:ln>
@@ -6972,7 +6925,7 @@
                 <a:defRPr/>
               </a:pPr>
               <a:r>
-                <a:rPr kumimoji="0" lang="en-US" sz="1600" b="1" i="0" u="none" strike="noStrike" kern="0" cap="none" spc="0" normalizeH="0" baseline="0" noProof="0" dirty="0" smtClean="0">
+                <a:rPr kumimoji="0" lang="en-US" sz="1600" b="1" i="0" u="none" strike="noStrike" kern="0" cap="none" spc="0" normalizeH="0" baseline="0" noProof="0" dirty="0">
                   <a:ln>
                     <a:noFill/>
                   </a:ln>
@@ -7044,7 +6997,7 @@
                 <a:defRPr/>
               </a:pPr>
               <a:r>
-                <a:rPr kumimoji="0" lang="en-US" sz="1200" b="1" i="0" u="none" strike="noStrike" kern="0" cap="none" spc="0" normalizeH="0" baseline="0" noProof="0" dirty="0" smtClean="0">
+                <a:rPr kumimoji="0" lang="en-US" sz="1200" b="1" i="0" u="none" strike="noStrike" kern="0" cap="none" spc="0" normalizeH="0" baseline="0" noProof="0" dirty="0">
                   <a:ln>
                     <a:noFill/>
                   </a:ln>
@@ -7112,7 +7065,7 @@
               <a:defRPr/>
             </a:pPr>
             <a:r>
-              <a:rPr kumimoji="0" lang="en-US" sz="1600" b="1" i="0" u="none" strike="noStrike" kern="0" cap="none" spc="0" normalizeH="0" baseline="0" noProof="0" dirty="0" smtClean="0">
+              <a:rPr kumimoji="0" lang="en-US" sz="1600" b="1" i="0" u="none" strike="noStrike" kern="0" cap="none" spc="0" normalizeH="0" baseline="0" noProof="0" dirty="0">
                 <a:ln>
                   <a:noFill/>
                 </a:ln>
@@ -7180,7 +7133,7 @@
               <a:defRPr/>
             </a:pPr>
             <a:r>
-              <a:rPr kumimoji="0" lang="en-US" sz="1600" b="1" i="0" u="none" strike="noStrike" kern="0" cap="none" spc="0" normalizeH="0" baseline="0" noProof="0" dirty="0" smtClean="0">
+              <a:rPr kumimoji="0" lang="en-US" sz="1600" b="1" i="0" u="none" strike="noStrike" kern="0" cap="none" spc="0" normalizeH="0" baseline="0" noProof="0" dirty="0">
                 <a:ln>
                   <a:noFill/>
                 </a:ln>
@@ -7216,7 +7169,7 @@
               <a:defRPr/>
             </a:pPr>
             <a:r>
-              <a:rPr kumimoji="0" lang="en-US" sz="1600" b="1" i="0" u="none" strike="noStrike" kern="0" cap="none" spc="0" normalizeH="0" baseline="0" noProof="0" dirty="0" smtClean="0">
+              <a:rPr kumimoji="0" lang="en-US" sz="1600" b="1" i="0" u="none" strike="noStrike" kern="0" cap="none" spc="0" normalizeH="0" baseline="0" noProof="0" dirty="0">
                 <a:ln>
                   <a:noFill/>
                 </a:ln>
@@ -7232,7 +7185,7 @@
               </a:rPr>
               <a:t>(Protect sub-sample ratios)</a:t>
             </a:r>
-            <a:endParaRPr kumimoji="0" lang="en-US" sz="1600" b="0" i="0" u="none" strike="noStrike" kern="0" cap="none" spc="0" normalizeH="0" baseline="0" noProof="0" dirty="0" smtClean="0">
+            <a:endParaRPr kumimoji="0" lang="en-US" sz="1600" b="0" i="0" u="none" strike="noStrike" kern="0" cap="none" spc="0" normalizeH="0" baseline="0" noProof="0" dirty="0">
               <a:ln>
                 <a:noFill/>
               </a:ln>
@@ -7301,7 +7254,7 @@
               <a:defRPr/>
             </a:pPr>
             <a:r>
-              <a:rPr kumimoji="0" lang="en-US" sz="1600" b="1" i="0" u="none" strike="noStrike" kern="0" cap="none" spc="0" normalizeH="0" baseline="0" noProof="0" dirty="0" smtClean="0">
+              <a:rPr kumimoji="0" lang="en-US" sz="1600" b="1" i="0" u="none" strike="noStrike" kern="0" cap="none" spc="0" normalizeH="0" baseline="0" noProof="0" dirty="0">
                 <a:ln>
                   <a:noFill/>
                 </a:ln>
@@ -7318,7 +7271,7 @@
               <a:t>Training set</a:t>
             </a:r>
             <a:br>
-              <a:rPr kumimoji="0" lang="en-US" sz="1600" b="1" i="0" u="none" strike="noStrike" kern="0" cap="none" spc="0" normalizeH="0" baseline="0" noProof="0" dirty="0" smtClean="0">
+              <a:rPr kumimoji="0" lang="en-US" sz="1600" b="1" i="0" u="none" strike="noStrike" kern="0" cap="none" spc="0" normalizeH="0" baseline="0" noProof="0" dirty="0">
                 <a:ln>
                   <a:noFill/>
                 </a:ln>
@@ -7334,7 +7287,7 @@
               </a:rPr>
             </a:br>
             <a:r>
-              <a:rPr kumimoji="0" lang="en-US" sz="1600" b="1" i="0" u="none" strike="noStrike" kern="0" cap="none" spc="0" normalizeH="0" baseline="0" noProof="0" dirty="0" smtClean="0">
+              <a:rPr kumimoji="0" lang="en-US" sz="1600" b="1" i="0" u="none" strike="noStrike" kern="0" cap="none" spc="0" normalizeH="0" baseline="0" noProof="0" dirty="0">
                 <a:ln>
                   <a:noFill/>
                 </a:ln>
@@ -7405,7 +7358,7 @@
               <a:defRPr/>
             </a:pPr>
             <a:r>
-              <a:rPr kumimoji="0" lang="en-US" sz="1600" b="1" i="0" u="none" strike="noStrike" kern="0" cap="none" spc="0" normalizeH="0" baseline="0" noProof="0" dirty="0" smtClean="0">
+              <a:rPr kumimoji="0" lang="en-US" sz="1600" b="1" i="0" u="none" strike="noStrike" kern="0" cap="none" spc="0" normalizeH="0" baseline="0" noProof="0" dirty="0">
                 <a:ln>
                   <a:noFill/>
                 </a:ln>
@@ -7422,7 +7375,7 @@
               <a:t>Test set</a:t>
             </a:r>
             <a:br>
-              <a:rPr kumimoji="0" lang="en-US" sz="1600" b="1" i="0" u="none" strike="noStrike" kern="0" cap="none" spc="0" normalizeH="0" baseline="0" noProof="0" dirty="0" smtClean="0">
+              <a:rPr kumimoji="0" lang="en-US" sz="1600" b="1" i="0" u="none" strike="noStrike" kern="0" cap="none" spc="0" normalizeH="0" baseline="0" noProof="0" dirty="0">
                 <a:ln>
                   <a:noFill/>
                 </a:ln>
@@ -7438,7 +7391,7 @@
               </a:rPr>
             </a:br>
             <a:r>
-              <a:rPr kumimoji="0" lang="en-US" sz="1600" b="1" i="0" u="none" strike="noStrike" kern="0" cap="none" spc="0" normalizeH="0" baseline="0" noProof="0" dirty="0" smtClean="0">
+              <a:rPr kumimoji="0" lang="en-US" sz="1600" b="1" i="0" u="none" strike="noStrike" kern="0" cap="none" spc="0" normalizeH="0" baseline="0" noProof="0" dirty="0">
                 <a:ln>
                   <a:noFill/>
                 </a:ln>
@@ -7587,7 +7540,7 @@
               <a:defRPr/>
             </a:pPr>
             <a:r>
-              <a:rPr kumimoji="0" lang="en-US" sz="1400" b="1" i="0" u="none" strike="noStrike" kern="0" cap="none" spc="0" normalizeH="0" baseline="0" noProof="0" dirty="0" smtClean="0">
+              <a:rPr kumimoji="0" lang="en-US" sz="1400" b="1" i="0" u="none" strike="noStrike" kern="0" cap="none" spc="0" normalizeH="0" baseline="0" noProof="0" dirty="0">
                 <a:ln>
                   <a:noFill/>
                 </a:ln>
@@ -7604,7 +7557,7 @@
               <a:t>PCA</a:t>
             </a:r>
             <a:br>
-              <a:rPr kumimoji="0" lang="en-US" sz="1400" b="1" i="0" u="none" strike="noStrike" kern="0" cap="none" spc="0" normalizeH="0" baseline="0" noProof="0" dirty="0" smtClean="0">
+              <a:rPr kumimoji="0" lang="en-US" sz="1400" b="1" i="0" u="none" strike="noStrike" kern="0" cap="none" spc="0" normalizeH="0" baseline="0" noProof="0" dirty="0">
                 <a:ln>
                   <a:noFill/>
                 </a:ln>
@@ -7620,7 +7573,7 @@
               </a:rPr>
             </a:br>
             <a:r>
-              <a:rPr kumimoji="0" lang="en-US" sz="1600" b="1" i="0" u="none" strike="noStrike" kern="0" cap="none" spc="0" normalizeH="0" baseline="0" noProof="0" dirty="0" smtClean="0">
+              <a:rPr kumimoji="0" lang="en-US" sz="1600" b="1" i="0" u="none" strike="noStrike" kern="0" cap="none" spc="0" normalizeH="0" baseline="0" noProof="0" dirty="0">
                 <a:ln>
                   <a:noFill/>
                 </a:ln>
@@ -7637,7 +7590,7 @@
               <a:t>rotation</a:t>
             </a:r>
             <a:r>
-              <a:rPr kumimoji="0" lang="en-US" sz="1400" b="1" i="0" u="none" strike="noStrike" kern="0" cap="none" spc="0" normalizeH="0" baseline="0" noProof="0" dirty="0" smtClean="0">
+              <a:rPr kumimoji="0" lang="en-US" sz="1400" b="1" i="0" u="none" strike="noStrike" kern="0" cap="none" spc="0" normalizeH="0" baseline="0" noProof="0" dirty="0">
                 <a:ln>
                   <a:noFill/>
                 </a:ln>
@@ -7708,7 +7661,7 @@
               <a:defRPr/>
             </a:pPr>
             <a:r>
-              <a:rPr kumimoji="0" lang="en-US" sz="1600" b="1" i="0" u="none" strike="noStrike" kern="0" cap="none" spc="0" normalizeH="0" baseline="0" noProof="0" dirty="0" smtClean="0">
+              <a:rPr kumimoji="0" lang="en-US" sz="1600" b="1" i="0" u="none" strike="noStrike" kern="0" cap="none" spc="0" normalizeH="0" baseline="0" noProof="0" dirty="0">
                 <a:ln>
                   <a:noFill/>
                 </a:ln>
@@ -7744,7 +7697,7 @@
               <a:defRPr/>
             </a:pPr>
             <a:r>
-              <a:rPr kumimoji="0" lang="en-US" sz="1600" b="1" i="0" u="none" strike="noStrike" kern="0" cap="none" spc="0" normalizeH="0" baseline="0" noProof="0" dirty="0" smtClean="0">
+              <a:rPr kumimoji="0" lang="en-US" sz="1600" b="1" i="0" u="none" strike="noStrike" kern="0" cap="none" spc="0" normalizeH="0" baseline="0" noProof="0" dirty="0">
                 <a:ln>
                   <a:noFill/>
                 </a:ln>
@@ -7826,20 +7779,12 @@
               <a:defRPr/>
             </a:pPr>
             <a:r>
-              <a:rPr lang="en-US" sz="1600" b="1" kern="0" dirty="0" smtClean="0">
-                <a:solidFill>
-                  <a:prstClr val="white"/>
-                </a:solidFill>
-              </a:rPr>
-              <a:t>Train 3 </a:t>
-            </a:r>
-            <a:r>
               <a:rPr lang="en-US" sz="1600" b="1" kern="0" dirty="0">
                 <a:solidFill>
                   <a:prstClr val="white"/>
                 </a:solidFill>
               </a:rPr>
-              <a:t>SVM kernels or RF</a:t>
+              <a:t>Train 3 SVM kernels or RF</a:t>
             </a:r>
           </a:p>
           <a:p>
@@ -7861,7 +7806,7 @@
               <a:defRPr/>
             </a:pPr>
             <a:r>
-              <a:rPr lang="en-US" sz="1600" b="1" kern="0" noProof="0" dirty="0" smtClean="0">
+              <a:rPr lang="en-US" sz="1600" b="1" kern="0" noProof="0" dirty="0">
                 <a:solidFill>
                   <a:prstClr val="white"/>
                 </a:solidFill>
@@ -7872,7 +7817,7 @@
               <a:t>with</a:t>
             </a:r>
             <a:r>
-              <a:rPr kumimoji="0" lang="en-US" sz="1600" b="1" i="0" u="none" strike="noStrike" kern="0" cap="none" spc="0" normalizeH="0" baseline="0" noProof="0" dirty="0" smtClean="0">
+              <a:rPr kumimoji="0" lang="en-US" sz="1600" b="1" i="0" u="none" strike="noStrike" kern="0" cap="none" spc="0" normalizeH="0" baseline="0" noProof="0" dirty="0">
                 <a:ln>
                   <a:noFill/>
                 </a:ln>
@@ -7888,7 +7833,7 @@
               </a:rPr>
               <a:t> tuning</a:t>
             </a:r>
-            <a:endParaRPr kumimoji="0" lang="en-US" sz="1050" b="1" i="0" u="none" strike="noStrike" kern="0" cap="none" spc="0" normalizeH="0" baseline="0" noProof="0" dirty="0" smtClean="0">
+            <a:endParaRPr kumimoji="0" lang="en-US" sz="1050" b="1" i="0" u="none" strike="noStrike" kern="0" cap="none" spc="0" normalizeH="0" baseline="0" noProof="0" dirty="0">
               <a:ln>
                 <a:noFill/>
               </a:ln>
@@ -8013,7 +7958,7 @@
               <a:defRPr/>
             </a:pPr>
             <a:r>
-              <a:rPr kumimoji="0" lang="en-US" sz="1600" b="1" i="0" u="none" strike="noStrike" kern="0" cap="none" spc="0" normalizeH="0" baseline="0" noProof="0" dirty="0" smtClean="0">
+              <a:rPr kumimoji="0" lang="en-US" sz="1600" b="1" i="0" u="none" strike="noStrike" kern="0" cap="none" spc="0" normalizeH="0" baseline="0" noProof="0" dirty="0">
                 <a:ln>
                   <a:noFill/>
                 </a:ln>
@@ -8106,7 +8051,7 @@
               <a:tabLst/>
               <a:defRPr/>
             </a:pPr>
-            <a:endParaRPr kumimoji="0" lang="en-US" sz="2000" b="0" i="0" u="none" strike="noStrike" kern="0" cap="none" spc="0" normalizeH="0" baseline="0" noProof="0" smtClean="0">
+            <a:endParaRPr kumimoji="0" lang="en-US" sz="2000" b="0" i="0" u="none" strike="noStrike" kern="0" cap="none" spc="0" normalizeH="0" baseline="0" noProof="0">
               <a:ln>
                 <a:noFill/>
               </a:ln>
@@ -8174,7 +8119,7 @@
               <a:defRPr/>
             </a:pPr>
             <a:r>
-              <a:rPr kumimoji="0" lang="en-US" sz="2000" b="1" i="0" u="none" strike="noStrike" kern="0" cap="none" spc="0" normalizeH="0" baseline="0" noProof="0" dirty="0" smtClean="0">
+              <a:rPr kumimoji="0" lang="en-US" sz="2000" b="1" i="0" u="none" strike="noStrike" kern="0" cap="none" spc="0" normalizeH="0" baseline="0" noProof="0" dirty="0">
                 <a:ln>
                   <a:noFill/>
                 </a:ln>
@@ -8191,7 +8136,7 @@
               <a:t>Recalculate </a:t>
             </a:r>
             <a:r>
-              <a:rPr lang="en-US" sz="2000" b="1" kern="0" dirty="0" smtClean="0">
+              <a:rPr lang="en-US" sz="2000" b="1" kern="0" dirty="0">
                 <a:solidFill>
                   <a:prstClr val="black"/>
                 </a:solidFill>
@@ -8202,7 +8147,7 @@
               <a:t>60</a:t>
             </a:r>
             <a:r>
-              <a:rPr kumimoji="0" lang="en-US" sz="2000" b="1" i="0" u="none" strike="noStrike" kern="0" cap="none" spc="0" normalizeH="0" baseline="0" noProof="0" dirty="0" smtClean="0">
+              <a:rPr kumimoji="0" lang="en-US" sz="2000" b="1" i="0" u="none" strike="noStrike" kern="0" cap="none" spc="0" normalizeH="0" baseline="0" noProof="0" dirty="0">
                 <a:ln>
                   <a:noFill/>
                 </a:ln>
@@ -8270,7 +8215,7 @@
               <a:defRPr/>
             </a:pPr>
             <a:r>
-              <a:rPr kumimoji="0" lang="en-US" sz="1600" b="1" i="0" u="none" strike="noStrike" kern="0" cap="none" spc="0" normalizeH="0" baseline="0" noProof="0" dirty="0" smtClean="0">
+              <a:rPr kumimoji="0" lang="en-US" sz="1600" b="1" i="0" u="none" strike="noStrike" kern="0" cap="none" spc="0" normalizeH="0" baseline="0" noProof="0" dirty="0">
                 <a:ln>
                   <a:noFill/>
                 </a:ln>
@@ -8287,7 +8232,7 @@
               <a:t>Batch Correction (</a:t>
             </a:r>
             <a:r>
-              <a:rPr kumimoji="0" lang="en-US" sz="1600" b="1" i="0" u="none" strike="noStrike" kern="0" cap="none" spc="0" normalizeH="0" baseline="0" noProof="0" dirty="0" err="1" smtClean="0">
+              <a:rPr kumimoji="0" lang="en-US" sz="1600" b="1" i="0" u="none" strike="noStrike" kern="0" cap="none" spc="0" normalizeH="0" baseline="0" noProof="0" dirty="0" err="1">
                 <a:ln>
                   <a:noFill/>
                 </a:ln>
@@ -8304,7 +8249,7 @@
               <a:t>fSVA</a:t>
             </a:r>
             <a:r>
-              <a:rPr kumimoji="0" lang="en-US" sz="1600" b="1" i="0" u="none" strike="noStrike" kern="0" cap="none" spc="0" normalizeH="0" baseline="0" noProof="0" dirty="0" smtClean="0">
+              <a:rPr kumimoji="0" lang="en-US" sz="1600" b="1" i="0" u="none" strike="noStrike" kern="0" cap="none" spc="0" normalizeH="0" baseline="0" noProof="0" dirty="0">
                 <a:ln>
                   <a:noFill/>
                 </a:ln>
@@ -8375,7 +8320,7 @@
               <a:defRPr/>
             </a:pPr>
             <a:r>
-              <a:rPr kumimoji="0" lang="en-US" sz="1600" b="1" i="0" u="none" strike="noStrike" kern="0" cap="none" spc="0" normalizeH="0" baseline="0" noProof="0" dirty="0" smtClean="0">
+              <a:rPr kumimoji="0" lang="en-US" sz="1600" b="1" i="0" u="none" strike="noStrike" kern="0" cap="none" spc="0" normalizeH="0" baseline="0" noProof="0" dirty="0">
                 <a:ln>
                   <a:noFill/>
                 </a:ln>
@@ -8392,7 +8337,7 @@
               <a:t>Batch</a:t>
             </a:r>
             <a:br>
-              <a:rPr kumimoji="0" lang="en-US" sz="1600" b="1" i="0" u="none" strike="noStrike" kern="0" cap="none" spc="0" normalizeH="0" baseline="0" noProof="0" dirty="0" smtClean="0">
+              <a:rPr kumimoji="0" lang="en-US" sz="1600" b="1" i="0" u="none" strike="noStrike" kern="0" cap="none" spc="0" normalizeH="0" baseline="0" noProof="0" dirty="0">
                 <a:ln>
                   <a:noFill/>
                 </a:ln>
@@ -8408,7 +8353,7 @@
               </a:rPr>
             </a:br>
             <a:r>
-              <a:rPr kumimoji="0" lang="en-US" sz="1600" b="1" i="0" u="none" strike="noStrike" kern="0" cap="none" spc="0" normalizeH="0" baseline="0" noProof="0" dirty="0" smtClean="0">
+              <a:rPr kumimoji="0" lang="en-US" sz="1600" b="1" i="0" u="none" strike="noStrike" kern="0" cap="none" spc="0" normalizeH="0" baseline="0" noProof="0" dirty="0">
                 <a:ln>
                   <a:noFill/>
                 </a:ln>
@@ -8558,7 +8503,7 @@
               <a:defRPr/>
             </a:pPr>
             <a:r>
-              <a:rPr kumimoji="0" lang="en-US" sz="1050" b="1" i="0" u="none" strike="noStrike" kern="0" cap="none" spc="0" normalizeH="0" baseline="0" noProof="0" dirty="0" smtClean="0">
+              <a:rPr kumimoji="0" lang="en-US" sz="1050" b="1" i="0" u="none" strike="noStrike" kern="0" cap="none" spc="0" normalizeH="0" baseline="0" noProof="0" dirty="0">
                 <a:ln>
                   <a:noFill/>
                 </a:ln>
@@ -8626,7 +8571,7 @@
               <a:defRPr/>
             </a:pPr>
             <a:r>
-              <a:rPr kumimoji="0" lang="en-US" sz="1600" b="1" i="0" u="none" strike="noStrike" kern="0" cap="none" spc="0" normalizeH="0" baseline="0" noProof="0" dirty="0" smtClean="0">
+              <a:rPr kumimoji="0" lang="en-US" sz="1600" b="1" i="0" u="none" strike="noStrike" kern="0" cap="none" spc="0" normalizeH="0" baseline="0" noProof="0" dirty="0">
                 <a:ln>
                   <a:noFill/>
                 </a:ln>
@@ -8873,7 +8818,7 @@
                   <a:defRPr/>
                 </a:pPr>
                 <a:r>
-                  <a:rPr kumimoji="0" lang="en-US" sz="1400" b="1" i="0" u="none" strike="noStrike" kern="0" cap="none" spc="0" normalizeH="0" baseline="0" noProof="0" dirty="0" smtClean="0">
+                  <a:rPr kumimoji="0" lang="en-US" sz="1400" b="1" i="0" u="none" strike="noStrike" kern="0" cap="none" spc="0" normalizeH="0" baseline="0" noProof="0" dirty="0">
                     <a:ln>
                       <a:noFill/>
                     </a:ln>
@@ -8890,7 +8835,7 @@
                   <a:t>Training set</a:t>
                 </a:r>
                 <a:br>
-                  <a:rPr kumimoji="0" lang="en-US" sz="1400" b="1" i="0" u="none" strike="noStrike" kern="0" cap="none" spc="0" normalizeH="0" baseline="0" noProof="0" dirty="0" smtClean="0">
+                  <a:rPr kumimoji="0" lang="en-US" sz="1400" b="1" i="0" u="none" strike="noStrike" kern="0" cap="none" spc="0" normalizeH="0" baseline="0" noProof="0" dirty="0">
                     <a:ln>
                       <a:noFill/>
                     </a:ln>
@@ -8906,7 +8851,7 @@
                   </a:rPr>
                 </a:br>
                 <a:r>
-                  <a:rPr kumimoji="0" lang="en-US" sz="1400" b="1" i="0" u="none" strike="noStrike" kern="0" cap="none" spc="0" normalizeH="0" baseline="0" noProof="0" dirty="0" smtClean="0">
+                  <a:rPr kumimoji="0" lang="en-US" sz="1400" b="1" i="0" u="none" strike="noStrike" kern="0" cap="none" spc="0" normalizeH="0" baseline="0" noProof="0" dirty="0">
                     <a:ln>
                       <a:noFill/>
                     </a:ln>
@@ -8978,7 +8923,7 @@
                   <a:defRPr/>
                 </a:pPr>
                 <a:r>
-                  <a:rPr kumimoji="0" lang="en-US" sz="1050" b="1" i="0" u="none" strike="noStrike" kern="0" cap="none" spc="0" normalizeH="0" baseline="0" noProof="0" dirty="0" smtClean="0">
+                  <a:rPr kumimoji="0" lang="en-US" sz="1050" b="1" i="0" u="none" strike="noStrike" kern="0" cap="none" spc="0" normalizeH="0" baseline="0" noProof="0" dirty="0">
                     <a:ln>
                       <a:noFill/>
                     </a:ln>
@@ -9051,23 +8996,7 @@
                     <a:prstClr val="white"/>
                   </a:solidFill>
                 </a:rPr>
-                <a:t>(Protect </a:t>
-              </a:r>
-              <a:r>
-                <a:rPr lang="en-US" sz="1400" b="1" kern="0" dirty="0" smtClean="0">
-                  <a:solidFill>
-                    <a:prstClr val="white"/>
-                  </a:solidFill>
-                </a:rPr>
-                <a:t>sub-sample </a:t>
-              </a:r>
-              <a:r>
-                <a:rPr lang="en-US" sz="1400" b="1" kern="0" dirty="0">
-                  <a:solidFill>
-                    <a:prstClr val="white"/>
-                  </a:solidFill>
-                </a:rPr>
-                <a:t>ratios)</a:t>
+                <a:t>(Protect sub-sample ratios)</a:t>
               </a:r>
               <a:endParaRPr lang="en-US" sz="1400" kern="0" dirty="0">
                 <a:solidFill>
@@ -9113,7 +9042,7 @@
                 <a:defRPr/>
               </a:pPr>
               <a:r>
-                <a:rPr kumimoji="0" lang="en-US" sz="1400" b="1" i="0" u="none" strike="noStrike" kern="0" cap="none" spc="0" normalizeH="0" baseline="0" noProof="0" dirty="0" smtClean="0">
+                <a:rPr kumimoji="0" lang="en-US" sz="1400" b="1" i="0" u="none" strike="noStrike" kern="0" cap="none" spc="0" normalizeH="0" baseline="0" noProof="0" dirty="0">
                   <a:ln>
                     <a:noFill/>
                   </a:ln>
@@ -9129,7 +9058,7 @@
                 </a:rPr>
                 <a:t>Model</a:t>
               </a:r>
-              <a:endParaRPr kumimoji="0" lang="en-US" sz="1200" b="1" i="0" u="none" strike="noStrike" kern="0" cap="none" spc="0" normalizeH="0" baseline="-25000" noProof="0" dirty="0" smtClean="0">
+              <a:endParaRPr kumimoji="0" lang="en-US" sz="1200" b="1" i="0" u="none" strike="noStrike" kern="0" cap="none" spc="0" normalizeH="0" baseline="-25000" noProof="0" dirty="0">
                 <a:ln>
                   <a:noFill/>
                 </a:ln>
@@ -9198,7 +9127,7 @@
                 <a:defRPr/>
               </a:pPr>
               <a:r>
-                <a:rPr kumimoji="0" lang="en-US" sz="1400" b="1" i="0" u="none" strike="noStrike" kern="0" cap="none" spc="0" normalizeH="0" baseline="0" noProof="0" dirty="0" smtClean="0">
+                <a:rPr kumimoji="0" lang="en-US" sz="1400" b="1" i="0" u="none" strike="noStrike" kern="0" cap="none" spc="0" normalizeH="0" baseline="0" noProof="0" dirty="0">
                   <a:ln>
                     <a:noFill/>
                   </a:ln>
@@ -9215,7 +9144,7 @@
                 <a:t>Training set</a:t>
               </a:r>
               <a:br>
-                <a:rPr kumimoji="0" lang="en-US" sz="1400" b="1" i="0" u="none" strike="noStrike" kern="0" cap="none" spc="0" normalizeH="0" baseline="0" noProof="0" dirty="0" smtClean="0">
+                <a:rPr kumimoji="0" lang="en-US" sz="1400" b="1" i="0" u="none" strike="noStrike" kern="0" cap="none" spc="0" normalizeH="0" baseline="0" noProof="0" dirty="0">
                   <a:ln>
                     <a:noFill/>
                   </a:ln>
@@ -9231,7 +9160,7 @@
                 </a:rPr>
               </a:br>
               <a:r>
-                <a:rPr kumimoji="0" lang="en-US" sz="1400" b="1" i="0" u="none" strike="noStrike" kern="0" cap="none" spc="0" normalizeH="0" baseline="0" noProof="0" dirty="0" smtClean="0">
+                <a:rPr kumimoji="0" lang="en-US" sz="1400" b="1" i="0" u="none" strike="noStrike" kern="0" cap="none" spc="0" normalizeH="0" baseline="0" noProof="0" dirty="0">
                   <a:ln>
                     <a:noFill/>
                   </a:ln>
@@ -9302,7 +9231,7 @@
                 <a:defRPr/>
               </a:pPr>
               <a:r>
-                <a:rPr kumimoji="0" lang="en-US" sz="1400" b="1" i="0" u="none" strike="noStrike" kern="0" cap="none" spc="0" normalizeH="0" baseline="0" noProof="0" dirty="0" smtClean="0">
+                <a:rPr kumimoji="0" lang="en-US" sz="1400" b="1" i="0" u="none" strike="noStrike" kern="0" cap="none" spc="0" normalizeH="0" baseline="0" noProof="0" dirty="0">
                   <a:ln>
                     <a:noFill/>
                   </a:ln>
@@ -9319,7 +9248,7 @@
                 <a:t>Tune set</a:t>
               </a:r>
               <a:br>
-                <a:rPr kumimoji="0" lang="en-US" sz="1400" b="1" i="0" u="none" strike="noStrike" kern="0" cap="none" spc="0" normalizeH="0" baseline="0" noProof="0" dirty="0" smtClean="0">
+                <a:rPr kumimoji="0" lang="en-US" sz="1400" b="1" i="0" u="none" strike="noStrike" kern="0" cap="none" spc="0" normalizeH="0" baseline="0" noProof="0" dirty="0">
                   <a:ln>
                     <a:noFill/>
                   </a:ln>
@@ -9335,7 +9264,7 @@
                 </a:rPr>
               </a:br>
               <a:r>
-                <a:rPr kumimoji="0" lang="en-US" sz="1400" b="1" i="0" u="none" strike="noStrike" kern="0" cap="none" spc="0" normalizeH="0" baseline="0" noProof="0" dirty="0" smtClean="0">
+                <a:rPr kumimoji="0" lang="en-US" sz="1400" b="1" i="0" u="none" strike="noStrike" kern="0" cap="none" spc="0" normalizeH="0" baseline="0" noProof="0" dirty="0">
                   <a:ln>
                     <a:noFill/>
                   </a:ln>
@@ -9405,17 +9334,6 @@
                 <a:defRPr/>
               </a:pPr>
               <a:r>
-                <a:rPr lang="en-US" sz="1400" b="1" kern="0" dirty="0" smtClean="0">
-                  <a:solidFill>
-                    <a:prstClr val="white"/>
-                  </a:solidFill>
-                  <a:latin typeface="Calibri"/>
-                  <a:ea typeface=""/>
-                  <a:cs typeface=""/>
-                </a:rPr>
-                <a:t>3 SVM kernels or</a:t>
-              </a:r>
-              <a:r>
                 <a:rPr lang="en-US" sz="1400" b="1" kern="0" dirty="0">
                   <a:solidFill>
                     <a:prstClr val="white"/>
@@ -9424,18 +9342,7 @@
                   <a:ea typeface=""/>
                   <a:cs typeface=""/>
                 </a:rPr>
-                <a:t> </a:t>
-              </a:r>
-              <a:r>
-                <a:rPr lang="en-US" sz="1400" b="1" kern="0" dirty="0" smtClean="0">
-                  <a:solidFill>
-                    <a:prstClr val="white"/>
-                  </a:solidFill>
-                  <a:latin typeface="Calibri"/>
-                  <a:ea typeface=""/>
-                  <a:cs typeface=""/>
-                </a:rPr>
-                <a:t>RF</a:t>
+                <a:t>3 SVM kernels or RF</a:t>
               </a:r>
             </a:p>
             <a:p>
@@ -9457,7 +9364,7 @@
                 <a:defRPr/>
               </a:pPr>
               <a:r>
-                <a:rPr kumimoji="0" lang="en-US" sz="1400" i="0" u="none" strike="noStrike" kern="0" cap="none" spc="0" normalizeH="0" baseline="0" noProof="0" dirty="0" smtClean="0">
+                <a:rPr kumimoji="0" lang="en-US" sz="1400" i="0" u="none" strike="noStrike" kern="0" cap="none" spc="0" normalizeH="0" baseline="0" noProof="0" dirty="0">
                   <a:ln>
                     <a:noFill/>
                   </a:ln>
@@ -9528,7 +9435,7 @@
                 <a:defRPr/>
               </a:pPr>
               <a:r>
-                <a:rPr kumimoji="0" lang="en-US" sz="1400" b="1" i="0" u="none" strike="noStrike" kern="0" cap="none" spc="0" normalizeH="0" baseline="0" noProof="0" dirty="0" smtClean="0">
+                <a:rPr kumimoji="0" lang="en-US" sz="1400" b="1" i="0" u="none" strike="noStrike" kern="0" cap="none" spc="0" normalizeH="0" baseline="0" noProof="0" dirty="0">
                   <a:ln>
                     <a:noFill/>
                   </a:ln>
@@ -9723,7 +9630,7 @@
                 <a:tabLst/>
                 <a:defRPr/>
               </a:pPr>
-              <a:endParaRPr kumimoji="0" lang="en-US" sz="1800" b="0" i="0" u="none" strike="noStrike" kern="0" cap="none" spc="0" normalizeH="0" baseline="0" noProof="0" smtClean="0">
+              <a:endParaRPr kumimoji="0" lang="en-US" sz="1800" b="0" i="0" u="none" strike="noStrike" kern="0" cap="none" spc="0" normalizeH="0" baseline="0" noProof="0">
                 <a:ln>
                   <a:noFill/>
                 </a:ln>
@@ -9780,7 +9687,7 @@
                 <a:defRPr/>
               </a:pPr>
               <a:r>
-                <a:rPr kumimoji="0" lang="en-US" sz="2000" b="1" i="0" u="sng" strike="noStrike" kern="0" cap="none" spc="0" normalizeH="0" baseline="0" noProof="0" dirty="0" smtClean="0">
+                <a:rPr kumimoji="0" lang="en-US" sz="2000" b="1" i="0" u="sng" strike="noStrike" kern="0" cap="none" spc="0" normalizeH="0" baseline="0" noProof="0" dirty="0">
                   <a:ln>
                     <a:noFill/>
                   </a:ln>
@@ -9843,7 +9750,7 @@
                 <a:defRPr/>
               </a:pPr>
               <a:r>
-                <a:rPr kumimoji="0" lang="en-US" sz="1400" b="1" i="0" u="none" strike="noStrike" kern="0" cap="none" spc="0" normalizeH="0" baseline="0" noProof="0" dirty="0" smtClean="0">
+                <a:rPr kumimoji="0" lang="en-US" sz="1400" b="1" i="0" u="none" strike="noStrike" kern="0" cap="none" spc="0" normalizeH="0" baseline="0" noProof="0" dirty="0">
                   <a:ln>
                     <a:noFill/>
                   </a:ln>
@@ -9879,7 +9786,7 @@
                 <a:defRPr/>
               </a:pPr>
               <a:r>
-                <a:rPr kumimoji="0" lang="en-US" sz="1400" b="1" i="0" u="none" strike="noStrike" kern="0" cap="none" spc="0" normalizeH="0" baseline="0" noProof="0" dirty="0" smtClean="0">
+                <a:rPr kumimoji="0" lang="en-US" sz="1400" b="1" i="0" u="none" strike="noStrike" kern="0" cap="none" spc="0" normalizeH="0" baseline="0" noProof="0" dirty="0">
                   <a:ln>
                     <a:noFill/>
                   </a:ln>
@@ -10006,7 +9913,7 @@
                 <a:defRPr/>
               </a:pPr>
               <a:r>
-                <a:rPr kumimoji="0" lang="en-US" sz="1050" b="1" i="0" u="none" strike="noStrike" kern="0" cap="none" spc="0" normalizeH="0" baseline="0" noProof="0" dirty="0" smtClean="0">
+                <a:rPr kumimoji="0" lang="en-US" sz="1050" b="1" i="0" u="none" strike="noStrike" kern="0" cap="none" spc="0" normalizeH="0" baseline="0" noProof="0" dirty="0">
                   <a:ln>
                     <a:noFill/>
                   </a:ln>

</xml_diff>

<commit_message>
altered pipeline fig to include validation terminology, addressed comments
</commit_message>
<xml_diff>
--- a/text/figures/figrue_preperation/Figure2_Pipelinev6.pptx
+++ b/text/figures/figrue_preperation/Figure2_Pipelinev6.pptx
@@ -198,7 +198,7 @@
           <a:p>
             <a:fld id="{80C3A0DF-E67B-874F-B4A4-3E5F3D83D257}" type="datetimeFigureOut">
               <a:rPr lang="en-US" smtClean="0"/>
-              <a:t>5/17/18</a:t>
+              <a:t>9/27/18</a:t>
             </a:fld>
             <a:endParaRPr lang="en-US"/>
           </a:p>
@@ -596,7 +596,7 @@
           <a:p>
             <a:fld id="{4856EAA0-066D-F742-A240-D4440EBDD303}" type="datetimeFigureOut">
               <a:rPr lang="en-US" smtClean="0"/>
-              <a:t>5/17/18</a:t>
+              <a:t>9/27/18</a:t>
             </a:fld>
             <a:endParaRPr lang="en-US"/>
           </a:p>
@@ -766,7 +766,7 @@
           <a:p>
             <a:fld id="{4856EAA0-066D-F742-A240-D4440EBDD303}" type="datetimeFigureOut">
               <a:rPr lang="en-US" smtClean="0"/>
-              <a:t>5/17/18</a:t>
+              <a:t>9/27/18</a:t>
             </a:fld>
             <a:endParaRPr lang="en-US"/>
           </a:p>
@@ -946,7 +946,7 @@
           <a:p>
             <a:fld id="{4856EAA0-066D-F742-A240-D4440EBDD303}" type="datetimeFigureOut">
               <a:rPr lang="en-US" smtClean="0"/>
-              <a:t>5/17/18</a:t>
+              <a:t>9/27/18</a:t>
             </a:fld>
             <a:endParaRPr lang="en-US"/>
           </a:p>
@@ -1116,7 +1116,7 @@
           <a:p>
             <a:fld id="{4856EAA0-066D-F742-A240-D4440EBDD303}" type="datetimeFigureOut">
               <a:rPr lang="en-US" smtClean="0"/>
-              <a:t>5/17/18</a:t>
+              <a:t>9/27/18</a:t>
             </a:fld>
             <a:endParaRPr lang="en-US"/>
           </a:p>
@@ -1360,7 +1360,7 @@
           <a:p>
             <a:fld id="{4856EAA0-066D-F742-A240-D4440EBDD303}" type="datetimeFigureOut">
               <a:rPr lang="en-US" smtClean="0"/>
-              <a:t>5/17/18</a:t>
+              <a:t>9/27/18</a:t>
             </a:fld>
             <a:endParaRPr lang="en-US"/>
           </a:p>
@@ -1592,7 +1592,7 @@
           <a:p>
             <a:fld id="{4856EAA0-066D-F742-A240-D4440EBDD303}" type="datetimeFigureOut">
               <a:rPr lang="en-US" smtClean="0"/>
-              <a:t>5/17/18</a:t>
+              <a:t>9/27/18</a:t>
             </a:fld>
             <a:endParaRPr lang="en-US"/>
           </a:p>
@@ -1959,7 +1959,7 @@
           <a:p>
             <a:fld id="{4856EAA0-066D-F742-A240-D4440EBDD303}" type="datetimeFigureOut">
               <a:rPr lang="en-US" smtClean="0"/>
-              <a:t>5/17/18</a:t>
+              <a:t>9/27/18</a:t>
             </a:fld>
             <a:endParaRPr lang="en-US"/>
           </a:p>
@@ -2077,7 +2077,7 @@
           <a:p>
             <a:fld id="{4856EAA0-066D-F742-A240-D4440EBDD303}" type="datetimeFigureOut">
               <a:rPr lang="en-US" smtClean="0"/>
-              <a:t>5/17/18</a:t>
+              <a:t>9/27/18</a:t>
             </a:fld>
             <a:endParaRPr lang="en-US"/>
           </a:p>
@@ -2172,7 +2172,7 @@
           <a:p>
             <a:fld id="{4856EAA0-066D-F742-A240-D4440EBDD303}" type="datetimeFigureOut">
               <a:rPr lang="en-US" smtClean="0"/>
-              <a:t>5/17/18</a:t>
+              <a:t>9/27/18</a:t>
             </a:fld>
             <a:endParaRPr lang="en-US"/>
           </a:p>
@@ -2449,7 +2449,7 @@
           <a:p>
             <a:fld id="{4856EAA0-066D-F742-A240-D4440EBDD303}" type="datetimeFigureOut">
               <a:rPr lang="en-US" smtClean="0"/>
-              <a:t>5/17/18</a:t>
+              <a:t>9/27/18</a:t>
             </a:fld>
             <a:endParaRPr lang="en-US"/>
           </a:p>
@@ -2706,7 +2706,7 @@
           <a:p>
             <a:fld id="{4856EAA0-066D-F742-A240-D4440EBDD303}" type="datetimeFigureOut">
               <a:rPr lang="en-US" smtClean="0"/>
-              <a:t>5/17/18</a:t>
+              <a:t>9/27/18</a:t>
             </a:fld>
             <a:endParaRPr lang="en-US"/>
           </a:p>
@@ -2919,7 +2919,7 @@
           <a:p>
             <a:fld id="{4856EAA0-066D-F742-A240-D4440EBDD303}" type="datetimeFigureOut">
               <a:rPr lang="en-US" smtClean="0"/>
-              <a:t>5/17/18</a:t>
+              <a:t>9/27/18</a:t>
             </a:fld>
             <a:endParaRPr lang="en-US"/>
           </a:p>
@@ -3397,34 +3397,6 @@
           </a:p>
         </p:txBody>
       </p:sp>
-      <p:cxnSp>
-        <p:nvCxnSpPr>
-          <p:cNvPr id="63" name="Curved Connector 17"/>
-          <p:cNvCxnSpPr>
-            <a:endCxn id="72" idx="0"/>
-          </p:cNvCxnSpPr>
-          <p:nvPr/>
-        </p:nvCxnSpPr>
-        <p:spPr>
-          <a:xfrm>
-            <a:off x="4348120" y="3010782"/>
-            <a:ext cx="3847374" cy="733358"/>
-          </a:xfrm>
-          <a:prstGeom prst="bentConnector2">
-            <a:avLst/>
-          </a:prstGeom>
-          <a:noFill/>
-          <a:ln w="38100" cap="flat" cmpd="sng" algn="ctr">
-            <a:solidFill>
-              <a:srgbClr val="000000"/>
-            </a:solidFill>
-            <a:prstDash val="solid"/>
-            <a:headEnd type="none"/>
-            <a:tailEnd type="triangle"/>
-          </a:ln>
-          <a:effectLst/>
-        </p:spPr>
-      </p:cxnSp>
       <p:sp>
         <p:nvSpPr>
           <p:cNvPr id="64" name="Alternate Process 63"/>
@@ -3892,8 +3864,8 @@
         </p:nvSpPr>
         <p:spPr>
           <a:xfrm>
-            <a:off x="5966609" y="4596740"/>
-            <a:ext cx="1398802" cy="692649"/>
+            <a:off x="5636408" y="4596740"/>
+            <a:ext cx="1920795" cy="692649"/>
           </a:xfrm>
           <a:prstGeom prst="flowChartAlternateProcess">
             <a:avLst/>
@@ -3950,24 +3922,27 @@
                 <a:ea typeface=""/>
                 <a:cs typeface=""/>
               </a:rPr>
-              <a:t>Training set</a:t>
-            </a:r>
-            <a:br>
-              <a:rPr kumimoji="0" lang="en-US" sz="1600" b="1" i="0" u="none" strike="noStrike" kern="0" cap="none" spc="0" normalizeH="0" baseline="0" noProof="0" dirty="0">
-                <a:ln>
-                  <a:noFill/>
-                </a:ln>
-                <a:solidFill>
-                  <a:prstClr val="white"/>
-                </a:solidFill>
-                <a:effectLst/>
-                <a:uLnTx/>
-                <a:uFillTx/>
-                <a:latin typeface="Calibri"/>
-                <a:ea typeface=""/>
-                <a:cs typeface=""/>
-              </a:rPr>
-            </a:br>
+              <a:t>Training/valid. set </a:t>
+            </a:r>
+          </a:p>
+          <a:p>
+            <a:pPr marL="0" marR="0" lvl="0" indent="0" algn="ctr" defTabSz="457200" eaLnBrk="1" fontAlgn="auto" latinLnBrk="0" hangingPunct="1">
+              <a:lnSpc>
+                <a:spcPct val="100000"/>
+              </a:lnSpc>
+              <a:spcBef>
+                <a:spcPts val="0"/>
+              </a:spcBef>
+              <a:spcAft>
+                <a:spcPts val="0"/>
+              </a:spcAft>
+              <a:buClrTx/>
+              <a:buSzTx/>
+              <a:buFontTx/>
+              <a:buNone/>
+              <a:tabLst/>
+              <a:defRPr/>
+            </a:pPr>
             <a:r>
               <a:rPr kumimoji="0" lang="en-US" sz="1600" b="1" i="0" u="none" strike="noStrike" kern="0" cap="none" spc="0" normalizeH="0" baseline="0" noProof="0" dirty="0">
                 <a:ln>
@@ -4095,16 +4070,21 @@
       <p:cxnSp>
         <p:nvCxnSpPr>
           <p:cNvPr id="74" name="Curved Connector 12"/>
-          <p:cNvCxnSpPr/>
+          <p:cNvCxnSpPr>
+            <a:cxnSpLocks/>
+            <a:endCxn id="71" idx="3"/>
+          </p:cNvCxnSpPr>
           <p:nvPr/>
         </p:nvCxnSpPr>
         <p:spPr>
-          <a:xfrm rot="5400000">
-            <a:off x="7527318" y="4274881"/>
-            <a:ext cx="506277" cy="830084"/>
+          <a:xfrm rot="10800000" flipV="1">
+            <a:off x="7557203" y="4436783"/>
+            <a:ext cx="638296" cy="506282"/>
           </a:xfrm>
-          <a:prstGeom prst="bentConnector2">
-            <a:avLst/>
+          <a:prstGeom prst="bentConnector3">
+            <a:avLst>
+              <a:gd name="adj1" fmla="val 50000"/>
+            </a:avLst>
           </a:prstGeom>
           <a:noFill/>
           <a:ln w="25400" cap="flat" cmpd="sng" algn="ctr">
@@ -4357,8 +4337,50 @@
                 <a:ea typeface=""/>
                 <a:cs typeface=""/>
               </a:rPr>
-              <a:t>Dim. Reduced Test</a:t>
-            </a:r>
+              <a:t>Dim. reduced </a:t>
+            </a:r>
+            <a:r>
+              <a:rPr lang="en-US" sz="1600" b="1" kern="0" dirty="0">
+                <a:solidFill>
+                  <a:prstClr val="white"/>
+                </a:solidFill>
+                <a:latin typeface="Calibri"/>
+                <a:ea typeface=""/>
+                <a:cs typeface=""/>
+              </a:rPr>
+              <a:t>t</a:t>
+            </a:r>
+            <a:r>
+              <a:rPr kumimoji="0" lang="en-US" sz="1600" b="1" i="0" u="none" strike="noStrike" kern="0" cap="none" spc="0" normalizeH="0" baseline="0" noProof="0" dirty="0" err="1">
+                <a:ln>
+                  <a:noFill/>
+                </a:ln>
+                <a:solidFill>
+                  <a:prstClr val="white"/>
+                </a:solidFill>
+                <a:effectLst/>
+                <a:uLnTx/>
+                <a:uFillTx/>
+                <a:latin typeface="Calibri"/>
+                <a:ea typeface=""/>
+                <a:cs typeface=""/>
+              </a:rPr>
+              <a:t>est</a:t>
+            </a:r>
+            <a:endParaRPr kumimoji="0" lang="en-US" sz="1600" b="1" i="0" u="none" strike="noStrike" kern="0" cap="none" spc="0" normalizeH="0" baseline="0" noProof="0" dirty="0">
+              <a:ln>
+                <a:noFill/>
+              </a:ln>
+              <a:solidFill>
+                <a:prstClr val="white"/>
+              </a:solidFill>
+              <a:effectLst/>
+              <a:uLnTx/>
+              <a:uFillTx/>
+              <a:latin typeface="Calibri"/>
+              <a:ea typeface=""/>
+              <a:cs typeface=""/>
+            </a:endParaRPr>
           </a:p>
           <a:p>
             <a:pPr marL="0" marR="0" lvl="0" indent="0" algn="ctr" defTabSz="457200" eaLnBrk="1" fontAlgn="auto" latinLnBrk="0" hangingPunct="1">
@@ -4434,7 +4456,7 @@
         </p:nvSpPr>
         <p:spPr>
           <a:xfrm>
-            <a:off x="5362697" y="8951232"/>
+            <a:off x="5362697" y="8974382"/>
             <a:ext cx="2769763" cy="1231278"/>
           </a:xfrm>
           <a:prstGeom prst="flowChartAlternateProcess">
@@ -4815,7 +4837,7 @@
                 <a:ea typeface=""/>
                 <a:cs typeface=""/>
               </a:rPr>
-              <a:t>Recalculate </a:t>
+              <a:t>Repeat </a:t>
             </a:r>
             <a:r>
               <a:rPr lang="en-US" sz="2000" b="1" kern="0" dirty="0">
@@ -5140,7 +5162,7 @@
         </p:nvSpPr>
         <p:spPr>
           <a:xfrm rot="16200000">
-            <a:off x="5426741" y="4802503"/>
+            <a:off x="5096541" y="4802503"/>
             <a:ext cx="785872" cy="307335"/>
           </a:xfrm>
           <a:prstGeom prst="rect">
@@ -5327,6 +5349,7 @@
         <p:nvCxnSpPr>
           <p:cNvPr id="120" name="Elbow Connector 119"/>
           <p:cNvCxnSpPr>
+            <a:cxnSpLocks/>
             <a:endCxn id="90" idx="0"/>
           </p:cNvCxnSpPr>
           <p:nvPr/>
@@ -5364,14 +5387,15 @@
         <p:nvCxnSpPr>
           <p:cNvPr id="122" name="Elbow Connector 121"/>
           <p:cNvCxnSpPr>
-            <a:endCxn id="71" idx="4"/>
+            <a:cxnSpLocks/>
+            <a:endCxn id="69" idx="4"/>
           </p:cNvCxnSpPr>
           <p:nvPr/>
         </p:nvCxnSpPr>
         <p:spPr>
           <a:xfrm flipV="1">
-            <a:off x="3072355" y="10182510"/>
-            <a:ext cx="5949747" cy="1479621"/>
+            <a:off x="2742155" y="10182510"/>
+            <a:ext cx="6279947" cy="1479624"/>
           </a:xfrm>
           <a:prstGeom prst="bentConnector2">
             <a:avLst/>
@@ -5425,10 +5449,10 @@
         </p:nvGrpSpPr>
         <p:grpSpPr>
           <a:xfrm>
-            <a:off x="136588" y="5762933"/>
-            <a:ext cx="4432034" cy="6380740"/>
-            <a:chOff x="136588" y="5762933"/>
-            <a:chExt cx="4432034" cy="6380740"/>
+            <a:off x="136588" y="5762932"/>
+            <a:ext cx="4455184" cy="6380741"/>
+            <a:chOff x="136588" y="5762932"/>
+            <a:chExt cx="4455184" cy="6380741"/>
           </a:xfrm>
         </p:grpSpPr>
         <p:grpSp>
@@ -5511,40 +5535,7 @@
                     <a:ea typeface=""/>
                     <a:cs typeface=""/>
                   </a:rPr>
-                  <a:t>Training set</a:t>
-                </a:r>
-                <a:br>
-                  <a:rPr kumimoji="0" lang="en-US" sz="1400" b="1" i="0" u="none" strike="noStrike" kern="0" cap="none" spc="0" normalizeH="0" baseline="0" noProof="0" dirty="0">
-                    <a:ln>
-                      <a:noFill/>
-                    </a:ln>
-                    <a:solidFill>
-                      <a:prstClr val="white"/>
-                    </a:solidFill>
-                    <a:effectLst/>
-                    <a:uLnTx/>
-                    <a:uFillTx/>
-                    <a:latin typeface="Calibri"/>
-                    <a:ea typeface=""/>
-                    <a:cs typeface=""/>
-                  </a:rPr>
-                </a:br>
-                <a:r>
-                  <a:rPr kumimoji="0" lang="en-US" sz="1400" b="1" i="0" u="none" strike="noStrike" kern="0" cap="none" spc="0" normalizeH="0" baseline="0" noProof="0" dirty="0">
-                    <a:ln>
-                      <a:noFill/>
-                    </a:ln>
-                    <a:solidFill>
-                      <a:prstClr val="white"/>
-                    </a:solidFill>
-                    <a:effectLst/>
-                    <a:uLnTx/>
-                    <a:uFillTx/>
-                    <a:latin typeface="Calibri"/>
-                    <a:ea typeface=""/>
-                    <a:cs typeface=""/>
-                  </a:rPr>
-                  <a:t>80%</a:t>
+                  <a:t>Training/valid. set 80%</a:t>
                 </a:r>
               </a:p>
             </p:txBody>
@@ -5662,20 +5653,7 @@
                     <a:prstClr val="white"/>
                   </a:solidFill>
                 </a:rPr>
-                <a:t>Semi-random data division</a:t>
-              </a:r>
-            </a:p>
-            <a:p>
-              <a:pPr lvl="0" algn="ctr" defTabSz="457200">
-                <a:defRPr/>
-              </a:pPr>
-              <a:r>
-                <a:rPr lang="en-US" sz="1400" b="1" kern="0" dirty="0">
-                  <a:solidFill>
-                    <a:prstClr val="white"/>
-                  </a:solidFill>
-                </a:rPr>
-                <a:t>(Protect sub-sample ratios)</a:t>
+                <a:t>Semi-random data division (repeat 10x, protect sub-sample ratios)</a:t>
               </a:r>
               <a:endParaRPr lang="en-US" sz="1400" kern="0" dirty="0">
                 <a:solidFill>
@@ -5867,7 +5845,7 @@
           <p:spPr>
             <a:xfrm>
               <a:off x="3028571" y="8687518"/>
-              <a:ext cx="1192313" cy="819181"/>
+              <a:ext cx="1314460" cy="819181"/>
             </a:xfrm>
             <a:prstGeom prst="flowChartAlternateProcess">
               <a:avLst/>
@@ -5924,7 +5902,7 @@
                   <a:ea typeface=""/>
                   <a:cs typeface=""/>
                 </a:rPr>
-                <a:t>Tune set</a:t>
+                <a:t>Validation set</a:t>
               </a:r>
               <a:br>
                 <a:rPr kumimoji="0" lang="en-US" sz="1400" b="1" i="0" u="none" strike="noStrike" kern="0" cap="none" spc="0" normalizeH="0" baseline="0" noProof="0" dirty="0">
@@ -6070,7 +6048,7 @@
           </p:nvSpPr>
           <p:spPr>
             <a:xfrm>
-              <a:off x="3373472" y="9888437"/>
+              <a:off x="3396622" y="9888437"/>
               <a:ext cx="1195150" cy="690931"/>
             </a:xfrm>
             <a:prstGeom prst="flowChartAlternateProcess">
@@ -6334,8 +6312,8 @@
           </p:nvSpPr>
           <p:spPr>
             <a:xfrm>
-              <a:off x="894201" y="5762933"/>
-              <a:ext cx="3186546" cy="400110"/>
+              <a:off x="635783" y="5762932"/>
+              <a:ext cx="3674420" cy="400110"/>
             </a:xfrm>
             <a:prstGeom prst="rect">
               <a:avLst/>
@@ -6366,6 +6344,14 @@
                 <a:defRPr/>
               </a:pPr>
               <a:r>
+                <a:rPr lang="en-US" sz="2000" b="1" u="sng" kern="0" dirty="0">
+                  <a:solidFill>
+                    <a:prstClr val="black"/>
+                  </a:solidFill>
+                </a:rPr>
+                <a:t>Model</a:t>
+              </a:r>
+              <a:r>
                 <a:rPr kumimoji="0" lang="en-US" sz="2000" b="1" i="0" u="sng" strike="noStrike" kern="0" cap="none" spc="0" normalizeH="0" baseline="0" noProof="0" dirty="0">
                   <a:ln>
                     <a:noFill/>
@@ -6377,8 +6363,41 @@
                   <a:uLnTx/>
                   <a:uFillTx/>
                 </a:rPr>
-                <a:t>SVM Training with Tuning</a:t>
+                <a:t> </a:t>
               </a:r>
+              <a:r>
+                <a:rPr lang="en-US" sz="2000" b="1" u="sng" kern="0" dirty="0">
+                  <a:solidFill>
+                    <a:prstClr val="black"/>
+                  </a:solidFill>
+                </a:rPr>
+                <a:t>training and t</a:t>
+              </a:r>
+              <a:r>
+                <a:rPr kumimoji="0" lang="en-US" sz="2000" b="1" i="0" u="sng" strike="noStrike" kern="0" cap="none" spc="0" normalizeH="0" baseline="0" noProof="0" dirty="0" err="1">
+                  <a:ln>
+                    <a:noFill/>
+                  </a:ln>
+                  <a:solidFill>
+                    <a:prstClr val="black"/>
+                  </a:solidFill>
+                  <a:effectLst/>
+                  <a:uLnTx/>
+                  <a:uFillTx/>
+                </a:rPr>
+                <a:t>uning</a:t>
+              </a:r>
+              <a:endParaRPr kumimoji="0" lang="en-US" sz="2000" b="1" i="0" u="sng" strike="noStrike" kern="0" cap="none" spc="0" normalizeH="0" baseline="0" noProof="0" dirty="0">
+                <a:ln>
+                  <a:noFill/>
+                </a:ln>
+                <a:solidFill>
+                  <a:prstClr val="black"/>
+                </a:solidFill>
+                <a:effectLst/>
+                <a:uLnTx/>
+                <a:uFillTx/>
+              </a:endParaRPr>
             </a:p>
           </p:txBody>
         </p:sp>
@@ -6515,6 +6534,7 @@
           <p:nvCxnSpPr>
             <p:cNvPr id="1478" name="Elbow Connector 1477"/>
             <p:cNvCxnSpPr>
+              <a:cxnSpLocks/>
               <a:stCxn id="101" idx="3"/>
               <a:endCxn id="104" idx="0"/>
             </p:cNvCxnSpPr>
@@ -6523,7 +6543,7 @@
           <p:spPr>
             <a:xfrm>
               <a:off x="3537719" y="7914500"/>
-              <a:ext cx="87009" cy="773018"/>
+              <a:ext cx="148082" cy="773018"/>
             </a:xfrm>
             <a:prstGeom prst="bentConnector2">
               <a:avLst/>
@@ -6611,6 +6631,110 @@
             </a:p>
           </p:txBody>
         </p:sp>
+      </p:grpSp>
+      <p:grpSp>
+        <p:nvGrpSpPr>
+          <p:cNvPr id="12" name="Group 11">
+            <a:extLst>
+              <a:ext uri="{FF2B5EF4-FFF2-40B4-BE49-F238E27FC236}">
+                <a16:creationId xmlns:a16="http://schemas.microsoft.com/office/drawing/2014/main" id="{E705191F-00D7-B34C-A86C-17035DDBAD2E}"/>
+              </a:ext>
+            </a:extLst>
+          </p:cNvPr>
+          <p:cNvGrpSpPr/>
+          <p:nvPr/>
+        </p:nvGrpSpPr>
+        <p:grpSpPr>
+          <a:xfrm>
+            <a:off x="4349850" y="2790960"/>
+            <a:ext cx="3796057" cy="474230"/>
+            <a:chOff x="4349850" y="2756235"/>
+            <a:chExt cx="3796057" cy="474230"/>
+          </a:xfrm>
+        </p:grpSpPr>
+        <p:cxnSp>
+          <p:nvCxnSpPr>
+            <p:cNvPr id="9" name="Straight Connector 8">
+              <a:extLst>
+                <a:ext uri="{FF2B5EF4-FFF2-40B4-BE49-F238E27FC236}">
+                  <a16:creationId xmlns:a16="http://schemas.microsoft.com/office/drawing/2014/main" id="{658FBC54-741F-D04F-902B-E463B0B7F79F}"/>
+                </a:ext>
+              </a:extLst>
+            </p:cNvPr>
+            <p:cNvCxnSpPr/>
+            <p:nvPr/>
+          </p:nvCxnSpPr>
+          <p:spPr>
+            <a:xfrm>
+              <a:off x="4349850" y="2766395"/>
+              <a:ext cx="3796057" cy="0"/>
+            </a:xfrm>
+            <a:prstGeom prst="line">
+              <a:avLst/>
+            </a:prstGeom>
+            <a:ln w="28575">
+              <a:solidFill>
+                <a:schemeClr val="tx1"/>
+              </a:solidFill>
+            </a:ln>
+          </p:spPr>
+          <p:style>
+            <a:lnRef idx="1">
+              <a:schemeClr val="accent1"/>
+            </a:lnRef>
+            <a:fillRef idx="0">
+              <a:schemeClr val="accent1"/>
+            </a:fillRef>
+            <a:effectRef idx="0">
+              <a:schemeClr val="accent1"/>
+            </a:effectRef>
+            <a:fontRef idx="minor">
+              <a:schemeClr val="tx1"/>
+            </a:fontRef>
+          </p:style>
+        </p:cxnSp>
+        <p:cxnSp>
+          <p:nvCxnSpPr>
+            <p:cNvPr id="11" name="Straight Arrow Connector 10">
+              <a:extLst>
+                <a:ext uri="{FF2B5EF4-FFF2-40B4-BE49-F238E27FC236}">
+                  <a16:creationId xmlns:a16="http://schemas.microsoft.com/office/drawing/2014/main" id="{CDB2CBF3-8184-B944-8983-631DB8097787}"/>
+                </a:ext>
+              </a:extLst>
+            </p:cNvPr>
+            <p:cNvCxnSpPr/>
+            <p:nvPr/>
+          </p:nvCxnSpPr>
+          <p:spPr>
+            <a:xfrm>
+              <a:off x="8134354" y="2756235"/>
+              <a:ext cx="0" cy="474230"/>
+            </a:xfrm>
+            <a:prstGeom prst="straightConnector1">
+              <a:avLst/>
+            </a:prstGeom>
+            <a:ln w="28575">
+              <a:solidFill>
+                <a:schemeClr val="tx1"/>
+              </a:solidFill>
+              <a:tailEnd type="triangle"/>
+            </a:ln>
+          </p:spPr>
+          <p:style>
+            <a:lnRef idx="1">
+              <a:schemeClr val="accent1"/>
+            </a:lnRef>
+            <a:fillRef idx="0">
+              <a:schemeClr val="accent1"/>
+            </a:fillRef>
+            <a:effectRef idx="0">
+              <a:schemeClr val="accent1"/>
+            </a:effectRef>
+            <a:fontRef idx="minor">
+              <a:schemeClr val="tx1"/>
+            </a:fontRef>
+          </p:style>
+        </p:cxnSp>
       </p:grpSp>
     </p:spTree>
     <p:extLst>

</xml_diff>